<commit_message>
finished demo presentation with @lutskiyevgeniy
</commit_message>
<xml_diff>
--- a/docs/Präsi-Features.pptx
+++ b/docs/Präsi-Features.pptx
@@ -112,6 +112,11 @@
       </a:defRPr>
     </a:lvl9pPr>
   </p:defaultTextStyle>
+  <p:extLst>
+    <p:ext uri="{EFAFB233-063F-42B5-8137-9DF3F51BA10A}">
+      <p15:sldGuideLst xmlns:p15="http://schemas.microsoft.com/office/powerpoint/2012/main"/>
+    </p:ext>
+  </p:extLst>
 </p:presentation>
 </file>
 
@@ -262,7 +267,7 @@
           <a:p>
             <a:fld id="{246CB39B-5F4C-4A7E-9BE3-AAFD45576D16}" type="datetime2">
               <a:rPr lang="en-US" smtClean="0"/>
-              <a:t>Monday, July 13, 2020</a:t>
+              <a:t>Tuesday, July 14, 2020</a:t>
             </a:fld>
             <a:endParaRPr lang="en-US" dirty="0"/>
           </a:p>
@@ -466,7 +471,7 @@
           <a:p>
             <a:fld id="{246CB39B-5F4C-4A7E-9BE3-AAFD45576D16}" type="datetime2">
               <a:rPr lang="en-US" smtClean="0"/>
-              <a:t>Monday, July 13, 2020</a:t>
+              <a:t>Tuesday, July 14, 2020</a:t>
             </a:fld>
             <a:endParaRPr lang="en-US" dirty="0"/>
           </a:p>
@@ -680,7 +685,7 @@
           <a:p>
             <a:fld id="{246CB39B-5F4C-4A7E-9BE3-AAFD45576D16}" type="datetime2">
               <a:rPr lang="en-US" smtClean="0"/>
-              <a:t>Monday, July 13, 2020</a:t>
+              <a:t>Tuesday, July 14, 2020</a:t>
             </a:fld>
             <a:endParaRPr lang="en-US" dirty="0"/>
           </a:p>
@@ -884,7 +889,7 @@
           <a:p>
             <a:fld id="{246CB39B-5F4C-4A7E-9BE3-AAFD45576D16}" type="datetime2">
               <a:rPr lang="en-US" smtClean="0"/>
-              <a:t>Monday, July 13, 2020</a:t>
+              <a:t>Tuesday, July 14, 2020</a:t>
             </a:fld>
             <a:endParaRPr lang="en-US" dirty="0"/>
           </a:p>
@@ -1165,7 +1170,7 @@
           <a:p>
             <a:fld id="{246CB39B-5F4C-4A7E-9BE3-AAFD45576D16}" type="datetime2">
               <a:rPr lang="en-US" smtClean="0"/>
-              <a:t>Monday, July 13, 2020</a:t>
+              <a:t>Tuesday, July 14, 2020</a:t>
             </a:fld>
             <a:endParaRPr lang="en-US" dirty="0"/>
           </a:p>
@@ -1436,7 +1441,7 @@
           <a:p>
             <a:fld id="{246CB39B-5F4C-4A7E-9BE3-AAFD45576D16}" type="datetime2">
               <a:rPr lang="en-US" smtClean="0"/>
-              <a:t>Monday, July 13, 2020</a:t>
+              <a:t>Tuesday, July 14, 2020</a:t>
             </a:fld>
             <a:endParaRPr lang="en-US" dirty="0"/>
           </a:p>
@@ -1854,7 +1859,7 @@
           <a:p>
             <a:fld id="{246CB39B-5F4C-4A7E-9BE3-AAFD45576D16}" type="datetime2">
               <a:rPr lang="en-US" smtClean="0"/>
-              <a:t>Monday, July 13, 2020</a:t>
+              <a:t>Tuesday, July 14, 2020</a:t>
             </a:fld>
             <a:endParaRPr lang="en-US" dirty="0"/>
           </a:p>
@@ -2001,7 +2006,7 @@
           <a:p>
             <a:fld id="{246CB39B-5F4C-4A7E-9BE3-AAFD45576D16}" type="datetime2">
               <a:rPr lang="en-US" smtClean="0"/>
-              <a:t>Monday, July 13, 2020</a:t>
+              <a:t>Tuesday, July 14, 2020</a:t>
             </a:fld>
             <a:endParaRPr lang="en-US" dirty="0"/>
           </a:p>
@@ -2120,7 +2125,7 @@
           <a:p>
             <a:fld id="{246CB39B-5F4C-4A7E-9BE3-AAFD45576D16}" type="datetime2">
               <a:rPr lang="en-US" smtClean="0"/>
-              <a:t>Monday, July 13, 2020</a:t>
+              <a:t>Tuesday, July 14, 2020</a:t>
             </a:fld>
             <a:endParaRPr lang="en-US" dirty="0"/>
           </a:p>
@@ -2437,7 +2442,7 @@
           <a:p>
             <a:fld id="{246CB39B-5F4C-4A7E-9BE3-AAFD45576D16}" type="datetime2">
               <a:rPr lang="en-US" smtClean="0"/>
-              <a:t>Monday, July 13, 2020</a:t>
+              <a:t>Tuesday, July 14, 2020</a:t>
             </a:fld>
             <a:endParaRPr lang="en-US" dirty="0"/>
           </a:p>
@@ -2731,7 +2736,7 @@
           <a:p>
             <a:fld id="{246CB39B-5F4C-4A7E-9BE3-AAFD45576D16}" type="datetime2">
               <a:rPr lang="en-US" smtClean="0"/>
-              <a:t>Monday, July 13, 2020</a:t>
+              <a:t>Tuesday, July 14, 2020</a:t>
             </a:fld>
             <a:endParaRPr lang="en-US" dirty="0"/>
           </a:p>
@@ -2978,7 +2983,7 @@
           <a:p>
             <a:fld id="{246CB39B-5F4C-4A7E-9BE3-AAFD45576D16}" type="datetime2">
               <a:rPr lang="en-US" smtClean="0"/>
-              <a:t>Monday, July 13, 2020</a:t>
+              <a:t>Tuesday, July 14, 2020</a:t>
             </a:fld>
             <a:endParaRPr lang="en-US" dirty="0"/>
           </a:p>
@@ -3390,7 +3395,7 @@
     <p:bg>
       <p:bgPr>
         <a:solidFill>
-          <a:schemeClr val="bg2"/>
+          <a:schemeClr val="bg1"/>
         </a:solidFill>
         <a:effectLst/>
       </p:bgPr>
@@ -3425,46 +3430,825 @@
         </p:nvPicPr>
         <p:blipFill rotWithShape="1">
           <a:blip r:embed="rId2"/>
-          <a:srcRect/>
           <a:stretch/>
         </p:blipFill>
         <p:spPr>
           <a:xfrm>
-            <a:off x="20" y="1"/>
-            <a:ext cx="12191980" cy="6858000"/>
+            <a:off x="-27278" y="0"/>
+            <a:ext cx="12121868" cy="6818548"/>
+          </a:xfrm>
+          <a:prstGeom prst="rect">
+            <a:avLst/>
+          </a:prstGeom>
+        </p:spPr>
+      </p:pic>
+      <p:sp>
+        <p:nvSpPr>
+          <p:cNvPr id="1028" name="Rectangle 70">
+            <a:extLst>
+              <a:ext uri="{FF2B5EF4-FFF2-40B4-BE49-F238E27FC236}">
+                <a16:creationId xmlns:a16="http://schemas.microsoft.com/office/drawing/2014/main" id="{C6B8CC7F-3622-46E3-9272-E1956397D21B}"/>
+              </a:ext>
+              <a:ext uri="{C183D7F6-B498-43B3-948B-1728B52AA6E4}">
+                <adec:decorative xmlns:adec="http://schemas.microsoft.com/office/drawing/2017/decorative" val="1"/>
+              </a:ext>
+            </a:extLst>
+          </p:cNvPr>
+          <p:cNvSpPr>
+            <a:spLocks noGrp="1" noRot="1" noChangeAspect="1" noMove="1" noResize="1" noEditPoints="1" noAdjustHandles="1" noChangeArrowheads="1" noChangeShapeType="1" noTextEdit="1"/>
+          </p:cNvSpPr>
+          <p:nvPr>
+            <p:extLst>
+              <p:ext uri="{386F3935-93C4-4BCD-93E2-E3B085C9AB24}">
+                <p16:designElem xmlns:p16="http://schemas.microsoft.com/office/powerpoint/2015/main" val="1"/>
+              </p:ext>
+            </p:extLst>
+          </p:nvPr>
+        </p:nvSpPr>
+        <p:spPr>
+          <a:xfrm>
+            <a:off x="1" y="0"/>
+            <a:ext cx="4234905" cy="4562780"/>
+          </a:xfrm>
+          <a:prstGeom prst="rect">
+            <a:avLst/>
+          </a:prstGeom>
+          <a:gradFill>
+            <a:gsLst>
+              <a:gs pos="0">
+                <a:schemeClr val="accent1">
+                  <a:lumMod val="100000"/>
+                  <a:alpha val="82000"/>
+                </a:schemeClr>
+              </a:gs>
+              <a:gs pos="25000">
+                <a:schemeClr val="accent1">
+                  <a:alpha val="60000"/>
+                </a:schemeClr>
+              </a:gs>
+              <a:gs pos="94000">
+                <a:schemeClr val="bg2">
+                  <a:lumMod val="75000"/>
+                </a:schemeClr>
+              </a:gs>
+              <a:gs pos="100000">
+                <a:schemeClr val="bg2">
+                  <a:lumMod val="75000"/>
+                </a:schemeClr>
+              </a:gs>
+            </a:gsLst>
+            <a:lin ang="4200000" scaled="0"/>
+          </a:gradFill>
+          <a:ln>
+            <a:noFill/>
+          </a:ln>
+        </p:spPr>
+        <p:style>
+          <a:lnRef idx="2">
+            <a:schemeClr val="accent1">
+              <a:shade val="50000"/>
+            </a:schemeClr>
+          </a:lnRef>
+          <a:fillRef idx="1">
+            <a:schemeClr val="accent1"/>
+          </a:fillRef>
+          <a:effectRef idx="0">
+            <a:schemeClr val="accent1"/>
+          </a:effectRef>
+          <a:fontRef idx="minor">
+            <a:schemeClr val="lt1"/>
+          </a:fontRef>
+        </p:style>
+        <p:txBody>
+          <a:bodyPr rtlCol="0" anchor="ctr"/>
+          <a:lstStyle/>
+          <a:p>
+            <a:pPr algn="ctr"/>
+            <a:endParaRPr lang="en-US"/>
+          </a:p>
+        </p:txBody>
+      </p:sp>
+      <p:sp>
+        <p:nvSpPr>
+          <p:cNvPr id="73" name="Rectangle 72">
+            <a:extLst>
+              <a:ext uri="{FF2B5EF4-FFF2-40B4-BE49-F238E27FC236}">
+                <a16:creationId xmlns:a16="http://schemas.microsoft.com/office/drawing/2014/main" id="{F3FE55B4-2EE5-4A4A-AD80-1A14F660FEF5}"/>
+              </a:ext>
+              <a:ext uri="{C183D7F6-B498-43B3-948B-1728B52AA6E4}">
+                <adec:decorative xmlns:adec="http://schemas.microsoft.com/office/drawing/2017/decorative" val="1"/>
+              </a:ext>
+            </a:extLst>
+          </p:cNvPr>
+          <p:cNvSpPr>
+            <a:spLocks noGrp="1" noRot="1" noChangeAspect="1" noMove="1" noResize="1" noEditPoints="1" noAdjustHandles="1" noChangeArrowheads="1" noChangeShapeType="1" noTextEdit="1"/>
+          </p:cNvSpPr>
+          <p:nvPr>
+            <p:extLst>
+              <p:ext uri="{386F3935-93C4-4BCD-93E2-E3B085C9AB24}">
+                <p16:designElem xmlns:p16="http://schemas.microsoft.com/office/powerpoint/2015/main" val="1"/>
+              </p:ext>
+            </p:extLst>
+          </p:nvPr>
+        </p:nvSpPr>
+        <p:spPr>
+          <a:xfrm>
+            <a:off x="4234906" y="0"/>
+            <a:ext cx="7956409" cy="6858000"/>
+          </a:xfrm>
+          <a:prstGeom prst="rect">
+            <a:avLst/>
+          </a:prstGeom>
+          <a:gradFill>
+            <a:gsLst>
+              <a:gs pos="0">
+                <a:schemeClr val="accent1">
+                  <a:lumMod val="100000"/>
+                  <a:alpha val="82000"/>
+                </a:schemeClr>
+              </a:gs>
+              <a:gs pos="25000">
+                <a:schemeClr val="accent1">
+                  <a:alpha val="60000"/>
+                </a:schemeClr>
+              </a:gs>
+              <a:gs pos="94000">
+                <a:schemeClr val="bg2">
+                  <a:lumMod val="75000"/>
+                </a:schemeClr>
+              </a:gs>
+              <a:gs pos="100000">
+                <a:schemeClr val="bg2">
+                  <a:lumMod val="75000"/>
+                </a:schemeClr>
+              </a:gs>
+            </a:gsLst>
+            <a:lin ang="4200000" scaled="0"/>
+          </a:gradFill>
+          <a:ln>
+            <a:noFill/>
+          </a:ln>
+        </p:spPr>
+        <p:style>
+          <a:lnRef idx="2">
+            <a:schemeClr val="accent1">
+              <a:shade val="50000"/>
+            </a:schemeClr>
+          </a:lnRef>
+          <a:fillRef idx="1">
+            <a:schemeClr val="accent1"/>
+          </a:fillRef>
+          <a:effectRef idx="0">
+            <a:schemeClr val="accent1"/>
+          </a:effectRef>
+          <a:fontRef idx="minor">
+            <a:schemeClr val="lt1"/>
+          </a:fontRef>
+        </p:style>
+        <p:txBody>
+          <a:bodyPr rtlCol="0" anchor="ctr"/>
+          <a:lstStyle/>
+          <a:p>
+            <a:pPr algn="ctr"/>
+            <a:endParaRPr lang="en-US"/>
+          </a:p>
+        </p:txBody>
+      </p:sp>
+      <p:pic>
+        <p:nvPicPr>
+          <p:cNvPr id="75" name="Picture 74">
+            <a:extLst>
+              <a:ext uri="{FF2B5EF4-FFF2-40B4-BE49-F238E27FC236}">
+                <a16:creationId xmlns:a16="http://schemas.microsoft.com/office/drawing/2014/main" id="{7267E9C1-58F1-46EE-9BBE-108764BF9E2F}"/>
+              </a:ext>
+              <a:ext uri="{C183D7F6-B498-43B3-948B-1728B52AA6E4}">
+                <adec:decorative xmlns:adec="http://schemas.microsoft.com/office/drawing/2017/decorative" val="1"/>
+              </a:ext>
+            </a:extLst>
+          </p:cNvPr>
+          <p:cNvPicPr>
+            <a:picLocks noGrp="1" noRot="1" noChangeAspect="1" noMove="1" noResize="1" noEditPoints="1" noAdjustHandles="1" noChangeArrowheads="1" noChangeShapeType="1" noCrop="1"/>
+          </p:cNvPicPr>
+          <p:nvPr>
+            <p:extLst>
+              <p:ext uri="{386F3935-93C4-4BCD-93E2-E3B085C9AB24}">
+                <p16:designElem xmlns:p16="http://schemas.microsoft.com/office/powerpoint/2015/main" val="1"/>
+              </p:ext>
+            </p:extLst>
+          </p:nvPr>
+        </p:nvPicPr>
+        <p:blipFill>
+          <a:blip r:embed="rId3">
+            <a:extLst>
+              <a:ext uri="{28A0092B-C50C-407E-A947-70E740481C1C}">
+                <a14:useLocalDpi xmlns:a14="http://schemas.microsoft.com/office/drawing/2010/main" val="0"/>
+              </a:ext>
+            </a:extLst>
+          </a:blip>
+          <a:stretch>
+            <a:fillRect/>
+          </a:stretch>
+        </p:blipFill>
+        <p:spPr>
+          <a:xfrm flipH="1">
+            <a:off x="0" y="0"/>
+            <a:ext cx="12192000" cy="6858000"/>
+          </a:xfrm>
+          <a:prstGeom prst="rect">
+            <a:avLst/>
+          </a:prstGeom>
+        </p:spPr>
+      </p:pic>
+      <p:sp>
+        <p:nvSpPr>
+          <p:cNvPr id="77" name="Freeform: Shape 76">
+            <a:extLst>
+              <a:ext uri="{FF2B5EF4-FFF2-40B4-BE49-F238E27FC236}">
+                <a16:creationId xmlns:a16="http://schemas.microsoft.com/office/drawing/2014/main" id="{F62B8A8C-A996-46DA-AB61-1A4DD707348F}"/>
+              </a:ext>
+              <a:ext uri="{C183D7F6-B498-43B3-948B-1728B52AA6E4}">
+                <adec:decorative xmlns:adec="http://schemas.microsoft.com/office/drawing/2017/decorative" val="1"/>
+              </a:ext>
+            </a:extLst>
+          </p:cNvPr>
+          <p:cNvSpPr>
+            <a:spLocks noGrp="1" noRot="1" noChangeAspect="1" noMove="1" noResize="1" noEditPoints="1" noAdjustHandles="1" noChangeArrowheads="1" noChangeShapeType="1" noTextEdit="1"/>
+          </p:cNvSpPr>
+          <p:nvPr>
+            <p:extLst>
+              <p:ext uri="{386F3935-93C4-4BCD-93E2-E3B085C9AB24}">
+                <p16:designElem xmlns:p16="http://schemas.microsoft.com/office/powerpoint/2015/main" val="1"/>
+              </p:ext>
+            </p:extLst>
+          </p:nvPr>
+        </p:nvSpPr>
+        <p:spPr>
+          <a:xfrm>
+            <a:off x="-684" y="2"/>
+            <a:ext cx="3799103" cy="3822917"/>
           </a:xfrm>
           <a:custGeom>
             <a:avLst/>
-            <a:gdLst/>
+            <a:gdLst>
+              <a:gd name="connsiteX0" fmla="*/ 370922 w 3799103"/>
+              <a:gd name="connsiteY0" fmla="*/ 0 h 3822917"/>
+              <a:gd name="connsiteX1" fmla="*/ 2961741 w 3799103"/>
+              <a:gd name="connsiteY1" fmla="*/ 0 h 3822917"/>
+              <a:gd name="connsiteX2" fmla="*/ 3023310 w 3799103"/>
+              <a:gd name="connsiteY2" fmla="*/ 46041 h 3822917"/>
+              <a:gd name="connsiteX3" fmla="*/ 3799103 w 3799103"/>
+              <a:gd name="connsiteY3" fmla="*/ 1691074 h 3822917"/>
+              <a:gd name="connsiteX4" fmla="*/ 1667260 w 3799103"/>
+              <a:gd name="connsiteY4" fmla="*/ 3822917 h 3822917"/>
+              <a:gd name="connsiteX5" fmla="*/ 22227 w 3799103"/>
+              <a:gd name="connsiteY5" fmla="*/ 3047124 h 3822917"/>
+              <a:gd name="connsiteX6" fmla="*/ 0 w 3799103"/>
+              <a:gd name="connsiteY6" fmla="*/ 3017401 h 3822917"/>
+              <a:gd name="connsiteX7" fmla="*/ 0 w 3799103"/>
+              <a:gd name="connsiteY7" fmla="*/ 364747 h 3822917"/>
+              <a:gd name="connsiteX8" fmla="*/ 22227 w 3799103"/>
+              <a:gd name="connsiteY8" fmla="*/ 335024 h 3822917"/>
+              <a:gd name="connsiteX9" fmla="*/ 351088 w 3799103"/>
+              <a:gd name="connsiteY9" fmla="*/ 13924 h 3822917"/>
+            </a:gdLst>
             <a:ahLst/>
-            <a:cxnLst/>
+            <a:cxnLst>
+              <a:cxn ang="0">
+                <a:pos x="connsiteX0" y="connsiteY0"/>
+              </a:cxn>
+              <a:cxn ang="0">
+                <a:pos x="connsiteX1" y="connsiteY1"/>
+              </a:cxn>
+              <a:cxn ang="0">
+                <a:pos x="connsiteX2" y="connsiteY2"/>
+              </a:cxn>
+              <a:cxn ang="0">
+                <a:pos x="connsiteX3" y="connsiteY3"/>
+              </a:cxn>
+              <a:cxn ang="0">
+                <a:pos x="connsiteX4" y="connsiteY4"/>
+              </a:cxn>
+              <a:cxn ang="0">
+                <a:pos x="connsiteX5" y="connsiteY5"/>
+              </a:cxn>
+              <a:cxn ang="0">
+                <a:pos x="connsiteX6" y="connsiteY6"/>
+              </a:cxn>
+              <a:cxn ang="0">
+                <a:pos x="connsiteX7" y="connsiteY7"/>
+              </a:cxn>
+              <a:cxn ang="0">
+                <a:pos x="connsiteX8" y="connsiteY8"/>
+              </a:cxn>
+              <a:cxn ang="0">
+                <a:pos x="connsiteX9" y="connsiteY9"/>
+              </a:cxn>
+            </a:cxnLst>
             <a:rect l="l" t="t" r="r" b="b"/>
             <a:pathLst>
-              <a:path w="12192000" h="6858000">
+              <a:path w="3799103" h="3822917">
                 <a:moveTo>
-                  <a:pt x="0" y="0"/>
+                  <a:pt x="370922" y="0"/>
                 </a:moveTo>
                 <a:lnTo>
-                  <a:pt x="12192000" y="0"/>
+                  <a:pt x="2961741" y="0"/>
                 </a:lnTo>
                 <a:lnTo>
-                  <a:pt x="12192000" y="6858000"/>
+                  <a:pt x="3023310" y="46041"/>
+                </a:lnTo>
+                <a:cubicBezTo>
+                  <a:pt x="3497106" y="437052"/>
+                  <a:pt x="3799103" y="1028796"/>
+                  <a:pt x="3799103" y="1691074"/>
+                </a:cubicBezTo>
+                <a:cubicBezTo>
+                  <a:pt x="3799103" y="2868458"/>
+                  <a:pt x="2844644" y="3822917"/>
+                  <a:pt x="1667260" y="3822917"/>
+                </a:cubicBezTo>
+                <a:cubicBezTo>
+                  <a:pt x="1004982" y="3822917"/>
+                  <a:pt x="413238" y="3520920"/>
+                  <a:pt x="22227" y="3047124"/>
+                </a:cubicBezTo>
+                <a:lnTo>
+                  <a:pt x="0" y="3017401"/>
                 </a:lnTo>
                 <a:lnTo>
-                  <a:pt x="0" y="6858000"/>
+                  <a:pt x="0" y="364747"/>
                 </a:lnTo>
+                <a:lnTo>
+                  <a:pt x="22227" y="335024"/>
+                </a:lnTo>
+                <a:cubicBezTo>
+                  <a:pt x="119980" y="216575"/>
+                  <a:pt x="230278" y="108864"/>
+                  <a:pt x="351088" y="13924"/>
+                </a:cubicBezTo>
                 <a:close/>
               </a:path>
             </a:pathLst>
           </a:custGeom>
+          <a:solidFill>
+            <a:srgbClr val="FFFFFF"/>
+          </a:solidFill>
+          <a:ln>
+            <a:noFill/>
+          </a:ln>
+        </p:spPr>
+        <p:style>
+          <a:lnRef idx="2">
+            <a:schemeClr val="accent1">
+              <a:shade val="50000"/>
+            </a:schemeClr>
+          </a:lnRef>
+          <a:fillRef idx="1">
+            <a:schemeClr val="accent1"/>
+          </a:fillRef>
+          <a:effectRef idx="0">
+            <a:schemeClr val="accent1"/>
+          </a:effectRef>
+          <a:fontRef idx="minor">
+            <a:schemeClr val="lt1"/>
+          </a:fontRef>
+        </p:style>
+        <p:txBody>
+          <a:bodyPr wrap="square" rtlCol="0" anchor="ctr">
+            <a:noAutofit/>
+          </a:bodyPr>
+          <a:lstStyle/>
+          <a:p>
+            <a:pPr algn="ctr"/>
+            <a:endParaRPr lang="en-US"/>
+          </a:p>
+        </p:txBody>
+      </p:sp>
+      <p:pic>
+        <p:nvPicPr>
+          <p:cNvPr id="6" name="Grafik 5" descr="Ein Bild, das Zeichnung enthält.&#10;&#10;Automatisch generierte Beschreibung">
+            <a:extLst>
+              <a:ext uri="{FF2B5EF4-FFF2-40B4-BE49-F238E27FC236}">
+                <a16:creationId xmlns:a16="http://schemas.microsoft.com/office/drawing/2014/main" id="{898C7D84-5B0D-43EF-83BE-E01D1D4559F5}"/>
+              </a:ext>
+            </a:extLst>
+          </p:cNvPr>
+          <p:cNvPicPr>
+            <a:picLocks noChangeAspect="1"/>
+          </p:cNvPicPr>
+          <p:nvPr/>
+        </p:nvPicPr>
+        <p:blipFill>
+          <a:blip r:embed="rId4">
+            <a:extLst>
+              <a:ext uri="{28A0092B-C50C-407E-A947-70E740481C1C}">
+                <a14:useLocalDpi xmlns:a14="http://schemas.microsoft.com/office/drawing/2010/main" val="0"/>
+              </a:ext>
+            </a:extLst>
+          </a:blip>
+          <a:stretch>
+            <a:fillRect/>
+          </a:stretch>
+        </p:blipFill>
+        <p:spPr>
+          <a:xfrm>
+            <a:off x="366100" y="409303"/>
+            <a:ext cx="2629584" cy="2590140"/>
+          </a:xfrm>
+          <a:prstGeom prst="rect">
+            <a:avLst/>
+          </a:prstGeom>
         </p:spPr>
       </p:pic>
       <p:sp>
         <p:nvSpPr>
-          <p:cNvPr id="2" name="Titel 1">
+          <p:cNvPr id="79" name="Freeform 63">
             <a:extLst>
               <a:ext uri="{FF2B5EF4-FFF2-40B4-BE49-F238E27FC236}">
-                <a16:creationId xmlns:a16="http://schemas.microsoft.com/office/drawing/2014/main" id="{0217EE34-2EF3-4C8C-B9C9-4792FBB5F316}"/>
+                <a16:creationId xmlns:a16="http://schemas.microsoft.com/office/drawing/2014/main" id="{F429BE5F-6DE0-4144-A557-3BE62DC2D816}"/>
+              </a:ext>
+              <a:ext uri="{C183D7F6-B498-43B3-948B-1728B52AA6E4}">
+                <adec:decorative xmlns:adec="http://schemas.microsoft.com/office/drawing/2017/decorative" val="1"/>
+              </a:ext>
+            </a:extLst>
+          </p:cNvPr>
+          <p:cNvSpPr>
+            <a:spLocks noGrp="1" noRot="1" noChangeAspect="1" noMove="1" noResize="1" noEditPoints="1" noAdjustHandles="1" noChangeArrowheads="1" noChangeShapeType="1" noTextEdit="1"/>
+          </p:cNvSpPr>
+          <p:nvPr>
+            <p:extLst>
+              <p:ext uri="{386F3935-93C4-4BCD-93E2-E3B085C9AB24}">
+                <p16:designElem xmlns:p16="http://schemas.microsoft.com/office/powerpoint/2015/main" val="1"/>
+              </p:ext>
+            </p:extLst>
+          </p:nvPr>
+        </p:nvSpPr>
+        <p:spPr>
+          <a:xfrm>
+            <a:off x="7881589" y="2057400"/>
+            <a:ext cx="4310411" cy="4800600"/>
+          </a:xfrm>
+          <a:custGeom>
+            <a:avLst/>
+            <a:gdLst>
+              <a:gd name="connsiteX0" fmla="*/ 2631284 w 4180773"/>
+              <a:gd name="connsiteY0" fmla="*/ 0 h 4656219"/>
+              <a:gd name="connsiteX1" fmla="*/ 4102460 w 4180773"/>
+              <a:gd name="connsiteY1" fmla="*/ 449382 h 4656219"/>
+              <a:gd name="connsiteX2" fmla="*/ 4180773 w 4180773"/>
+              <a:gd name="connsiteY2" fmla="*/ 507944 h 4656219"/>
+              <a:gd name="connsiteX3" fmla="*/ 4180773 w 4180773"/>
+              <a:gd name="connsiteY3" fmla="*/ 4656219 h 4656219"/>
+              <a:gd name="connsiteX4" fmla="*/ 951501 w 4180773"/>
+              <a:gd name="connsiteY4" fmla="*/ 4656219 h 4656219"/>
+              <a:gd name="connsiteX5" fmla="*/ 770685 w 4180773"/>
+              <a:gd name="connsiteY5" fmla="*/ 4491883 h 4656219"/>
+              <a:gd name="connsiteX6" fmla="*/ 0 w 4180773"/>
+              <a:gd name="connsiteY6" fmla="*/ 2631284 h 4656219"/>
+              <a:gd name="connsiteX7" fmla="*/ 2631284 w 4180773"/>
+              <a:gd name="connsiteY7" fmla="*/ 0 h 4656219"/>
+            </a:gdLst>
+            <a:ahLst/>
+            <a:cxnLst>
+              <a:cxn ang="0">
+                <a:pos x="connsiteX0" y="connsiteY0"/>
+              </a:cxn>
+              <a:cxn ang="0">
+                <a:pos x="connsiteX1" y="connsiteY1"/>
+              </a:cxn>
+              <a:cxn ang="0">
+                <a:pos x="connsiteX2" y="connsiteY2"/>
+              </a:cxn>
+              <a:cxn ang="0">
+                <a:pos x="connsiteX3" y="connsiteY3"/>
+              </a:cxn>
+              <a:cxn ang="0">
+                <a:pos x="connsiteX4" y="connsiteY4"/>
+              </a:cxn>
+              <a:cxn ang="0">
+                <a:pos x="connsiteX5" y="connsiteY5"/>
+              </a:cxn>
+              <a:cxn ang="0">
+                <a:pos x="connsiteX6" y="connsiteY6"/>
+              </a:cxn>
+              <a:cxn ang="0">
+                <a:pos x="connsiteX7" y="connsiteY7"/>
+              </a:cxn>
+            </a:cxnLst>
+            <a:rect l="l" t="t" r="r" b="b"/>
+            <a:pathLst>
+              <a:path w="4180773" h="4656219">
+                <a:moveTo>
+                  <a:pt x="2631284" y="0"/>
+                </a:moveTo>
+                <a:cubicBezTo>
+                  <a:pt x="3176241" y="0"/>
+                  <a:pt x="3682504" y="165666"/>
+                  <a:pt x="4102460" y="449382"/>
+                </a:cubicBezTo>
+                <a:lnTo>
+                  <a:pt x="4180773" y="507944"/>
+                </a:lnTo>
+                <a:lnTo>
+                  <a:pt x="4180773" y="4656219"/>
+                </a:lnTo>
+                <a:lnTo>
+                  <a:pt x="951501" y="4656219"/>
+                </a:lnTo>
+                <a:lnTo>
+                  <a:pt x="770685" y="4491883"/>
+                </a:lnTo>
+                <a:cubicBezTo>
+                  <a:pt x="294517" y="4015714"/>
+                  <a:pt x="0" y="3357893"/>
+                  <a:pt x="0" y="2631284"/>
+                </a:cubicBezTo>
+                <a:cubicBezTo>
+                  <a:pt x="0" y="1178066"/>
+                  <a:pt x="1178066" y="0"/>
+                  <a:pt x="2631284" y="0"/>
+                </a:cubicBezTo>
+                <a:close/>
+              </a:path>
+            </a:pathLst>
+          </a:custGeom>
+          <a:solidFill>
+            <a:srgbClr val="FFFFFF"/>
+          </a:solidFill>
+          <a:ln>
+            <a:gradFill>
+              <a:gsLst>
+                <a:gs pos="0">
+                  <a:schemeClr val="accent1">
+                    <a:lumMod val="40000"/>
+                    <a:lumOff val="60000"/>
+                  </a:schemeClr>
+                </a:gs>
+                <a:gs pos="23000">
+                  <a:schemeClr val="accent1">
+                    <a:lumMod val="45000"/>
+                    <a:lumOff val="55000"/>
+                  </a:schemeClr>
+                </a:gs>
+                <a:gs pos="83000">
+                  <a:schemeClr val="bg2">
+                    <a:lumMod val="75000"/>
+                  </a:schemeClr>
+                </a:gs>
+                <a:gs pos="100000">
+                  <a:schemeClr val="bg2">
+                    <a:lumMod val="75000"/>
+                  </a:schemeClr>
+                </a:gs>
+              </a:gsLst>
+              <a:lin ang="5400000" scaled="1"/>
+            </a:gradFill>
+          </a:ln>
+        </p:spPr>
+        <p:style>
+          <a:lnRef idx="2">
+            <a:schemeClr val="accent1">
+              <a:shade val="50000"/>
+            </a:schemeClr>
+          </a:lnRef>
+          <a:fillRef idx="1">
+            <a:schemeClr val="accent1"/>
+          </a:fillRef>
+          <a:effectRef idx="0">
+            <a:schemeClr val="accent1"/>
+          </a:effectRef>
+          <a:fontRef idx="minor">
+            <a:schemeClr val="lt1"/>
+          </a:fontRef>
+        </p:style>
+        <p:txBody>
+          <a:bodyPr wrap="square" rtlCol="0" anchor="ctr">
+            <a:noAutofit/>
+          </a:bodyPr>
+          <a:lstStyle/>
+          <a:p>
+            <a:pPr algn="ctr"/>
+            <a:endParaRPr lang="en-US"/>
+          </a:p>
+        </p:txBody>
+      </p:sp>
+      <p:sp>
+        <p:nvSpPr>
+          <p:cNvPr id="81" name="Freeform: Shape 80">
+            <a:extLst>
+              <a:ext uri="{FF2B5EF4-FFF2-40B4-BE49-F238E27FC236}">
+                <a16:creationId xmlns:a16="http://schemas.microsoft.com/office/drawing/2014/main" id="{CE1EFC02-FB03-4241-83C8-4FBA4CAD6570}"/>
+              </a:ext>
+              <a:ext uri="{C183D7F6-B498-43B3-948B-1728B52AA6E4}">
+                <adec:decorative xmlns:adec="http://schemas.microsoft.com/office/drawing/2017/decorative" val="1"/>
+              </a:ext>
+            </a:extLst>
+          </p:cNvPr>
+          <p:cNvSpPr>
+            <a:spLocks noGrp="1" noRot="1" noChangeAspect="1" noMove="1" noResize="1" noEditPoints="1" noAdjustHandles="1" noChangeArrowheads="1" noChangeShapeType="1" noTextEdit="1"/>
+          </p:cNvSpPr>
+          <p:nvPr>
+            <p:extLst>
+              <p:ext uri="{386F3935-93C4-4BCD-93E2-E3B085C9AB24}">
+                <p16:designElem xmlns:p16="http://schemas.microsoft.com/office/powerpoint/2015/main" val="1"/>
+              </p:ext>
+            </p:extLst>
+          </p:nvPr>
+        </p:nvSpPr>
+        <p:spPr>
+          <a:xfrm>
+            <a:off x="4497624" y="0"/>
+            <a:ext cx="3383280" cy="2942512"/>
+          </a:xfrm>
+          <a:custGeom>
+            <a:avLst/>
+            <a:gdLst>
+              <a:gd name="connsiteX0" fmla="*/ 555657 w 3383280"/>
+              <a:gd name="connsiteY0" fmla="*/ 0 h 2942512"/>
+              <a:gd name="connsiteX1" fmla="*/ 2827623 w 3383280"/>
+              <a:gd name="connsiteY1" fmla="*/ 0 h 2942512"/>
+              <a:gd name="connsiteX2" fmla="*/ 2887810 w 3383280"/>
+              <a:gd name="connsiteY2" fmla="*/ 54702 h 2942512"/>
+              <a:gd name="connsiteX3" fmla="*/ 3383280 w 3383280"/>
+              <a:gd name="connsiteY3" fmla="*/ 1250872 h 2942512"/>
+              <a:gd name="connsiteX4" fmla="*/ 1691640 w 3383280"/>
+              <a:gd name="connsiteY4" fmla="*/ 2942512 h 2942512"/>
+              <a:gd name="connsiteX5" fmla="*/ 0 w 3383280"/>
+              <a:gd name="connsiteY5" fmla="*/ 1250872 h 2942512"/>
+              <a:gd name="connsiteX6" fmla="*/ 495470 w 3383280"/>
+              <a:gd name="connsiteY6" fmla="*/ 54702 h 2942512"/>
+            </a:gdLst>
+            <a:ahLst/>
+            <a:cxnLst>
+              <a:cxn ang="0">
+                <a:pos x="connsiteX0" y="connsiteY0"/>
+              </a:cxn>
+              <a:cxn ang="0">
+                <a:pos x="connsiteX1" y="connsiteY1"/>
+              </a:cxn>
+              <a:cxn ang="0">
+                <a:pos x="connsiteX2" y="connsiteY2"/>
+              </a:cxn>
+              <a:cxn ang="0">
+                <a:pos x="connsiteX3" y="connsiteY3"/>
+              </a:cxn>
+              <a:cxn ang="0">
+                <a:pos x="connsiteX4" y="connsiteY4"/>
+              </a:cxn>
+              <a:cxn ang="0">
+                <a:pos x="connsiteX5" y="connsiteY5"/>
+              </a:cxn>
+              <a:cxn ang="0">
+                <a:pos x="connsiteX6" y="connsiteY6"/>
+              </a:cxn>
+            </a:cxnLst>
+            <a:rect l="l" t="t" r="r" b="b"/>
+            <a:pathLst>
+              <a:path w="3383280" h="2942512">
+                <a:moveTo>
+                  <a:pt x="555657" y="0"/>
+                </a:moveTo>
+                <a:lnTo>
+                  <a:pt x="2827623" y="0"/>
+                </a:lnTo>
+                <a:lnTo>
+                  <a:pt x="2887810" y="54702"/>
+                </a:lnTo>
+                <a:cubicBezTo>
+                  <a:pt x="3193937" y="360829"/>
+                  <a:pt x="3383280" y="783739"/>
+                  <a:pt x="3383280" y="1250872"/>
+                </a:cubicBezTo>
+                <a:cubicBezTo>
+                  <a:pt x="3383280" y="2185139"/>
+                  <a:pt x="2625907" y="2942512"/>
+                  <a:pt x="1691640" y="2942512"/>
+                </a:cubicBezTo>
+                <a:cubicBezTo>
+                  <a:pt x="757373" y="2942512"/>
+                  <a:pt x="0" y="2185139"/>
+                  <a:pt x="0" y="1250872"/>
+                </a:cubicBezTo>
+                <a:cubicBezTo>
+                  <a:pt x="0" y="783739"/>
+                  <a:pt x="189344" y="360829"/>
+                  <a:pt x="495470" y="54702"/>
+                </a:cubicBezTo>
+                <a:close/>
+              </a:path>
+            </a:pathLst>
+          </a:custGeom>
+          <a:solidFill>
+            <a:srgbClr val="FFFFFF"/>
+          </a:solidFill>
+          <a:ln>
+            <a:gradFill>
+              <a:gsLst>
+                <a:gs pos="0">
+                  <a:schemeClr val="accent1">
+                    <a:lumMod val="40000"/>
+                    <a:lumOff val="60000"/>
+                  </a:schemeClr>
+                </a:gs>
+                <a:gs pos="23000">
+                  <a:schemeClr val="accent1">
+                    <a:lumMod val="45000"/>
+                    <a:lumOff val="55000"/>
+                  </a:schemeClr>
+                </a:gs>
+                <a:gs pos="83000">
+                  <a:schemeClr val="bg2">
+                    <a:lumMod val="75000"/>
+                  </a:schemeClr>
+                </a:gs>
+                <a:gs pos="100000">
+                  <a:schemeClr val="bg2">
+                    <a:lumMod val="75000"/>
+                  </a:schemeClr>
+                </a:gs>
+              </a:gsLst>
+              <a:lin ang="5400000" scaled="1"/>
+            </a:gradFill>
+          </a:ln>
+        </p:spPr>
+        <p:style>
+          <a:lnRef idx="2">
+            <a:schemeClr val="accent1">
+              <a:shade val="50000"/>
+            </a:schemeClr>
+          </a:lnRef>
+          <a:fillRef idx="1">
+            <a:schemeClr val="accent1"/>
+          </a:fillRef>
+          <a:effectRef idx="0">
+            <a:schemeClr val="accent1"/>
+          </a:effectRef>
+          <a:fontRef idx="minor">
+            <a:schemeClr val="lt1"/>
+          </a:fontRef>
+        </p:style>
+        <p:txBody>
+          <a:bodyPr wrap="square" rtlCol="0" anchor="ctr">
+            <a:noAutofit/>
+          </a:bodyPr>
+          <a:lstStyle/>
+          <a:p>
+            <a:pPr algn="ctr"/>
+            <a:endParaRPr lang="en-US"/>
+          </a:p>
+        </p:txBody>
+      </p:sp>
+      <p:pic>
+        <p:nvPicPr>
+          <p:cNvPr id="1026" name="Picture 2" descr="Friedrich-Alexander-Universität Erlangen-Nürnberg (FAU) erhält ...">
+            <a:extLst>
+              <a:ext uri="{FF2B5EF4-FFF2-40B4-BE49-F238E27FC236}">
+                <a16:creationId xmlns:a16="http://schemas.microsoft.com/office/drawing/2014/main" id="{CD17E24B-5E45-40CE-9058-F0C831DD8F32}"/>
+              </a:ext>
+            </a:extLst>
+          </p:cNvPr>
+          <p:cNvPicPr>
+            <a:picLocks noChangeAspect="1" noChangeArrowheads="1"/>
+          </p:cNvPicPr>
+          <p:nvPr/>
+        </p:nvPicPr>
+        <p:blipFill>
+          <a:blip r:embed="rId5">
+            <a:extLst>
+              <a:ext uri="{28A0092B-C50C-407E-A947-70E740481C1C}">
+                <a14:useLocalDpi xmlns:a14="http://schemas.microsoft.com/office/drawing/2010/main" val="0"/>
+              </a:ext>
+            </a:extLst>
+          </a:blip>
+          <a:stretch>
+            <a:fillRect/>
+          </a:stretch>
+        </p:blipFill>
+        <p:spPr bwMode="auto">
+          <a:xfrm>
+            <a:off x="5006561" y="1019465"/>
+            <a:ext cx="2365405" cy="630774"/>
+          </a:xfrm>
+          <a:prstGeom prst="rect">
+            <a:avLst/>
+          </a:prstGeom>
+          <a:noFill/>
+          <a:extLst>
+            <a:ext uri="{909E8E84-426E-40DD-AFC4-6F175D3DCCD1}">
+              <a14:hiddenFill xmlns:a14="http://schemas.microsoft.com/office/drawing/2010/main">
+                <a:solidFill>
+                  <a:srgbClr val="FFFFFF"/>
+                </a:solidFill>
+              </a14:hiddenFill>
+            </a:ext>
+          </a:extLst>
+        </p:spPr>
+      </p:pic>
+      <p:sp>
+        <p:nvSpPr>
+          <p:cNvPr id="10" name="Titel 9">
+            <a:extLst>
+              <a:ext uri="{FF2B5EF4-FFF2-40B4-BE49-F238E27FC236}">
+                <a16:creationId xmlns:a16="http://schemas.microsoft.com/office/drawing/2014/main" id="{50C03E00-D4A6-4497-907F-AA67B4B26E9A}"/>
               </a:ext>
             </a:extLst>
           </p:cNvPr>
@@ -3477,58 +4261,25 @@
         </p:nvSpPr>
         <p:spPr>
           <a:xfrm>
-            <a:off x="8075613" y="549275"/>
-            <a:ext cx="3565524" cy="2887174"/>
+            <a:off x="8562363" y="3368980"/>
+            <a:ext cx="3219843" cy="2387600"/>
           </a:xfrm>
         </p:spPr>
         <p:txBody>
-          <a:bodyPr anchor="b">
-            <a:normAutofit/>
-          </a:bodyPr>
+          <a:bodyPr/>
           <a:lstStyle/>
           <a:p>
             <a:r>
-              <a:rPr lang="de-DE" sz="4800" dirty="0"/>
-              <a:t>Realtime-Scheduler</a:t>
-            </a:r>
-          </a:p>
-        </p:txBody>
-      </p:sp>
-      <p:sp>
-        <p:nvSpPr>
-          <p:cNvPr id="3" name="Untertitel 2">
-            <a:extLst>
-              <a:ext uri="{FF2B5EF4-FFF2-40B4-BE49-F238E27FC236}">
-                <a16:creationId xmlns:a16="http://schemas.microsoft.com/office/drawing/2014/main" id="{3A45055B-6C91-4CD1-9522-46576E88864F}"/>
-              </a:ext>
-            </a:extLst>
-          </p:cNvPr>
-          <p:cNvSpPr>
-            <a:spLocks noGrp="1"/>
-          </p:cNvSpPr>
-          <p:nvPr>
-            <p:ph type="subTitle" idx="1"/>
-          </p:nvPr>
-        </p:nvSpPr>
-        <p:spPr>
-          <a:xfrm>
-            <a:off x="8075612" y="3569007"/>
-            <a:ext cx="3565525" cy="2523817"/>
-          </a:xfrm>
-        </p:spPr>
-        <p:txBody>
-          <a:bodyPr>
-            <a:normAutofit/>
-          </a:bodyPr>
-          <a:lstStyle/>
-          <a:p>
-            <a:endParaRPr lang="de-DE" sz="2000">
-              <a:solidFill>
-                <a:schemeClr val="tx1">
-                  <a:alpha val="60000"/>
-                </a:schemeClr>
-              </a:solidFill>
-            </a:endParaRPr>
+              <a:rPr lang="de-DE" dirty="0"/>
+              <a:t>Realtime</a:t>
+            </a:r>
+            <a:br>
+              <a:rPr lang="de-DE" dirty="0"/>
+            </a:br>
+            <a:r>
+              <a:rPr lang="de-DE" dirty="0"/>
+              <a:t>Scheduler</a:t>
+            </a:r>
           </a:p>
         </p:txBody>
       </p:sp>
@@ -22764,11 +23515,11 @@
             <a:pPr algn="ctr"/>
             <a:r>
               <a:rPr lang="de-DE" sz="1400" dirty="0" err="1"/>
-              <a:t>Active</a:t>
+              <a:t>Active_time</a:t>
             </a:r>
             <a:r>
               <a:rPr lang="de-DE" sz="1400" dirty="0"/>
-              <a:t>  = Dienstag</a:t>
+              <a:t> = „14:30:00“</a:t>
             </a:r>
           </a:p>
         </p:txBody>
@@ -24158,8 +24909,8 @@
         </p:nvCxnSpPr>
         <p:spPr>
           <a:xfrm flipV="1">
-            <a:off x="5814467" y="2018219"/>
-            <a:ext cx="2052165" cy="684055"/>
+            <a:off x="5836732" y="1988267"/>
+            <a:ext cx="1410779" cy="506285"/>
           </a:xfrm>
           <a:prstGeom prst="straightConnector1">
             <a:avLst/>
@@ -24197,8 +24948,8 @@
         </p:nvSpPr>
         <p:spPr>
           <a:xfrm>
-            <a:off x="7866632" y="176205"/>
-            <a:ext cx="3469136" cy="3316292"/>
+            <a:off x="7247510" y="100241"/>
+            <a:ext cx="4870801" cy="3323987"/>
           </a:xfrm>
           <a:prstGeom prst="rect">
             <a:avLst/>
@@ -24229,7 +24980,7 @@
               </a:spcAft>
             </a:pPr>
             <a:r>
-              <a:rPr lang="en-GB" sz="800" dirty="0">
+              <a:rPr lang="en-GB" sz="1000" dirty="0">
                 <a:solidFill>
                   <a:srgbClr val="000000"/>
                 </a:solidFill>
@@ -24240,7 +24991,7 @@
               </a:rPr>
               <a:t>{</a:t>
             </a:r>
-            <a:endParaRPr lang="de-DE" sz="1050" dirty="0">
+            <a:endParaRPr lang="de-DE" sz="1000" dirty="0">
               <a:effectLst/>
               <a:latin typeface="Calibri" panose="020F0502020204030204" pitchFamily="34" charset="0"/>
               <a:ea typeface="Calibri" panose="020F0502020204030204" pitchFamily="34" charset="0"/>
@@ -24257,7 +25008,7 @@
               </a:spcAft>
             </a:pPr>
             <a:r>
-              <a:rPr lang="en-GB" sz="800" dirty="0">
+              <a:rPr lang="en-GB" sz="1000" dirty="0">
                 <a:solidFill>
                   <a:srgbClr val="000000"/>
                 </a:solidFill>
@@ -24269,7 +25020,7 @@
               <a:t>        </a:t>
             </a:r>
             <a:r>
-              <a:rPr lang="en-GB" sz="800" dirty="0">
+              <a:rPr lang="en-GB" sz="1000" dirty="0">
                 <a:solidFill>
                   <a:srgbClr val="A31515"/>
                 </a:solidFill>
@@ -24281,7 +25032,7 @@
               <a:t>"id"</a:t>
             </a:r>
             <a:r>
-              <a:rPr lang="en-GB" sz="800" dirty="0">
+              <a:rPr lang="en-GB" sz="1000" dirty="0">
                 <a:solidFill>
                   <a:srgbClr val="000000"/>
                 </a:solidFill>
@@ -24293,7 +25044,7 @@
               <a:t>: </a:t>
             </a:r>
             <a:r>
-              <a:rPr lang="en-GB" sz="800" dirty="0">
+              <a:rPr lang="en-GB" sz="1000" dirty="0">
                 <a:solidFill>
                   <a:srgbClr val="0451A5"/>
                 </a:solidFill>
@@ -24305,7 +25056,7 @@
               <a:t>"3853c1cc-a493-11ea-bb36-0272ac5704s3"</a:t>
             </a:r>
             <a:r>
-              <a:rPr lang="en-GB" sz="800" dirty="0">
+              <a:rPr lang="en-GB" sz="1000" dirty="0">
                 <a:solidFill>
                   <a:srgbClr val="000000"/>
                 </a:solidFill>
@@ -24316,7 +25067,7 @@
               </a:rPr>
               <a:t>,</a:t>
             </a:r>
-            <a:endParaRPr lang="de-DE" sz="1050" dirty="0">
+            <a:endParaRPr lang="de-DE" sz="1000" dirty="0">
               <a:effectLst/>
               <a:latin typeface="Calibri" panose="020F0502020204030204" pitchFamily="34" charset="0"/>
               <a:ea typeface="Calibri" panose="020F0502020204030204" pitchFamily="34" charset="0"/>
@@ -24333,7 +25084,7 @@
               </a:spcAft>
             </a:pPr>
             <a:r>
-              <a:rPr lang="en-GB" sz="800" dirty="0">
+              <a:rPr lang="en-GB" sz="1000" dirty="0">
                 <a:solidFill>
                   <a:srgbClr val="000000"/>
                 </a:solidFill>
@@ -24345,7 +25096,7 @@
               <a:t>        </a:t>
             </a:r>
             <a:r>
-              <a:rPr lang="en-GB" sz="800" dirty="0">
+              <a:rPr lang="en-GB" sz="1000" dirty="0">
                 <a:solidFill>
                   <a:srgbClr val="A31515"/>
                 </a:solidFill>
@@ -24357,7 +25108,7 @@
               <a:t>"</a:t>
             </a:r>
             <a:r>
-              <a:rPr lang="en-GB" sz="800" dirty="0" err="1">
+              <a:rPr lang="en-GB" sz="1000" dirty="0" err="1">
                 <a:solidFill>
                   <a:srgbClr val="A31515"/>
                 </a:solidFill>
@@ -24369,7 +25120,7 @@
               <a:t>group_id</a:t>
             </a:r>
             <a:r>
-              <a:rPr lang="en-GB" sz="800" dirty="0">
+              <a:rPr lang="en-GB" sz="1000" dirty="0">
                 <a:solidFill>
                   <a:srgbClr val="A31515"/>
                 </a:solidFill>
@@ -24381,7 +25132,7 @@
               <a:t>"</a:t>
             </a:r>
             <a:r>
-              <a:rPr lang="en-GB" sz="800" dirty="0">
+              <a:rPr lang="en-GB" sz="1000" dirty="0">
                 <a:solidFill>
                   <a:srgbClr val="000000"/>
                 </a:solidFill>
@@ -24393,7 +25144,7 @@
               <a:t>: </a:t>
             </a:r>
             <a:r>
-              <a:rPr lang="en-GB" sz="800" dirty="0">
+              <a:rPr lang="en-GB" sz="1000" dirty="0">
                 <a:solidFill>
                   <a:srgbClr val="0451A5"/>
                 </a:solidFill>
@@ -24405,7 +25156,7 @@
               <a:t>"</a:t>
             </a:r>
             <a:r>
-              <a:rPr lang="en-GB" sz="800" dirty="0" err="1">
+              <a:rPr lang="en-GB" sz="1000" dirty="0" err="1">
                 <a:solidFill>
                   <a:srgbClr val="0451A5"/>
                 </a:solidFill>
@@ -24417,7 +25168,7 @@
               <a:t>StrengSequenzielleTransaktion</a:t>
             </a:r>
             <a:r>
-              <a:rPr lang="en-GB" sz="800" dirty="0">
+              <a:rPr lang="en-GB" sz="1000" dirty="0">
                 <a:solidFill>
                   <a:srgbClr val="0451A5"/>
                 </a:solidFill>
@@ -24429,7 +25180,7 @@
               <a:t>"</a:t>
             </a:r>
             <a:r>
-              <a:rPr lang="en-GB" sz="800" dirty="0">
+              <a:rPr lang="en-GB" sz="1000" dirty="0">
                 <a:solidFill>
                   <a:srgbClr val="000000"/>
                 </a:solidFill>
@@ -24440,7 +25191,7 @@
               </a:rPr>
               <a:t>,</a:t>
             </a:r>
-            <a:endParaRPr lang="de-DE" sz="1050" dirty="0">
+            <a:endParaRPr lang="de-DE" sz="1000" dirty="0">
               <a:effectLst/>
               <a:latin typeface="Calibri" panose="020F0502020204030204" pitchFamily="34" charset="0"/>
               <a:ea typeface="Calibri" panose="020F0502020204030204" pitchFamily="34" charset="0"/>
@@ -24457,7 +25208,7 @@
               </a:spcAft>
             </a:pPr>
             <a:r>
-              <a:rPr lang="en-GB" sz="800" dirty="0">
+              <a:rPr lang="en-GB" sz="1000" dirty="0">
                 <a:solidFill>
                   <a:srgbClr val="000000"/>
                 </a:solidFill>
@@ -24469,7 +25220,7 @@
               <a:t>        </a:t>
             </a:r>
             <a:r>
-              <a:rPr lang="en-GB" sz="800" dirty="0">
+              <a:rPr lang="en-GB" sz="1000" dirty="0">
                 <a:solidFill>
                   <a:srgbClr val="A31515"/>
                 </a:solidFill>
@@ -24481,7 +25232,7 @@
               <a:t>"priority"</a:t>
             </a:r>
             <a:r>
-              <a:rPr lang="en-GB" sz="800" dirty="0">
+              <a:rPr lang="en-GB" sz="1000" dirty="0">
                 <a:solidFill>
                   <a:srgbClr val="000000"/>
                 </a:solidFill>
@@ -24493,7 +25244,7 @@
               <a:t>: </a:t>
             </a:r>
             <a:r>
-              <a:rPr lang="en-GB" sz="800" dirty="0">
+              <a:rPr lang="en-GB" sz="1000" dirty="0">
                 <a:solidFill>
                   <a:srgbClr val="098658"/>
                 </a:solidFill>
@@ -24505,7 +25256,7 @@
               <a:t>100</a:t>
             </a:r>
             <a:r>
-              <a:rPr lang="en-GB" sz="800" dirty="0">
+              <a:rPr lang="en-GB" sz="1000" dirty="0">
                 <a:solidFill>
                   <a:srgbClr val="000000"/>
                 </a:solidFill>
@@ -24516,7 +25267,7 @@
               </a:rPr>
               <a:t>,</a:t>
             </a:r>
-            <a:endParaRPr lang="de-DE" sz="1050" dirty="0">
+            <a:endParaRPr lang="de-DE" sz="1000" dirty="0">
               <a:effectLst/>
               <a:latin typeface="Calibri" panose="020F0502020204030204" pitchFamily="34" charset="0"/>
               <a:ea typeface="Calibri" panose="020F0502020204030204" pitchFamily="34" charset="0"/>
@@ -24533,7 +25284,7 @@
               </a:spcAft>
             </a:pPr>
             <a:r>
-              <a:rPr lang="en-GB" sz="800" dirty="0">
+              <a:rPr lang="en-GB" sz="1000" dirty="0">
                 <a:solidFill>
                   <a:srgbClr val="000000"/>
                 </a:solidFill>
@@ -24545,7 +25296,7 @@
               <a:t>        </a:t>
             </a:r>
             <a:r>
-              <a:rPr lang="en-GB" sz="800" dirty="0">
+              <a:rPr lang="en-GB" sz="1000" dirty="0">
                 <a:solidFill>
                   <a:srgbClr val="A31515"/>
                 </a:solidFill>
@@ -24557,7 +25308,7 @@
               <a:t>"deadline"</a:t>
             </a:r>
             <a:r>
-              <a:rPr lang="en-GB" sz="800" dirty="0">
+              <a:rPr lang="en-GB" sz="1000" dirty="0">
                 <a:solidFill>
                   <a:srgbClr val="000000"/>
                 </a:solidFill>
@@ -24569,7 +25320,7 @@
               <a:t>: </a:t>
             </a:r>
             <a:r>
-              <a:rPr lang="en-GB" sz="800" dirty="0">
+              <a:rPr lang="en-GB" sz="1000" dirty="0">
                 <a:solidFill>
                   <a:srgbClr val="0451A5"/>
                 </a:solidFill>
@@ -24581,7 +25332,7 @@
               <a:t>null</a:t>
             </a:r>
             <a:r>
-              <a:rPr lang="en-GB" sz="800" dirty="0">
+              <a:rPr lang="en-GB" sz="1000" dirty="0">
                 <a:solidFill>
                   <a:srgbClr val="000000"/>
                 </a:solidFill>
@@ -24592,7 +25343,7 @@
               </a:rPr>
               <a:t>,</a:t>
             </a:r>
-            <a:endParaRPr lang="de-DE" sz="1050" dirty="0">
+            <a:endParaRPr lang="de-DE" sz="1000" dirty="0">
               <a:effectLst/>
               <a:latin typeface="Calibri" panose="020F0502020204030204" pitchFamily="34" charset="0"/>
               <a:ea typeface="Calibri" panose="020F0502020204030204" pitchFamily="34" charset="0"/>
@@ -24609,7 +25360,7 @@
               </a:spcAft>
             </a:pPr>
             <a:r>
-              <a:rPr lang="en-GB" sz="800" dirty="0">
+              <a:rPr lang="en-GB" sz="1000" dirty="0">
                 <a:solidFill>
                   <a:srgbClr val="000000"/>
                 </a:solidFill>
@@ -24621,7 +25372,7 @@
               <a:t>        </a:t>
             </a:r>
             <a:r>
-              <a:rPr lang="en-GB" sz="800" dirty="0">
+              <a:rPr lang="en-GB" sz="1000" dirty="0">
                 <a:solidFill>
                   <a:srgbClr val="A31515"/>
                 </a:solidFill>
@@ -24633,7 +25384,7 @@
               <a:t>"</a:t>
             </a:r>
             <a:r>
-              <a:rPr lang="en-GB" sz="800" dirty="0" err="1">
+              <a:rPr lang="en-GB" sz="1000" dirty="0" err="1">
                 <a:solidFill>
                   <a:srgbClr val="A31515"/>
                 </a:solidFill>
@@ -24645,7 +25396,7 @@
               <a:t>active_times</a:t>
             </a:r>
             <a:r>
-              <a:rPr lang="en-GB" sz="800" dirty="0">
+              <a:rPr lang="en-GB" sz="1000" dirty="0">
                 <a:solidFill>
                   <a:srgbClr val="A31515"/>
                 </a:solidFill>
@@ -24657,7 +25408,7 @@
               <a:t>"</a:t>
             </a:r>
             <a:r>
-              <a:rPr lang="en-GB" sz="800" dirty="0">
+              <a:rPr lang="en-GB" sz="1000" dirty="0">
                 <a:solidFill>
                   <a:srgbClr val="000000"/>
                 </a:solidFill>
@@ -24668,7 +25419,7 @@
               </a:rPr>
               <a:t>: [],</a:t>
             </a:r>
-            <a:endParaRPr lang="de-DE" sz="1050" dirty="0">
+            <a:endParaRPr lang="de-DE" sz="1000" dirty="0">
               <a:effectLst/>
               <a:latin typeface="Calibri" panose="020F0502020204030204" pitchFamily="34" charset="0"/>
               <a:ea typeface="Calibri" panose="020F0502020204030204" pitchFamily="34" charset="0"/>
@@ -24685,7 +25436,7 @@
               </a:spcAft>
             </a:pPr>
             <a:r>
-              <a:rPr lang="en-GB" sz="800" dirty="0">
+              <a:rPr lang="en-GB" sz="1000" dirty="0">
                 <a:solidFill>
                   <a:srgbClr val="000000"/>
                 </a:solidFill>
@@ -24697,7 +25448,7 @@
               <a:t>        </a:t>
             </a:r>
             <a:r>
-              <a:rPr lang="en-GB" sz="800" dirty="0">
+              <a:rPr lang="en-GB" sz="1000" dirty="0">
                 <a:solidFill>
                   <a:srgbClr val="A31515"/>
                 </a:solidFill>
@@ -24709,7 +25460,7 @@
               <a:t>"</a:t>
             </a:r>
             <a:r>
-              <a:rPr lang="en-GB" sz="800" dirty="0" err="1">
+              <a:rPr lang="en-GB" sz="1000" dirty="0" err="1">
                 <a:solidFill>
                   <a:srgbClr val="A31515"/>
                 </a:solidFill>
@@ -24721,7 +25472,7 @@
               <a:t>working_days</a:t>
             </a:r>
             <a:r>
-              <a:rPr lang="en-GB" sz="800" dirty="0">
+              <a:rPr lang="en-GB" sz="1000" dirty="0">
                 <a:solidFill>
                   <a:srgbClr val="A31515"/>
                 </a:solidFill>
@@ -24733,7 +25484,7 @@
               <a:t>"</a:t>
             </a:r>
             <a:r>
-              <a:rPr lang="en-GB" sz="800" dirty="0">
+              <a:rPr lang="en-GB" sz="1000" dirty="0">
                 <a:solidFill>
                   <a:srgbClr val="000000"/>
                 </a:solidFill>
@@ -24744,7 +25495,7 @@
               </a:rPr>
               <a:t>: [</a:t>
             </a:r>
-            <a:endParaRPr lang="de-DE" sz="1050" dirty="0">
+            <a:endParaRPr lang="de-DE" sz="1000" dirty="0">
               <a:effectLst/>
               <a:latin typeface="Calibri" panose="020F0502020204030204" pitchFamily="34" charset="0"/>
               <a:ea typeface="Calibri" panose="020F0502020204030204" pitchFamily="34" charset="0"/>
@@ -24761,7 +25512,7 @@
               </a:spcAft>
             </a:pPr>
             <a:r>
-              <a:rPr lang="en-GB" sz="800" dirty="0">
+              <a:rPr lang="en-GB" sz="1000" dirty="0">
                 <a:solidFill>
                   <a:srgbClr val="000000"/>
                 </a:solidFill>
@@ -24773,7 +25524,7 @@
               <a:t>            </a:t>
             </a:r>
             <a:r>
-              <a:rPr lang="en-GB" sz="800" dirty="0">
+              <a:rPr lang="en-GB" sz="1000" dirty="0">
                 <a:solidFill>
                   <a:srgbClr val="0451A5"/>
                 </a:solidFill>
@@ -24785,7 +25536,7 @@
               <a:t>true</a:t>
             </a:r>
             <a:r>
-              <a:rPr lang="en-GB" sz="800" dirty="0">
+              <a:rPr lang="en-GB" sz="1000" dirty="0">
                 <a:solidFill>
                   <a:srgbClr val="000000"/>
                 </a:solidFill>
@@ -24796,7 +25547,7 @@
               </a:rPr>
               <a:t>,</a:t>
             </a:r>
-            <a:endParaRPr lang="de-DE" sz="1050" dirty="0">
+            <a:endParaRPr lang="de-DE" sz="1000" dirty="0">
               <a:effectLst/>
               <a:latin typeface="Calibri" panose="020F0502020204030204" pitchFamily="34" charset="0"/>
               <a:ea typeface="Calibri" panose="020F0502020204030204" pitchFamily="34" charset="0"/>
@@ -24813,7 +25564,7 @@
               </a:spcAft>
             </a:pPr>
             <a:r>
-              <a:rPr lang="en-GB" sz="800" dirty="0">
+              <a:rPr lang="en-GB" sz="1000" dirty="0">
                 <a:solidFill>
                   <a:srgbClr val="000000"/>
                 </a:solidFill>
@@ -24825,7 +25576,7 @@
               <a:t>            </a:t>
             </a:r>
             <a:r>
-              <a:rPr lang="en-GB" sz="800" dirty="0">
+              <a:rPr lang="en-GB" sz="1000" dirty="0">
                 <a:solidFill>
                   <a:srgbClr val="0451A5"/>
                 </a:solidFill>
@@ -24837,7 +25588,7 @@
               <a:t>true</a:t>
             </a:r>
             <a:r>
-              <a:rPr lang="en-GB" sz="800" dirty="0">
+              <a:rPr lang="en-GB" sz="1000" dirty="0">
                 <a:solidFill>
                   <a:srgbClr val="000000"/>
                 </a:solidFill>
@@ -24848,7 +25599,7 @@
               </a:rPr>
               <a:t>,</a:t>
             </a:r>
-            <a:endParaRPr lang="de-DE" sz="1050" dirty="0">
+            <a:endParaRPr lang="de-DE" sz="1000" dirty="0">
               <a:effectLst/>
               <a:latin typeface="Calibri" panose="020F0502020204030204" pitchFamily="34" charset="0"/>
               <a:ea typeface="Calibri" panose="020F0502020204030204" pitchFamily="34" charset="0"/>
@@ -24865,7 +25616,7 @@
               </a:spcAft>
             </a:pPr>
             <a:r>
-              <a:rPr lang="en-GB" sz="800" dirty="0">
+              <a:rPr lang="en-GB" sz="1000" dirty="0">
                 <a:solidFill>
                   <a:srgbClr val="000000"/>
                 </a:solidFill>
@@ -24877,7 +25628,7 @@
               <a:t>            </a:t>
             </a:r>
             <a:r>
-              <a:rPr lang="en-GB" sz="800" dirty="0">
+              <a:rPr lang="en-GB" sz="1000" dirty="0">
                 <a:solidFill>
                   <a:srgbClr val="0451A5"/>
                 </a:solidFill>
@@ -24889,7 +25640,7 @@
               <a:t>true</a:t>
             </a:r>
             <a:r>
-              <a:rPr lang="en-GB" sz="800" dirty="0">
+              <a:rPr lang="en-GB" sz="1000" dirty="0">
                 <a:solidFill>
                   <a:srgbClr val="000000"/>
                 </a:solidFill>
@@ -24900,7 +25651,7 @@
               </a:rPr>
               <a:t>,</a:t>
             </a:r>
-            <a:endParaRPr lang="de-DE" sz="1050" dirty="0">
+            <a:endParaRPr lang="de-DE" sz="1000" dirty="0">
               <a:effectLst/>
               <a:latin typeface="Calibri" panose="020F0502020204030204" pitchFamily="34" charset="0"/>
               <a:ea typeface="Calibri" panose="020F0502020204030204" pitchFamily="34" charset="0"/>
@@ -24917,7 +25668,7 @@
               </a:spcAft>
             </a:pPr>
             <a:r>
-              <a:rPr lang="en-GB" sz="800" dirty="0">
+              <a:rPr lang="en-GB" sz="1000" dirty="0">
                 <a:solidFill>
                   <a:srgbClr val="000000"/>
                 </a:solidFill>
@@ -24929,7 +25680,7 @@
               <a:t>            </a:t>
             </a:r>
             <a:r>
-              <a:rPr lang="en-GB" sz="800" dirty="0">
+              <a:rPr lang="en-GB" sz="1000" dirty="0">
                 <a:solidFill>
                   <a:srgbClr val="0451A5"/>
                 </a:solidFill>
@@ -24941,7 +25692,7 @@
               <a:t>true</a:t>
             </a:r>
             <a:r>
-              <a:rPr lang="en-GB" sz="800" dirty="0">
+              <a:rPr lang="en-GB" sz="1000" dirty="0">
                 <a:solidFill>
                   <a:srgbClr val="000000"/>
                 </a:solidFill>
@@ -24952,7 +25703,7 @@
               </a:rPr>
               <a:t>,</a:t>
             </a:r>
-            <a:endParaRPr lang="de-DE" sz="1050" dirty="0">
+            <a:endParaRPr lang="de-DE" sz="1000" dirty="0">
               <a:effectLst/>
               <a:latin typeface="Calibri" panose="020F0502020204030204" pitchFamily="34" charset="0"/>
               <a:ea typeface="Calibri" panose="020F0502020204030204" pitchFamily="34" charset="0"/>
@@ -24969,7 +25720,7 @@
               </a:spcAft>
             </a:pPr>
             <a:r>
-              <a:rPr lang="en-GB" sz="800" dirty="0">
+              <a:rPr lang="en-GB" sz="1000" dirty="0">
                 <a:solidFill>
                   <a:srgbClr val="000000"/>
                 </a:solidFill>
@@ -24981,7 +25732,7 @@
               <a:t>            </a:t>
             </a:r>
             <a:r>
-              <a:rPr lang="en-GB" sz="800" dirty="0">
+              <a:rPr lang="en-GB" sz="1000" dirty="0">
                 <a:solidFill>
                   <a:srgbClr val="0451A5"/>
                 </a:solidFill>
@@ -24993,7 +25744,7 @@
               <a:t>true</a:t>
             </a:r>
             <a:r>
-              <a:rPr lang="en-GB" sz="800" dirty="0">
+              <a:rPr lang="en-GB" sz="1000" dirty="0">
                 <a:solidFill>
                   <a:srgbClr val="000000"/>
                 </a:solidFill>
@@ -25004,7 +25755,7 @@
               </a:rPr>
               <a:t>,</a:t>
             </a:r>
-            <a:endParaRPr lang="de-DE" sz="1050" dirty="0">
+            <a:endParaRPr lang="de-DE" sz="1000" dirty="0">
               <a:effectLst/>
               <a:latin typeface="Calibri" panose="020F0502020204030204" pitchFamily="34" charset="0"/>
               <a:ea typeface="Calibri" panose="020F0502020204030204" pitchFamily="34" charset="0"/>
@@ -25021,7 +25772,7 @@
               </a:spcAft>
             </a:pPr>
             <a:r>
-              <a:rPr lang="en-GB" sz="800" dirty="0">
+              <a:rPr lang="en-GB" sz="1000" dirty="0">
                 <a:solidFill>
                   <a:srgbClr val="000000"/>
                 </a:solidFill>
@@ -25033,7 +25784,7 @@
               <a:t>            </a:t>
             </a:r>
             <a:r>
-              <a:rPr lang="en-GB" sz="800" dirty="0">
+              <a:rPr lang="en-GB" sz="1000" dirty="0">
                 <a:solidFill>
                   <a:srgbClr val="0451A5"/>
                 </a:solidFill>
@@ -25045,7 +25796,7 @@
               <a:t>true</a:t>
             </a:r>
             <a:r>
-              <a:rPr lang="en-GB" sz="800" dirty="0">
+              <a:rPr lang="en-GB" sz="1000" dirty="0">
                 <a:solidFill>
                   <a:srgbClr val="000000"/>
                 </a:solidFill>
@@ -25056,7 +25807,7 @@
               </a:rPr>
               <a:t>,</a:t>
             </a:r>
-            <a:endParaRPr lang="de-DE" sz="1050" dirty="0">
+            <a:endParaRPr lang="de-DE" sz="1000" dirty="0">
               <a:effectLst/>
               <a:latin typeface="Calibri" panose="020F0502020204030204" pitchFamily="34" charset="0"/>
               <a:ea typeface="Calibri" panose="020F0502020204030204" pitchFamily="34" charset="0"/>
@@ -25073,7 +25824,7 @@
               </a:spcAft>
             </a:pPr>
             <a:r>
-              <a:rPr lang="en-GB" sz="800" dirty="0">
+              <a:rPr lang="en-GB" sz="1000" dirty="0">
                 <a:solidFill>
                   <a:srgbClr val="000000"/>
                 </a:solidFill>
@@ -25085,7 +25836,7 @@
               <a:t>            </a:t>
             </a:r>
             <a:r>
-              <a:rPr lang="en-GB" sz="800" dirty="0">
+              <a:rPr lang="en-GB" sz="1000" dirty="0">
                 <a:solidFill>
                   <a:srgbClr val="0451A5"/>
                 </a:solidFill>
@@ -25096,7 +25847,7 @@
               </a:rPr>
               <a:t>true</a:t>
             </a:r>
-            <a:endParaRPr lang="de-DE" sz="1050" dirty="0">
+            <a:endParaRPr lang="de-DE" sz="1000" dirty="0">
               <a:effectLst/>
               <a:latin typeface="Calibri" panose="020F0502020204030204" pitchFamily="34" charset="0"/>
               <a:ea typeface="Calibri" panose="020F0502020204030204" pitchFamily="34" charset="0"/>
@@ -25113,7 +25864,7 @@
               </a:spcAft>
             </a:pPr>
             <a:r>
-              <a:rPr lang="en-GB" sz="800" dirty="0">
+              <a:rPr lang="en-GB" sz="1000" dirty="0">
                 <a:solidFill>
                   <a:srgbClr val="000000"/>
                 </a:solidFill>
@@ -25124,7 +25875,7 @@
               </a:rPr>
               <a:t>        ],</a:t>
             </a:r>
-            <a:endParaRPr lang="de-DE" sz="1050" dirty="0">
+            <a:endParaRPr lang="de-DE" sz="1000" dirty="0">
               <a:effectLst/>
               <a:latin typeface="Calibri" panose="020F0502020204030204" pitchFamily="34" charset="0"/>
               <a:ea typeface="Calibri" panose="020F0502020204030204" pitchFamily="34" charset="0"/>
@@ -25141,7 +25892,7 @@
               </a:spcAft>
             </a:pPr>
             <a:r>
-              <a:rPr lang="en-GB" sz="800" dirty="0">
+              <a:rPr lang="en-GB" sz="1000" dirty="0">
                 <a:solidFill>
                   <a:srgbClr val="000000"/>
                 </a:solidFill>
@@ -25153,7 +25904,7 @@
               <a:t>        </a:t>
             </a:r>
             <a:r>
-              <a:rPr lang="en-GB" sz="800" dirty="0">
+              <a:rPr lang="en-GB" sz="1000" dirty="0">
                 <a:solidFill>
                   <a:srgbClr val="A31515"/>
                 </a:solidFill>
@@ -25165,7 +25916,7 @@
               <a:t>"</a:t>
             </a:r>
             <a:r>
-              <a:rPr lang="en-GB" sz="800" dirty="0" err="1">
+              <a:rPr lang="en-GB" sz="1000" dirty="0" err="1">
                 <a:solidFill>
                   <a:srgbClr val="A31515"/>
                 </a:solidFill>
@@ -25177,7 +25928,7 @@
               <a:t>type_flag</a:t>
             </a:r>
             <a:r>
-              <a:rPr lang="en-GB" sz="800" dirty="0">
+              <a:rPr lang="en-GB" sz="1000" dirty="0">
                 <a:solidFill>
                   <a:srgbClr val="A31515"/>
                 </a:solidFill>
@@ -25189,7 +25940,7 @@
               <a:t>"</a:t>
             </a:r>
             <a:r>
-              <a:rPr lang="en-GB" sz="800" dirty="0">
+              <a:rPr lang="en-GB" sz="1000" dirty="0">
                 <a:solidFill>
                   <a:srgbClr val="000000"/>
                 </a:solidFill>
@@ -25201,7 +25952,7 @@
               <a:t>: </a:t>
             </a:r>
             <a:r>
-              <a:rPr lang="en-GB" sz="800" dirty="0">
+              <a:rPr lang="en-GB" sz="1000" dirty="0">
                 <a:solidFill>
                   <a:srgbClr val="0451A5"/>
                 </a:solidFill>
@@ -25213,7 +25964,7 @@
               <a:t>"batch"</a:t>
             </a:r>
             <a:r>
-              <a:rPr lang="en-GB" sz="800" dirty="0">
+              <a:rPr lang="en-GB" sz="1000" dirty="0">
                 <a:solidFill>
                   <a:srgbClr val="000000"/>
                 </a:solidFill>
@@ -25224,7 +25975,7 @@
               </a:rPr>
               <a:t>,</a:t>
             </a:r>
-            <a:endParaRPr lang="de-DE" sz="1050" dirty="0">
+            <a:endParaRPr lang="de-DE" sz="1000" dirty="0">
               <a:effectLst/>
               <a:latin typeface="Calibri" panose="020F0502020204030204" pitchFamily="34" charset="0"/>
               <a:ea typeface="Calibri" panose="020F0502020204030204" pitchFamily="34" charset="0"/>
@@ -25241,7 +25992,7 @@
               </a:spcAft>
             </a:pPr>
             <a:r>
-              <a:rPr lang="en-GB" sz="800" dirty="0">
+              <a:rPr lang="en-GB" sz="1000" dirty="0">
                 <a:solidFill>
                   <a:srgbClr val="000000"/>
                 </a:solidFill>
@@ -25253,7 +26004,7 @@
               <a:t>        </a:t>
             </a:r>
             <a:r>
-              <a:rPr lang="en-GB" sz="800" dirty="0">
+              <a:rPr lang="en-GB" sz="1000" dirty="0">
                 <a:solidFill>
                   <a:srgbClr val="A31515"/>
                 </a:solidFill>
@@ -25265,7 +26016,7 @@
               <a:t>"mode"</a:t>
             </a:r>
             <a:r>
-              <a:rPr lang="en-GB" sz="800" dirty="0">
+              <a:rPr lang="en-GB" sz="1000" dirty="0">
                 <a:solidFill>
                   <a:srgbClr val="000000"/>
                 </a:solidFill>
@@ -25277,7 +26028,7 @@
               <a:t>: </a:t>
             </a:r>
             <a:r>
-              <a:rPr lang="en-GB" sz="800" dirty="0">
+              <a:rPr lang="en-GB" sz="1000" dirty="0">
                 <a:solidFill>
                   <a:srgbClr val="0451A5"/>
                 </a:solidFill>
@@ -25289,7 +26040,7 @@
               <a:t>"sequential"</a:t>
             </a:r>
             <a:r>
-              <a:rPr lang="en-GB" sz="800" dirty="0">
+              <a:rPr lang="en-GB" sz="1000" dirty="0">
                 <a:solidFill>
                   <a:srgbClr val="000000"/>
                 </a:solidFill>
@@ -25300,7 +26051,7 @@
               </a:rPr>
               <a:t>,</a:t>
             </a:r>
-            <a:endParaRPr lang="de-DE" sz="1050" dirty="0">
+            <a:endParaRPr lang="de-DE" sz="1000" dirty="0">
               <a:effectLst/>
               <a:latin typeface="Calibri" panose="020F0502020204030204" pitchFamily="34" charset="0"/>
               <a:ea typeface="Calibri" panose="020F0502020204030204" pitchFamily="34" charset="0"/>
@@ -25317,7 +26068,7 @@
               </a:spcAft>
             </a:pPr>
             <a:r>
-              <a:rPr lang="en-GB" sz="800" dirty="0">
+              <a:rPr lang="en-GB" sz="1000" dirty="0">
                 <a:solidFill>
                   <a:srgbClr val="000000"/>
                 </a:solidFill>
@@ -25329,7 +26080,7 @@
               <a:t>        </a:t>
             </a:r>
             <a:r>
-              <a:rPr lang="en-GB" sz="800" dirty="0">
+              <a:rPr lang="en-GB" sz="1000" dirty="0">
                 <a:solidFill>
                   <a:srgbClr val="A31515"/>
                 </a:solidFill>
@@ -25341,7 +26092,7 @@
               <a:t>"force"</a:t>
             </a:r>
             <a:r>
-              <a:rPr lang="en-GB" sz="800" dirty="0">
+              <a:rPr lang="en-GB" sz="1000" dirty="0">
                 <a:solidFill>
                   <a:srgbClr val="000000"/>
                 </a:solidFill>
@@ -25353,7 +26104,7 @@
               <a:t>: </a:t>
             </a:r>
             <a:r>
-              <a:rPr lang="en-GB" sz="800" dirty="0">
+              <a:rPr lang="en-GB" sz="1000" dirty="0">
                 <a:solidFill>
                   <a:srgbClr val="0451A5"/>
                 </a:solidFill>
@@ -25365,7 +26116,7 @@
               <a:t>false</a:t>
             </a:r>
             <a:r>
-              <a:rPr lang="en-GB" sz="800" dirty="0">
+              <a:rPr lang="en-GB" sz="1000" dirty="0">
                 <a:solidFill>
                   <a:srgbClr val="000000"/>
                 </a:solidFill>
@@ -25376,7 +26127,7 @@
               </a:rPr>
               <a:t>,</a:t>
             </a:r>
-            <a:endParaRPr lang="de-DE" sz="1050" dirty="0">
+            <a:endParaRPr lang="de-DE" sz="1000" dirty="0">
               <a:effectLst/>
               <a:latin typeface="Calibri" panose="020F0502020204030204" pitchFamily="34" charset="0"/>
               <a:ea typeface="Calibri" panose="020F0502020204030204" pitchFamily="34" charset="0"/>
@@ -25393,7 +26144,7 @@
               </a:spcAft>
             </a:pPr>
             <a:r>
-              <a:rPr lang="en-GB" sz="800" dirty="0">
+              <a:rPr lang="en-GB" sz="1000" dirty="0">
                 <a:solidFill>
                   <a:srgbClr val="000000"/>
                 </a:solidFill>
@@ -25405,7 +26156,7 @@
               <a:t>        </a:t>
             </a:r>
             <a:r>
-              <a:rPr lang="en-GB" sz="800" dirty="0">
+              <a:rPr lang="en-GB" sz="1000" dirty="0">
                 <a:solidFill>
                   <a:srgbClr val="A31515"/>
                 </a:solidFill>
@@ -25417,7 +26168,7 @@
               <a:t>"</a:t>
             </a:r>
             <a:r>
-              <a:rPr lang="en-GB" sz="800" dirty="0" err="1">
+              <a:rPr lang="en-GB" sz="1000" dirty="0" err="1">
                 <a:solidFill>
                   <a:srgbClr val="A31515"/>
                 </a:solidFill>
@@ -25429,7 +26180,7 @@
               <a:t>index_number</a:t>
             </a:r>
             <a:r>
-              <a:rPr lang="en-GB" sz="800" dirty="0">
+              <a:rPr lang="en-GB" sz="1000" dirty="0">
                 <a:solidFill>
                   <a:srgbClr val="A31515"/>
                 </a:solidFill>
@@ -25441,7 +26192,7 @@
               <a:t>"</a:t>
             </a:r>
             <a:r>
-              <a:rPr lang="en-GB" sz="800" dirty="0">
+              <a:rPr lang="en-GB" sz="1000" dirty="0">
                 <a:solidFill>
                   <a:srgbClr val="000000"/>
                 </a:solidFill>
@@ -25453,7 +26204,7 @@
               <a:t>: </a:t>
             </a:r>
             <a:r>
-              <a:rPr lang="en-GB" sz="800" dirty="0">
+              <a:rPr lang="en-GB" sz="1000" dirty="0">
                 <a:solidFill>
                   <a:srgbClr val="098658"/>
                 </a:solidFill>
@@ -25465,7 +26216,7 @@
               <a:t>1</a:t>
             </a:r>
             <a:r>
-              <a:rPr lang="en-GB" sz="800" dirty="0">
+              <a:rPr lang="en-GB" sz="1000" dirty="0">
                 <a:solidFill>
                   <a:srgbClr val="000000"/>
                 </a:solidFill>
@@ -25476,7 +26227,7 @@
               </a:rPr>
               <a:t>,</a:t>
             </a:r>
-            <a:endParaRPr lang="de-DE" sz="1050" dirty="0">
+            <a:endParaRPr lang="de-DE" sz="1000" dirty="0">
               <a:effectLst/>
               <a:latin typeface="Calibri" panose="020F0502020204030204" pitchFamily="34" charset="0"/>
               <a:ea typeface="Calibri" panose="020F0502020204030204" pitchFamily="34" charset="0"/>
@@ -25493,7 +26244,7 @@
               </a:spcAft>
             </a:pPr>
             <a:r>
-              <a:rPr lang="en-GB" sz="800" dirty="0">
+              <a:rPr lang="en-GB" sz="1000" dirty="0">
                 <a:solidFill>
                   <a:srgbClr val="000000"/>
                 </a:solidFill>
@@ -25505,7 +26256,7 @@
               <a:t>        </a:t>
             </a:r>
             <a:r>
-              <a:rPr lang="en-GB" sz="800" dirty="0">
+              <a:rPr lang="en-GB" sz="1000" dirty="0">
                 <a:solidFill>
                   <a:srgbClr val="A31515"/>
                 </a:solidFill>
@@ -25517,7 +26268,7 @@
               <a:t>"meta"</a:t>
             </a:r>
             <a:r>
-              <a:rPr lang="en-GB" sz="800" dirty="0">
+              <a:rPr lang="en-GB" sz="1000" dirty="0">
                 <a:solidFill>
                   <a:srgbClr val="000000"/>
                 </a:solidFill>
@@ -25529,7 +26280,7 @@
               <a:t>: </a:t>
             </a:r>
             <a:r>
-              <a:rPr lang="en-GB" sz="800" dirty="0">
+              <a:rPr lang="en-GB" sz="1000" dirty="0">
                 <a:solidFill>
                   <a:srgbClr val="0451A5"/>
                 </a:solidFill>
@@ -25540,7 +26291,7 @@
               </a:rPr>
               <a:t>null</a:t>
             </a:r>
-            <a:endParaRPr lang="de-DE" sz="1050" dirty="0">
+            <a:endParaRPr lang="de-DE" sz="1000" dirty="0">
               <a:effectLst/>
               <a:latin typeface="Calibri" panose="020F0502020204030204" pitchFamily="34" charset="0"/>
               <a:ea typeface="Calibri" panose="020F0502020204030204" pitchFamily="34" charset="0"/>
@@ -25557,7 +26308,7 @@
               </a:spcAft>
             </a:pPr>
             <a:r>
-              <a:rPr lang="en-GB" sz="800" dirty="0">
+              <a:rPr lang="en-GB" sz="1000" dirty="0">
                 <a:solidFill>
                   <a:srgbClr val="000000"/>
                 </a:solidFill>
@@ -25569,7 +26320,7 @@
               <a:t>    </a:t>
             </a:r>
             <a:r>
-              <a:rPr lang="de-DE" sz="800" dirty="0">
+              <a:rPr lang="de-DE" sz="1000" dirty="0">
                 <a:solidFill>
                   <a:srgbClr val="000000"/>
                 </a:solidFill>
@@ -25580,7 +26331,7 @@
               </a:rPr>
               <a:t>}</a:t>
             </a:r>
-            <a:endParaRPr lang="de-DE" sz="1050" dirty="0">
+            <a:endParaRPr lang="de-DE" sz="1000" dirty="0">
               <a:effectLst/>
               <a:latin typeface="Calibri" panose="020F0502020204030204" pitchFamily="34" charset="0"/>
               <a:ea typeface="Calibri" panose="020F0502020204030204" pitchFamily="34" charset="0"/>
@@ -25603,8 +26354,8 @@
         </p:nvSpPr>
         <p:spPr>
           <a:xfrm>
-            <a:off x="7866632" y="3575421"/>
-            <a:ext cx="3420275" cy="3316292"/>
+            <a:off x="7236216" y="3492411"/>
+            <a:ext cx="4870800" cy="3323987"/>
           </a:xfrm>
           <a:prstGeom prst="rect">
             <a:avLst/>
@@ -25635,7 +26386,7 @@
               </a:spcAft>
             </a:pPr>
             <a:r>
-              <a:rPr lang="en-GB" sz="800" dirty="0">
+              <a:rPr lang="en-GB" sz="1000" dirty="0">
                 <a:solidFill>
                   <a:srgbClr val="000000"/>
                 </a:solidFill>
@@ -25646,7 +26397,7 @@
               </a:rPr>
               <a:t>{</a:t>
             </a:r>
-            <a:endParaRPr lang="de-DE" sz="1050" dirty="0">
+            <a:endParaRPr lang="de-DE" sz="1000" dirty="0">
               <a:effectLst/>
               <a:latin typeface="Calibri" panose="020F0502020204030204" pitchFamily="34" charset="0"/>
               <a:ea typeface="Calibri" panose="020F0502020204030204" pitchFamily="34" charset="0"/>
@@ -25663,7 +26414,7 @@
               </a:spcAft>
             </a:pPr>
             <a:r>
-              <a:rPr lang="en-GB" sz="800" dirty="0">
+              <a:rPr lang="en-GB" sz="1000" dirty="0">
                 <a:solidFill>
                   <a:srgbClr val="000000"/>
                 </a:solidFill>
@@ -25675,7 +26426,7 @@
               <a:t>        </a:t>
             </a:r>
             <a:r>
-              <a:rPr lang="en-GB" sz="800" dirty="0">
+              <a:rPr lang="en-GB" sz="1000" dirty="0">
                 <a:solidFill>
                   <a:srgbClr val="A31515"/>
                 </a:solidFill>
@@ -25687,7 +26438,7 @@
               <a:t>"id"</a:t>
             </a:r>
             <a:r>
-              <a:rPr lang="en-GB" sz="800" dirty="0">
+              <a:rPr lang="en-GB" sz="1000" dirty="0">
                 <a:solidFill>
                   <a:srgbClr val="000000"/>
                 </a:solidFill>
@@ -25699,7 +26450,7 @@
               <a:t>: </a:t>
             </a:r>
             <a:r>
-              <a:rPr lang="en-GB" sz="800" dirty="0">
+              <a:rPr lang="en-GB" sz="1000" dirty="0">
                 <a:solidFill>
                   <a:srgbClr val="0451A5"/>
                 </a:solidFill>
@@ -25711,7 +26462,7 @@
               <a:t>"3853c1cc-a493-11ea-bb36-0272ac5704s3"</a:t>
             </a:r>
             <a:r>
-              <a:rPr lang="en-GB" sz="800" dirty="0">
+              <a:rPr lang="en-GB" sz="1000" dirty="0">
                 <a:solidFill>
                   <a:srgbClr val="000000"/>
                 </a:solidFill>
@@ -25722,7 +26473,7 @@
               </a:rPr>
               <a:t>,</a:t>
             </a:r>
-            <a:endParaRPr lang="de-DE" sz="1050" dirty="0">
+            <a:endParaRPr lang="de-DE" sz="1000" dirty="0">
               <a:effectLst/>
               <a:latin typeface="Calibri" panose="020F0502020204030204" pitchFamily="34" charset="0"/>
               <a:ea typeface="Calibri" panose="020F0502020204030204" pitchFamily="34" charset="0"/>
@@ -25739,7 +26490,7 @@
               </a:spcAft>
             </a:pPr>
             <a:r>
-              <a:rPr lang="en-GB" sz="800" dirty="0">
+              <a:rPr lang="en-GB" sz="1000" dirty="0">
                 <a:solidFill>
                   <a:srgbClr val="000000"/>
                 </a:solidFill>
@@ -25751,7 +26502,7 @@
               <a:t>        </a:t>
             </a:r>
             <a:r>
-              <a:rPr lang="en-GB" sz="800" dirty="0">
+              <a:rPr lang="en-GB" sz="1000" dirty="0">
                 <a:solidFill>
                   <a:srgbClr val="A31515"/>
                 </a:solidFill>
@@ -25763,7 +26514,7 @@
               <a:t>"</a:t>
             </a:r>
             <a:r>
-              <a:rPr lang="en-GB" sz="800" dirty="0" err="1">
+              <a:rPr lang="en-GB" sz="1000" dirty="0" err="1">
                 <a:solidFill>
                   <a:srgbClr val="A31515"/>
                 </a:solidFill>
@@ -25775,7 +26526,7 @@
               <a:t>group_id</a:t>
             </a:r>
             <a:r>
-              <a:rPr lang="en-GB" sz="800" dirty="0">
+              <a:rPr lang="en-GB" sz="1000" dirty="0">
                 <a:solidFill>
                   <a:srgbClr val="A31515"/>
                 </a:solidFill>
@@ -25787,7 +26538,7 @@
               <a:t>"</a:t>
             </a:r>
             <a:r>
-              <a:rPr lang="en-GB" sz="800" dirty="0">
+              <a:rPr lang="en-GB" sz="1000" dirty="0">
                 <a:solidFill>
                   <a:srgbClr val="000000"/>
                 </a:solidFill>
@@ -25799,7 +26550,7 @@
               <a:t>: </a:t>
             </a:r>
             <a:r>
-              <a:rPr lang="en-GB" sz="800" dirty="0">
+              <a:rPr lang="en-GB" sz="1000" dirty="0">
                 <a:solidFill>
                   <a:srgbClr val="0451A5"/>
                 </a:solidFill>
@@ -25811,7 +26562,7 @@
               <a:t>"</a:t>
             </a:r>
             <a:r>
-              <a:rPr lang="en-GB" sz="800" dirty="0" err="1">
+              <a:rPr lang="en-GB" sz="1000" dirty="0" err="1">
                 <a:solidFill>
                   <a:srgbClr val="0451A5"/>
                 </a:solidFill>
@@ -25823,7 +26574,7 @@
               <a:t>StrengSequenzielleTransaktion</a:t>
             </a:r>
             <a:r>
-              <a:rPr lang="en-GB" sz="800" dirty="0">
+              <a:rPr lang="en-GB" sz="1000" dirty="0">
                 <a:solidFill>
                   <a:srgbClr val="0451A5"/>
                 </a:solidFill>
@@ -25835,7 +26586,7 @@
               <a:t>"</a:t>
             </a:r>
             <a:r>
-              <a:rPr lang="en-GB" sz="800" dirty="0">
+              <a:rPr lang="en-GB" sz="1000" dirty="0">
                 <a:solidFill>
                   <a:srgbClr val="000000"/>
                 </a:solidFill>
@@ -25846,7 +26597,7 @@
               </a:rPr>
               <a:t>,</a:t>
             </a:r>
-            <a:endParaRPr lang="de-DE" sz="1050" dirty="0">
+            <a:endParaRPr lang="de-DE" sz="1000" dirty="0">
               <a:effectLst/>
               <a:latin typeface="Calibri" panose="020F0502020204030204" pitchFamily="34" charset="0"/>
               <a:ea typeface="Calibri" panose="020F0502020204030204" pitchFamily="34" charset="0"/>
@@ -25863,7 +26614,7 @@
               </a:spcAft>
             </a:pPr>
             <a:r>
-              <a:rPr lang="en-GB" sz="800" dirty="0">
+              <a:rPr lang="en-GB" sz="1000" dirty="0">
                 <a:solidFill>
                   <a:srgbClr val="000000"/>
                 </a:solidFill>
@@ -25875,7 +26626,7 @@
               <a:t>        </a:t>
             </a:r>
             <a:r>
-              <a:rPr lang="en-GB" sz="800" dirty="0">
+              <a:rPr lang="en-GB" sz="1000" dirty="0">
                 <a:solidFill>
                   <a:srgbClr val="A31515"/>
                 </a:solidFill>
@@ -25887,7 +26638,7 @@
               <a:t>"priority"</a:t>
             </a:r>
             <a:r>
-              <a:rPr lang="en-GB" sz="800" dirty="0">
+              <a:rPr lang="en-GB" sz="1000" dirty="0">
                 <a:solidFill>
                   <a:srgbClr val="000000"/>
                 </a:solidFill>
@@ -25899,7 +26650,7 @@
               <a:t>: </a:t>
             </a:r>
             <a:r>
-              <a:rPr lang="en-GB" sz="800" dirty="0">
+              <a:rPr lang="en-GB" sz="1000" dirty="0">
                 <a:solidFill>
                   <a:srgbClr val="098658"/>
                 </a:solidFill>
@@ -25911,7 +26662,7 @@
               <a:t>100</a:t>
             </a:r>
             <a:r>
-              <a:rPr lang="en-GB" sz="800" dirty="0">
+              <a:rPr lang="en-GB" sz="1000" dirty="0">
                 <a:solidFill>
                   <a:srgbClr val="000000"/>
                 </a:solidFill>
@@ -25922,7 +26673,7 @@
               </a:rPr>
               <a:t>,</a:t>
             </a:r>
-            <a:endParaRPr lang="de-DE" sz="1050" dirty="0">
+            <a:endParaRPr lang="de-DE" sz="1000" dirty="0">
               <a:effectLst/>
               <a:latin typeface="Calibri" panose="020F0502020204030204" pitchFamily="34" charset="0"/>
               <a:ea typeface="Calibri" panose="020F0502020204030204" pitchFamily="34" charset="0"/>
@@ -25939,7 +26690,7 @@
               </a:spcAft>
             </a:pPr>
             <a:r>
-              <a:rPr lang="en-GB" sz="800" dirty="0">
+              <a:rPr lang="en-GB" sz="1000" dirty="0">
                 <a:solidFill>
                   <a:srgbClr val="000000"/>
                 </a:solidFill>
@@ -25951,7 +26702,7 @@
               <a:t>        </a:t>
             </a:r>
             <a:r>
-              <a:rPr lang="en-GB" sz="800" dirty="0">
+              <a:rPr lang="en-GB" sz="1000" dirty="0">
                 <a:solidFill>
                   <a:srgbClr val="A31515"/>
                 </a:solidFill>
@@ -25963,7 +26714,7 @@
               <a:t>"deadline"</a:t>
             </a:r>
             <a:r>
-              <a:rPr lang="en-GB" sz="800" dirty="0">
+              <a:rPr lang="en-GB" sz="1000" dirty="0">
                 <a:solidFill>
                   <a:srgbClr val="000000"/>
                 </a:solidFill>
@@ -25975,7 +26726,7 @@
               <a:t>: </a:t>
             </a:r>
             <a:r>
-              <a:rPr lang="en-GB" sz="800" dirty="0">
+              <a:rPr lang="en-GB" sz="1000" dirty="0">
                 <a:solidFill>
                   <a:srgbClr val="0451A5"/>
                 </a:solidFill>
@@ -25987,7 +26738,7 @@
               <a:t>null</a:t>
             </a:r>
             <a:r>
-              <a:rPr lang="en-GB" sz="800" dirty="0">
+              <a:rPr lang="en-GB" sz="1000" dirty="0">
                 <a:solidFill>
                   <a:srgbClr val="000000"/>
                 </a:solidFill>
@@ -25998,7 +26749,7 @@
               </a:rPr>
               <a:t>,</a:t>
             </a:r>
-            <a:endParaRPr lang="de-DE" sz="1050" dirty="0">
+            <a:endParaRPr lang="de-DE" sz="1000" dirty="0">
               <a:effectLst/>
               <a:latin typeface="Calibri" panose="020F0502020204030204" pitchFamily="34" charset="0"/>
               <a:ea typeface="Calibri" panose="020F0502020204030204" pitchFamily="34" charset="0"/>
@@ -26015,7 +26766,7 @@
               </a:spcAft>
             </a:pPr>
             <a:r>
-              <a:rPr lang="en-GB" sz="800" dirty="0">
+              <a:rPr lang="en-GB" sz="1000" dirty="0">
                 <a:solidFill>
                   <a:srgbClr val="000000"/>
                 </a:solidFill>
@@ -26027,7 +26778,7 @@
               <a:t>        </a:t>
             </a:r>
             <a:r>
-              <a:rPr lang="en-GB" sz="800" dirty="0">
+              <a:rPr lang="en-GB" sz="1000" dirty="0">
                 <a:solidFill>
                   <a:srgbClr val="A31515"/>
                 </a:solidFill>
@@ -26039,7 +26790,7 @@
               <a:t>"</a:t>
             </a:r>
             <a:r>
-              <a:rPr lang="en-GB" sz="800" dirty="0" err="1">
+              <a:rPr lang="en-GB" sz="1000" dirty="0" err="1">
                 <a:solidFill>
                   <a:srgbClr val="A31515"/>
                 </a:solidFill>
@@ -26051,7 +26802,7 @@
               <a:t>active_times</a:t>
             </a:r>
             <a:r>
-              <a:rPr lang="en-GB" sz="800" dirty="0">
+              <a:rPr lang="en-GB" sz="1000" dirty="0">
                 <a:solidFill>
                   <a:srgbClr val="A31515"/>
                 </a:solidFill>
@@ -26063,7 +26814,7 @@
               <a:t>"</a:t>
             </a:r>
             <a:r>
-              <a:rPr lang="en-GB" sz="800" dirty="0">
+              <a:rPr lang="en-GB" sz="1000" dirty="0">
                 <a:solidFill>
                   <a:srgbClr val="000000"/>
                 </a:solidFill>
@@ -26074,7 +26825,7 @@
               </a:rPr>
               <a:t>: [],</a:t>
             </a:r>
-            <a:endParaRPr lang="de-DE" sz="1050" dirty="0">
+            <a:endParaRPr lang="de-DE" sz="1000" dirty="0">
               <a:effectLst/>
               <a:latin typeface="Calibri" panose="020F0502020204030204" pitchFamily="34" charset="0"/>
               <a:ea typeface="Calibri" panose="020F0502020204030204" pitchFamily="34" charset="0"/>
@@ -26091,7 +26842,7 @@
               </a:spcAft>
             </a:pPr>
             <a:r>
-              <a:rPr lang="en-GB" sz="800" dirty="0">
+              <a:rPr lang="en-GB" sz="1000" dirty="0">
                 <a:solidFill>
                   <a:srgbClr val="000000"/>
                 </a:solidFill>
@@ -26103,7 +26854,7 @@
               <a:t>        </a:t>
             </a:r>
             <a:r>
-              <a:rPr lang="en-GB" sz="800" dirty="0">
+              <a:rPr lang="en-GB" sz="1000" dirty="0">
                 <a:solidFill>
                   <a:srgbClr val="A31515"/>
                 </a:solidFill>
@@ -26115,7 +26866,7 @@
               <a:t>"</a:t>
             </a:r>
             <a:r>
-              <a:rPr lang="en-GB" sz="800" dirty="0" err="1">
+              <a:rPr lang="en-GB" sz="1000" dirty="0" err="1">
                 <a:solidFill>
                   <a:srgbClr val="A31515"/>
                 </a:solidFill>
@@ -26127,7 +26878,7 @@
               <a:t>working_days</a:t>
             </a:r>
             <a:r>
-              <a:rPr lang="en-GB" sz="800" dirty="0">
+              <a:rPr lang="en-GB" sz="1000" dirty="0">
                 <a:solidFill>
                   <a:srgbClr val="A31515"/>
                 </a:solidFill>
@@ -26139,7 +26890,7 @@
               <a:t>"</a:t>
             </a:r>
             <a:r>
-              <a:rPr lang="en-GB" sz="800" dirty="0">
+              <a:rPr lang="en-GB" sz="1000" dirty="0">
                 <a:solidFill>
                   <a:srgbClr val="000000"/>
                 </a:solidFill>
@@ -26150,7 +26901,7 @@
               </a:rPr>
               <a:t>: [</a:t>
             </a:r>
-            <a:endParaRPr lang="de-DE" sz="1050" dirty="0">
+            <a:endParaRPr lang="de-DE" sz="1000" dirty="0">
               <a:effectLst/>
               <a:latin typeface="Calibri" panose="020F0502020204030204" pitchFamily="34" charset="0"/>
               <a:ea typeface="Calibri" panose="020F0502020204030204" pitchFamily="34" charset="0"/>
@@ -26167,7 +26918,7 @@
               </a:spcAft>
             </a:pPr>
             <a:r>
-              <a:rPr lang="en-GB" sz="800" dirty="0">
+              <a:rPr lang="en-GB" sz="1000" dirty="0">
                 <a:solidFill>
                   <a:srgbClr val="000000"/>
                 </a:solidFill>
@@ -26179,7 +26930,7 @@
               <a:t>            </a:t>
             </a:r>
             <a:r>
-              <a:rPr lang="en-GB" sz="800" dirty="0">
+              <a:rPr lang="en-GB" sz="1000" dirty="0">
                 <a:solidFill>
                   <a:srgbClr val="0451A5"/>
                 </a:solidFill>
@@ -26191,7 +26942,7 @@
               <a:t>true</a:t>
             </a:r>
             <a:r>
-              <a:rPr lang="en-GB" sz="800" dirty="0">
+              <a:rPr lang="en-GB" sz="1000" dirty="0">
                 <a:solidFill>
                   <a:srgbClr val="000000"/>
                 </a:solidFill>
@@ -26202,7 +26953,7 @@
               </a:rPr>
               <a:t>,</a:t>
             </a:r>
-            <a:endParaRPr lang="de-DE" sz="1050" dirty="0">
+            <a:endParaRPr lang="de-DE" sz="1000" dirty="0">
               <a:effectLst/>
               <a:latin typeface="Calibri" panose="020F0502020204030204" pitchFamily="34" charset="0"/>
               <a:ea typeface="Calibri" panose="020F0502020204030204" pitchFamily="34" charset="0"/>
@@ -26219,7 +26970,7 @@
               </a:spcAft>
             </a:pPr>
             <a:r>
-              <a:rPr lang="en-GB" sz="800" dirty="0">
+              <a:rPr lang="en-GB" sz="1000" dirty="0">
                 <a:solidFill>
                   <a:srgbClr val="000000"/>
                 </a:solidFill>
@@ -26231,7 +26982,7 @@
               <a:t>            </a:t>
             </a:r>
             <a:r>
-              <a:rPr lang="en-GB" sz="800" dirty="0">
+              <a:rPr lang="en-GB" sz="1000" dirty="0">
                 <a:solidFill>
                   <a:srgbClr val="0451A5"/>
                 </a:solidFill>
@@ -26243,7 +26994,7 @@
               <a:t>true</a:t>
             </a:r>
             <a:r>
-              <a:rPr lang="en-GB" sz="800" dirty="0">
+              <a:rPr lang="en-GB" sz="1000" dirty="0">
                 <a:solidFill>
                   <a:srgbClr val="000000"/>
                 </a:solidFill>
@@ -26254,7 +27005,7 @@
               </a:rPr>
               <a:t>,</a:t>
             </a:r>
-            <a:endParaRPr lang="de-DE" sz="1050" dirty="0">
+            <a:endParaRPr lang="de-DE" sz="1000" dirty="0">
               <a:effectLst/>
               <a:latin typeface="Calibri" panose="020F0502020204030204" pitchFamily="34" charset="0"/>
               <a:ea typeface="Calibri" panose="020F0502020204030204" pitchFamily="34" charset="0"/>
@@ -26271,7 +27022,7 @@
               </a:spcAft>
             </a:pPr>
             <a:r>
-              <a:rPr lang="en-GB" sz="800" dirty="0">
+              <a:rPr lang="en-GB" sz="1000" dirty="0">
                 <a:solidFill>
                   <a:srgbClr val="000000"/>
                 </a:solidFill>
@@ -26283,7 +27034,7 @@
               <a:t>            </a:t>
             </a:r>
             <a:r>
-              <a:rPr lang="en-GB" sz="800" dirty="0">
+              <a:rPr lang="en-GB" sz="1000" dirty="0">
                 <a:solidFill>
                   <a:srgbClr val="0451A5"/>
                 </a:solidFill>
@@ -26295,7 +27046,7 @@
               <a:t>true</a:t>
             </a:r>
             <a:r>
-              <a:rPr lang="en-GB" sz="800" dirty="0">
+              <a:rPr lang="en-GB" sz="1000" dirty="0">
                 <a:solidFill>
                   <a:srgbClr val="000000"/>
                 </a:solidFill>
@@ -26306,7 +27057,7 @@
               </a:rPr>
               <a:t>,</a:t>
             </a:r>
-            <a:endParaRPr lang="de-DE" sz="1050" dirty="0">
+            <a:endParaRPr lang="de-DE" sz="1000" dirty="0">
               <a:effectLst/>
               <a:latin typeface="Calibri" panose="020F0502020204030204" pitchFamily="34" charset="0"/>
               <a:ea typeface="Calibri" panose="020F0502020204030204" pitchFamily="34" charset="0"/>
@@ -26323,7 +27074,7 @@
               </a:spcAft>
             </a:pPr>
             <a:r>
-              <a:rPr lang="en-GB" sz="800" dirty="0">
+              <a:rPr lang="en-GB" sz="1000" dirty="0">
                 <a:solidFill>
                   <a:srgbClr val="000000"/>
                 </a:solidFill>
@@ -26335,7 +27086,7 @@
               <a:t>            </a:t>
             </a:r>
             <a:r>
-              <a:rPr lang="en-GB" sz="800" dirty="0">
+              <a:rPr lang="en-GB" sz="1000" dirty="0">
                 <a:solidFill>
                   <a:srgbClr val="0451A5"/>
                 </a:solidFill>
@@ -26347,7 +27098,7 @@
               <a:t>true</a:t>
             </a:r>
             <a:r>
-              <a:rPr lang="en-GB" sz="800" dirty="0">
+              <a:rPr lang="en-GB" sz="1000" dirty="0">
                 <a:solidFill>
                   <a:srgbClr val="000000"/>
                 </a:solidFill>
@@ -26358,7 +27109,7 @@
               </a:rPr>
               <a:t>,</a:t>
             </a:r>
-            <a:endParaRPr lang="de-DE" sz="1050" dirty="0">
+            <a:endParaRPr lang="de-DE" sz="1000" dirty="0">
               <a:effectLst/>
               <a:latin typeface="Calibri" panose="020F0502020204030204" pitchFamily="34" charset="0"/>
               <a:ea typeface="Calibri" panose="020F0502020204030204" pitchFamily="34" charset="0"/>
@@ -26375,7 +27126,7 @@
               </a:spcAft>
             </a:pPr>
             <a:r>
-              <a:rPr lang="en-GB" sz="800" dirty="0">
+              <a:rPr lang="en-GB" sz="1000" dirty="0">
                 <a:solidFill>
                   <a:srgbClr val="000000"/>
                 </a:solidFill>
@@ -26387,7 +27138,7 @@
               <a:t>            </a:t>
             </a:r>
             <a:r>
-              <a:rPr lang="en-GB" sz="800" dirty="0">
+              <a:rPr lang="en-GB" sz="1000" dirty="0">
                 <a:solidFill>
                   <a:srgbClr val="0451A5"/>
                 </a:solidFill>
@@ -26399,7 +27150,7 @@
               <a:t>true</a:t>
             </a:r>
             <a:r>
-              <a:rPr lang="en-GB" sz="800" dirty="0">
+              <a:rPr lang="en-GB" sz="1000" dirty="0">
                 <a:solidFill>
                   <a:srgbClr val="000000"/>
                 </a:solidFill>
@@ -26410,7 +27161,7 @@
               </a:rPr>
               <a:t>,</a:t>
             </a:r>
-            <a:endParaRPr lang="de-DE" sz="1050" dirty="0">
+            <a:endParaRPr lang="de-DE" sz="1000" dirty="0">
               <a:effectLst/>
               <a:latin typeface="Calibri" panose="020F0502020204030204" pitchFamily="34" charset="0"/>
               <a:ea typeface="Calibri" panose="020F0502020204030204" pitchFamily="34" charset="0"/>
@@ -26427,7 +27178,7 @@
               </a:spcAft>
             </a:pPr>
             <a:r>
-              <a:rPr lang="en-GB" sz="800" dirty="0">
+              <a:rPr lang="en-GB" sz="1000" dirty="0">
                 <a:solidFill>
                   <a:srgbClr val="000000"/>
                 </a:solidFill>
@@ -26439,7 +27190,7 @@
               <a:t>            </a:t>
             </a:r>
             <a:r>
-              <a:rPr lang="en-GB" sz="800" dirty="0">
+              <a:rPr lang="en-GB" sz="1000" dirty="0">
                 <a:solidFill>
                   <a:srgbClr val="0451A5"/>
                 </a:solidFill>
@@ -26451,7 +27202,7 @@
               <a:t>true</a:t>
             </a:r>
             <a:r>
-              <a:rPr lang="en-GB" sz="800" dirty="0">
+              <a:rPr lang="en-GB" sz="1000" dirty="0">
                 <a:solidFill>
                   <a:srgbClr val="000000"/>
                 </a:solidFill>
@@ -26462,7 +27213,7 @@
               </a:rPr>
               <a:t>,</a:t>
             </a:r>
-            <a:endParaRPr lang="de-DE" sz="1050" dirty="0">
+            <a:endParaRPr lang="de-DE" sz="1000" dirty="0">
               <a:effectLst/>
               <a:latin typeface="Calibri" panose="020F0502020204030204" pitchFamily="34" charset="0"/>
               <a:ea typeface="Calibri" panose="020F0502020204030204" pitchFamily="34" charset="0"/>
@@ -26479,7 +27230,7 @@
               </a:spcAft>
             </a:pPr>
             <a:r>
-              <a:rPr lang="en-GB" sz="800" dirty="0">
+              <a:rPr lang="en-GB" sz="1000" dirty="0">
                 <a:solidFill>
                   <a:srgbClr val="000000"/>
                 </a:solidFill>
@@ -26491,7 +27242,7 @@
               <a:t>            </a:t>
             </a:r>
             <a:r>
-              <a:rPr lang="en-GB" sz="800" dirty="0">
+              <a:rPr lang="en-GB" sz="1000" dirty="0">
                 <a:solidFill>
                   <a:srgbClr val="0451A5"/>
                 </a:solidFill>
@@ -26502,7 +27253,7 @@
               </a:rPr>
               <a:t>true</a:t>
             </a:r>
-            <a:endParaRPr lang="de-DE" sz="1050" dirty="0">
+            <a:endParaRPr lang="de-DE" sz="1000" dirty="0">
               <a:effectLst/>
               <a:latin typeface="Calibri" panose="020F0502020204030204" pitchFamily="34" charset="0"/>
               <a:ea typeface="Calibri" panose="020F0502020204030204" pitchFamily="34" charset="0"/>
@@ -26519,7 +27270,7 @@
               </a:spcAft>
             </a:pPr>
             <a:r>
-              <a:rPr lang="en-GB" sz="800" dirty="0">
+              <a:rPr lang="en-GB" sz="1000" dirty="0">
                 <a:solidFill>
                   <a:srgbClr val="000000"/>
                 </a:solidFill>
@@ -26530,7 +27281,7 @@
               </a:rPr>
               <a:t>        ],</a:t>
             </a:r>
-            <a:endParaRPr lang="de-DE" sz="1050" dirty="0">
+            <a:endParaRPr lang="de-DE" sz="1000" dirty="0">
               <a:effectLst/>
               <a:latin typeface="Calibri" panose="020F0502020204030204" pitchFamily="34" charset="0"/>
               <a:ea typeface="Calibri" panose="020F0502020204030204" pitchFamily="34" charset="0"/>
@@ -26547,7 +27298,7 @@
               </a:spcAft>
             </a:pPr>
             <a:r>
-              <a:rPr lang="en-GB" sz="800" dirty="0">
+              <a:rPr lang="en-GB" sz="1000" dirty="0">
                 <a:solidFill>
                   <a:srgbClr val="000000"/>
                 </a:solidFill>
@@ -26559,7 +27310,7 @@
               <a:t>        </a:t>
             </a:r>
             <a:r>
-              <a:rPr lang="en-GB" sz="800" dirty="0">
+              <a:rPr lang="en-GB" sz="1000" dirty="0">
                 <a:solidFill>
                   <a:srgbClr val="A31515"/>
                 </a:solidFill>
@@ -26571,7 +27322,7 @@
               <a:t>"</a:t>
             </a:r>
             <a:r>
-              <a:rPr lang="en-GB" sz="800" dirty="0" err="1">
+              <a:rPr lang="en-GB" sz="1000" dirty="0" err="1">
                 <a:solidFill>
                   <a:srgbClr val="A31515"/>
                 </a:solidFill>
@@ -26583,7 +27334,7 @@
               <a:t>type_flag</a:t>
             </a:r>
             <a:r>
-              <a:rPr lang="en-GB" sz="800" dirty="0">
+              <a:rPr lang="en-GB" sz="1000" dirty="0">
                 <a:solidFill>
                   <a:srgbClr val="A31515"/>
                 </a:solidFill>
@@ -26595,7 +27346,7 @@
               <a:t>"</a:t>
             </a:r>
             <a:r>
-              <a:rPr lang="en-GB" sz="800" dirty="0">
+              <a:rPr lang="en-GB" sz="1000" dirty="0">
                 <a:solidFill>
                   <a:srgbClr val="000000"/>
                 </a:solidFill>
@@ -26607,7 +27358,7 @@
               <a:t>: </a:t>
             </a:r>
             <a:r>
-              <a:rPr lang="en-GB" sz="800" dirty="0">
+              <a:rPr lang="en-GB" sz="1000" dirty="0">
                 <a:solidFill>
                   <a:srgbClr val="0451A5"/>
                 </a:solidFill>
@@ -26619,7 +27370,7 @@
               <a:t>"batch"</a:t>
             </a:r>
             <a:r>
-              <a:rPr lang="en-GB" sz="800" dirty="0">
+              <a:rPr lang="en-GB" sz="1000" dirty="0">
                 <a:solidFill>
                   <a:srgbClr val="000000"/>
                 </a:solidFill>
@@ -26630,7 +27381,7 @@
               </a:rPr>
               <a:t>,</a:t>
             </a:r>
-            <a:endParaRPr lang="de-DE" sz="1050" dirty="0">
+            <a:endParaRPr lang="de-DE" sz="1000" dirty="0">
               <a:effectLst/>
               <a:latin typeface="Calibri" panose="020F0502020204030204" pitchFamily="34" charset="0"/>
               <a:ea typeface="Calibri" panose="020F0502020204030204" pitchFamily="34" charset="0"/>
@@ -26647,7 +27398,7 @@
               </a:spcAft>
             </a:pPr>
             <a:r>
-              <a:rPr lang="en-GB" sz="800" dirty="0">
+              <a:rPr lang="en-GB" sz="1000" dirty="0">
                 <a:solidFill>
                   <a:srgbClr val="000000"/>
                 </a:solidFill>
@@ -26659,7 +27410,7 @@
               <a:t>        </a:t>
             </a:r>
             <a:r>
-              <a:rPr lang="en-GB" sz="800" dirty="0">
+              <a:rPr lang="en-GB" sz="1000" dirty="0">
                 <a:solidFill>
                   <a:srgbClr val="A31515"/>
                 </a:solidFill>
@@ -26671,7 +27422,7 @@
               <a:t>"mode"</a:t>
             </a:r>
             <a:r>
-              <a:rPr lang="en-GB" sz="800" dirty="0">
+              <a:rPr lang="en-GB" sz="1000" dirty="0">
                 <a:solidFill>
                   <a:srgbClr val="000000"/>
                 </a:solidFill>
@@ -26683,7 +27434,7 @@
               <a:t>: </a:t>
             </a:r>
             <a:r>
-              <a:rPr lang="en-GB" sz="800" dirty="0">
+              <a:rPr lang="en-GB" sz="1000" dirty="0">
                 <a:solidFill>
                   <a:srgbClr val="0451A5"/>
                 </a:solidFill>
@@ -26695,7 +27446,7 @@
               <a:t>"sequential"</a:t>
             </a:r>
             <a:r>
-              <a:rPr lang="en-GB" sz="800" dirty="0">
+              <a:rPr lang="en-GB" sz="1000" dirty="0">
                 <a:solidFill>
                   <a:srgbClr val="000000"/>
                 </a:solidFill>
@@ -26706,7 +27457,7 @@
               </a:rPr>
               <a:t>,</a:t>
             </a:r>
-            <a:endParaRPr lang="de-DE" sz="1050" dirty="0">
+            <a:endParaRPr lang="de-DE" sz="1000" dirty="0">
               <a:effectLst/>
               <a:latin typeface="Calibri" panose="020F0502020204030204" pitchFamily="34" charset="0"/>
               <a:ea typeface="Calibri" panose="020F0502020204030204" pitchFamily="34" charset="0"/>
@@ -26723,7 +27474,7 @@
               </a:spcAft>
             </a:pPr>
             <a:r>
-              <a:rPr lang="en-GB" sz="800" dirty="0">
+              <a:rPr lang="en-GB" sz="1000" dirty="0">
                 <a:solidFill>
                   <a:srgbClr val="000000"/>
                 </a:solidFill>
@@ -26735,7 +27486,7 @@
               <a:t>        </a:t>
             </a:r>
             <a:r>
-              <a:rPr lang="en-GB" sz="800" dirty="0">
+              <a:rPr lang="en-GB" sz="1000" dirty="0">
                 <a:solidFill>
                   <a:srgbClr val="A31515"/>
                 </a:solidFill>
@@ -26747,7 +27498,7 @@
               <a:t>"force"</a:t>
             </a:r>
             <a:r>
-              <a:rPr lang="en-GB" sz="800" dirty="0">
+              <a:rPr lang="en-GB" sz="1000" dirty="0">
                 <a:solidFill>
                   <a:srgbClr val="000000"/>
                 </a:solidFill>
@@ -26759,7 +27510,7 @@
               <a:t>: </a:t>
             </a:r>
             <a:r>
-              <a:rPr lang="en-GB" sz="800" dirty="0">
+              <a:rPr lang="en-GB" sz="1000" dirty="0">
                 <a:solidFill>
                   <a:srgbClr val="0451A5"/>
                 </a:solidFill>
@@ -26771,7 +27522,7 @@
               <a:t>false</a:t>
             </a:r>
             <a:r>
-              <a:rPr lang="en-GB" sz="800" dirty="0">
+              <a:rPr lang="en-GB" sz="1000" dirty="0">
                 <a:solidFill>
                   <a:srgbClr val="000000"/>
                 </a:solidFill>
@@ -26782,7 +27533,7 @@
               </a:rPr>
               <a:t>,</a:t>
             </a:r>
-            <a:endParaRPr lang="de-DE" sz="1050" dirty="0">
+            <a:endParaRPr lang="de-DE" sz="1000" dirty="0">
               <a:effectLst/>
               <a:latin typeface="Calibri" panose="020F0502020204030204" pitchFamily="34" charset="0"/>
               <a:ea typeface="Calibri" panose="020F0502020204030204" pitchFamily="34" charset="0"/>
@@ -26799,7 +27550,7 @@
               </a:spcAft>
             </a:pPr>
             <a:r>
-              <a:rPr lang="en-GB" sz="800" dirty="0">
+              <a:rPr lang="en-GB" sz="1000" dirty="0">
                 <a:solidFill>
                   <a:srgbClr val="000000"/>
                 </a:solidFill>
@@ -26811,7 +27562,7 @@
               <a:t>        </a:t>
             </a:r>
             <a:r>
-              <a:rPr lang="en-GB" sz="800" dirty="0">
+              <a:rPr lang="en-GB" sz="1000" dirty="0">
                 <a:solidFill>
                   <a:srgbClr val="A31515"/>
                 </a:solidFill>
@@ -26823,7 +27574,7 @@
               <a:t>"</a:t>
             </a:r>
             <a:r>
-              <a:rPr lang="en-GB" sz="800" dirty="0" err="1">
+              <a:rPr lang="en-GB" sz="1000" dirty="0" err="1">
                 <a:solidFill>
                   <a:srgbClr val="A31515"/>
                 </a:solidFill>
@@ -26835,7 +27586,7 @@
               <a:t>index_number</a:t>
             </a:r>
             <a:r>
-              <a:rPr lang="en-GB" sz="800" dirty="0">
+              <a:rPr lang="en-GB" sz="1000" dirty="0">
                 <a:solidFill>
                   <a:srgbClr val="A31515"/>
                 </a:solidFill>
@@ -26847,7 +27598,7 @@
               <a:t>"</a:t>
             </a:r>
             <a:r>
-              <a:rPr lang="en-GB" sz="800" dirty="0">
+              <a:rPr lang="en-GB" sz="1000" dirty="0">
                 <a:solidFill>
                   <a:srgbClr val="000000"/>
                 </a:solidFill>
@@ -26859,7 +27610,7 @@
               <a:t>: </a:t>
             </a:r>
             <a:r>
-              <a:rPr lang="en-GB" sz="800" dirty="0">
+              <a:rPr lang="en-GB" sz="1000" dirty="0">
                 <a:solidFill>
                   <a:srgbClr val="098658"/>
                 </a:solidFill>
@@ -26871,7 +27622,7 @@
               <a:t>2</a:t>
             </a:r>
             <a:r>
-              <a:rPr lang="en-GB" sz="800" dirty="0">
+              <a:rPr lang="en-GB" sz="1000" dirty="0">
                 <a:solidFill>
                   <a:srgbClr val="000000"/>
                 </a:solidFill>
@@ -26882,7 +27633,7 @@
               </a:rPr>
               <a:t>,</a:t>
             </a:r>
-            <a:endParaRPr lang="de-DE" sz="1050" dirty="0">
+            <a:endParaRPr lang="de-DE" sz="1000" dirty="0">
               <a:effectLst/>
               <a:latin typeface="Calibri" panose="020F0502020204030204" pitchFamily="34" charset="0"/>
               <a:ea typeface="Calibri" panose="020F0502020204030204" pitchFamily="34" charset="0"/>
@@ -26899,7 +27650,7 @@
               </a:spcAft>
             </a:pPr>
             <a:r>
-              <a:rPr lang="en-GB" sz="800" dirty="0">
+              <a:rPr lang="en-GB" sz="1000" dirty="0">
                 <a:solidFill>
                   <a:srgbClr val="000000"/>
                 </a:solidFill>
@@ -26911,7 +27662,7 @@
               <a:t>        </a:t>
             </a:r>
             <a:r>
-              <a:rPr lang="en-GB" sz="800" dirty="0">
+              <a:rPr lang="en-GB" sz="1000" dirty="0">
                 <a:solidFill>
                   <a:srgbClr val="A31515"/>
                 </a:solidFill>
@@ -26923,7 +27674,7 @@
               <a:t>"meta"</a:t>
             </a:r>
             <a:r>
-              <a:rPr lang="en-GB" sz="800" dirty="0">
+              <a:rPr lang="en-GB" sz="1000" dirty="0">
                 <a:solidFill>
                   <a:srgbClr val="000000"/>
                 </a:solidFill>
@@ -26935,7 +27686,7 @@
               <a:t>: </a:t>
             </a:r>
             <a:r>
-              <a:rPr lang="en-GB" sz="800" dirty="0">
+              <a:rPr lang="en-GB" sz="1000" dirty="0">
                 <a:solidFill>
                   <a:srgbClr val="0451A5"/>
                 </a:solidFill>
@@ -26946,7 +27697,7 @@
               </a:rPr>
               <a:t>null</a:t>
             </a:r>
-            <a:endParaRPr lang="de-DE" sz="1050" dirty="0">
+            <a:endParaRPr lang="de-DE" sz="1000" dirty="0">
               <a:effectLst/>
               <a:latin typeface="Calibri" panose="020F0502020204030204" pitchFamily="34" charset="0"/>
               <a:ea typeface="Calibri" panose="020F0502020204030204" pitchFamily="34" charset="0"/>
@@ -26963,7 +27714,7 @@
               </a:spcAft>
             </a:pPr>
             <a:r>
-              <a:rPr lang="en-GB" sz="800" dirty="0">
+              <a:rPr lang="en-GB" sz="1000" dirty="0">
                 <a:solidFill>
                   <a:srgbClr val="000000"/>
                 </a:solidFill>
@@ -26975,7 +27726,7 @@
               <a:t>    </a:t>
             </a:r>
             <a:r>
-              <a:rPr lang="de-DE" sz="800" dirty="0">
+              <a:rPr lang="de-DE" sz="1000" dirty="0">
                 <a:solidFill>
                   <a:srgbClr val="000000"/>
                 </a:solidFill>
@@ -26986,7 +27737,7 @@
               </a:rPr>
               <a:t>}</a:t>
             </a:r>
-            <a:endParaRPr lang="de-DE" sz="1050" dirty="0">
+            <a:endParaRPr lang="de-DE" sz="1000" dirty="0">
               <a:effectLst/>
               <a:latin typeface="Calibri" panose="020F0502020204030204" pitchFamily="34" charset="0"/>
               <a:ea typeface="Calibri" panose="020F0502020204030204" pitchFamily="34" charset="0"/>
@@ -27012,8 +27763,8 @@
         </p:nvCxnSpPr>
         <p:spPr>
           <a:xfrm>
-            <a:off x="5814466" y="4393402"/>
-            <a:ext cx="2052166" cy="840165"/>
+            <a:off x="5796043" y="4570187"/>
+            <a:ext cx="1440173" cy="584218"/>
           </a:xfrm>
           <a:prstGeom prst="straightConnector1">
             <a:avLst/>
@@ -27108,8 +27859,8 @@
         </p:nvSpPr>
         <p:spPr>
           <a:xfrm>
-            <a:off x="6933511" y="80950"/>
-            <a:ext cx="1101449" cy="433633"/>
+            <a:off x="6314390" y="50996"/>
+            <a:ext cx="1292999" cy="433633"/>
           </a:xfrm>
           <a:prstGeom prst="rect">
             <a:avLst/>
@@ -27165,8 +27916,8 @@
         </p:nvSpPr>
         <p:spPr>
           <a:xfrm>
-            <a:off x="7095926" y="2361323"/>
-            <a:ext cx="637563" cy="268447"/>
+            <a:off x="6406730" y="2413108"/>
+            <a:ext cx="748440" cy="268447"/>
           </a:xfrm>
           <a:prstGeom prst="rect">
             <a:avLst/>
@@ -27217,8 +27968,8 @@
         </p:nvSpPr>
         <p:spPr>
           <a:xfrm>
-            <a:off x="7095926" y="4529767"/>
-            <a:ext cx="637563" cy="268447"/>
+            <a:off x="6436161" y="4489020"/>
+            <a:ext cx="748440" cy="268447"/>
           </a:xfrm>
           <a:prstGeom prst="rect">
             <a:avLst/>
@@ -27270,8 +28021,8 @@
         </p:nvSpPr>
         <p:spPr>
           <a:xfrm>
-            <a:off x="6765183" y="1720714"/>
-            <a:ext cx="1101449" cy="433633"/>
+            <a:off x="6096000" y="1486451"/>
+            <a:ext cx="1292999" cy="433633"/>
           </a:xfrm>
           <a:prstGeom prst="rect">
             <a:avLst/>

</xml_diff>

<commit_message>
implemented priority queue send to dispatcher with @PVahldiek
</commit_message>
<xml_diff>
--- a/docs/Präsi-Features.pptx
+++ b/docs/Präsi-Features.pptx
@@ -4,16 +4,26 @@
   <p:sldMasterIdLst>
     <p:sldMasterId id="2147483710" r:id="rId1"/>
   </p:sldMasterIdLst>
+  <p:notesMasterIdLst>
+    <p:notesMasterId r:id="rId18"/>
+  </p:notesMasterIdLst>
   <p:sldIdLst>
     <p:sldId id="256" r:id="rId2"/>
     <p:sldId id="259" r:id="rId3"/>
-    <p:sldId id="260" r:id="rId4"/>
-    <p:sldId id="262" r:id="rId5"/>
-    <p:sldId id="263" r:id="rId6"/>
-    <p:sldId id="261" r:id="rId7"/>
-    <p:sldId id="257" r:id="rId8"/>
-    <p:sldId id="264" r:id="rId9"/>
-    <p:sldId id="258" r:id="rId10"/>
+    <p:sldId id="266" r:id="rId4"/>
+    <p:sldId id="265" r:id="rId5"/>
+    <p:sldId id="268" r:id="rId6"/>
+    <p:sldId id="273" r:id="rId7"/>
+    <p:sldId id="271" r:id="rId8"/>
+    <p:sldId id="270" r:id="rId9"/>
+    <p:sldId id="269" r:id="rId10"/>
+    <p:sldId id="260" r:id="rId11"/>
+    <p:sldId id="262" r:id="rId12"/>
+    <p:sldId id="263" r:id="rId13"/>
+    <p:sldId id="261" r:id="rId14"/>
+    <p:sldId id="257" r:id="rId15"/>
+    <p:sldId id="264" r:id="rId16"/>
+    <p:sldId id="258" r:id="rId17"/>
   </p:sldIdLst>
   <p:sldSz cx="12192000" cy="6858000"/>
   <p:notesSz cx="6858000" cy="9144000"/>
@@ -120,6 +130,775 @@
 </p:presentation>
 </file>
 
+<file path=ppt/commentAuthors.xml><?xml version="1.0" encoding="utf-8"?>
+<p:cmAuthorLst xmlns:a="http://schemas.openxmlformats.org/drawingml/2006/main" xmlns:r="http://schemas.openxmlformats.org/officeDocument/2006/relationships" xmlns:p="http://schemas.openxmlformats.org/presentationml/2006/main">
+  <p:cmAuthor id="1" name="marco döll" initials="md" lastIdx="1" clrIdx="0">
+    <p:extLst>
+      <p:ext uri="{19B8F6BF-5375-455C-9EA6-DF929625EA0E}">
+        <p15:presenceInfo xmlns:p15="http://schemas.microsoft.com/office/powerpoint/2012/main" userId="6ba911338b8b8443" providerId="Windows Live"/>
+      </p:ext>
+    </p:extLst>
+  </p:cmAuthor>
+</p:cmAuthorLst>
+</file>
+
+<file path=ppt/comments/comment1.xml><?xml version="1.0" encoding="utf-8"?>
+<p:cmLst xmlns:a="http://schemas.openxmlformats.org/drawingml/2006/main" xmlns:r="http://schemas.openxmlformats.org/officeDocument/2006/relationships" xmlns:p="http://schemas.openxmlformats.org/presentationml/2006/main">
+  <p:cm authorId="1" dt="2020-07-17T12:39:15.332" idx="1">
+    <p:pos x="10" y="10"/>
+    <p:text/>
+    <p:extLst>
+      <p:ext uri="{C676402C-5697-4E1C-873F-D02D1690AC5C}">
+        <p15:threadingInfo xmlns:p15="http://schemas.microsoft.com/office/powerpoint/2012/main" timeZoneBias="-120"/>
+      </p:ext>
+    </p:extLst>
+  </p:cm>
+</p:cmLst>
+</file>
+
+<file path=ppt/notesMasters/notesMaster1.xml><?xml version="1.0" encoding="utf-8"?>
+<p:notesMaster xmlns:a="http://schemas.openxmlformats.org/drawingml/2006/main" xmlns:r="http://schemas.openxmlformats.org/officeDocument/2006/relationships" xmlns:p="http://schemas.openxmlformats.org/presentationml/2006/main">
+  <p:cSld>
+    <p:bg>
+      <p:bgRef idx="1001">
+        <a:schemeClr val="bg1"/>
+      </p:bgRef>
+    </p:bg>
+    <p:spTree>
+      <p:nvGrpSpPr>
+        <p:cNvPr id="1" name=""/>
+        <p:cNvGrpSpPr/>
+        <p:nvPr/>
+      </p:nvGrpSpPr>
+      <p:grpSpPr>
+        <a:xfrm>
+          <a:off x="0" y="0"/>
+          <a:ext cx="0" cy="0"/>
+          <a:chOff x="0" y="0"/>
+          <a:chExt cx="0" cy="0"/>
+        </a:xfrm>
+      </p:grpSpPr>
+      <p:sp>
+        <p:nvSpPr>
+          <p:cNvPr id="2" name="Kopfzeilenplatzhalter 1"/>
+          <p:cNvSpPr>
+            <a:spLocks noGrp="1"/>
+          </p:cNvSpPr>
+          <p:nvPr>
+            <p:ph type="hdr" sz="quarter"/>
+          </p:nvPr>
+        </p:nvSpPr>
+        <p:spPr>
+          <a:xfrm>
+            <a:off x="0" y="0"/>
+            <a:ext cx="2971800" cy="458788"/>
+          </a:xfrm>
+          <a:prstGeom prst="rect">
+            <a:avLst/>
+          </a:prstGeom>
+        </p:spPr>
+        <p:txBody>
+          <a:bodyPr vert="horz" lIns="91440" tIns="45720" rIns="91440" bIns="45720" rtlCol="0"/>
+          <a:lstStyle>
+            <a:lvl1pPr algn="l">
+              <a:defRPr sz="1200"/>
+            </a:lvl1pPr>
+          </a:lstStyle>
+          <a:p>
+            <a:endParaRPr lang="de-DE"/>
+          </a:p>
+        </p:txBody>
+      </p:sp>
+      <p:sp>
+        <p:nvSpPr>
+          <p:cNvPr id="3" name="Datumsplatzhalter 2"/>
+          <p:cNvSpPr>
+            <a:spLocks noGrp="1"/>
+          </p:cNvSpPr>
+          <p:nvPr>
+            <p:ph type="dt" idx="1"/>
+          </p:nvPr>
+        </p:nvSpPr>
+        <p:spPr>
+          <a:xfrm>
+            <a:off x="3884613" y="0"/>
+            <a:ext cx="2971800" cy="458788"/>
+          </a:xfrm>
+          <a:prstGeom prst="rect">
+            <a:avLst/>
+          </a:prstGeom>
+        </p:spPr>
+        <p:txBody>
+          <a:bodyPr vert="horz" lIns="91440" tIns="45720" rIns="91440" bIns="45720" rtlCol="0"/>
+          <a:lstStyle>
+            <a:lvl1pPr algn="r">
+              <a:defRPr sz="1200"/>
+            </a:lvl1pPr>
+          </a:lstStyle>
+          <a:p>
+            <a:fld id="{F03EBB41-79A5-47CE-9A5C-753F591B8C12}" type="datetimeFigureOut">
+              <a:rPr lang="de-DE" smtClean="0"/>
+              <a:t>17.07.2020</a:t>
+            </a:fld>
+            <a:endParaRPr lang="de-DE"/>
+          </a:p>
+        </p:txBody>
+      </p:sp>
+      <p:sp>
+        <p:nvSpPr>
+          <p:cNvPr id="4" name="Folienbildplatzhalter 3"/>
+          <p:cNvSpPr>
+            <a:spLocks noGrp="1" noRot="1" noChangeAspect="1"/>
+          </p:cNvSpPr>
+          <p:nvPr>
+            <p:ph type="sldImg" idx="2"/>
+          </p:nvPr>
+        </p:nvSpPr>
+        <p:spPr>
+          <a:xfrm>
+            <a:off x="685800" y="1143000"/>
+            <a:ext cx="5486400" cy="3086100"/>
+          </a:xfrm>
+          <a:prstGeom prst="rect">
+            <a:avLst/>
+          </a:prstGeom>
+          <a:noFill/>
+          <a:ln w="12700">
+            <a:solidFill>
+              <a:prstClr val="black"/>
+            </a:solidFill>
+          </a:ln>
+        </p:spPr>
+        <p:txBody>
+          <a:bodyPr vert="horz" lIns="91440" tIns="45720" rIns="91440" bIns="45720" rtlCol="0" anchor="ctr"/>
+          <a:lstStyle/>
+          <a:p>
+            <a:endParaRPr lang="de-DE"/>
+          </a:p>
+        </p:txBody>
+      </p:sp>
+      <p:sp>
+        <p:nvSpPr>
+          <p:cNvPr id="5" name="Notizenplatzhalter 4"/>
+          <p:cNvSpPr>
+            <a:spLocks noGrp="1"/>
+          </p:cNvSpPr>
+          <p:nvPr>
+            <p:ph type="body" sz="quarter" idx="3"/>
+          </p:nvPr>
+        </p:nvSpPr>
+        <p:spPr>
+          <a:xfrm>
+            <a:off x="685800" y="4400550"/>
+            <a:ext cx="5486400" cy="3600450"/>
+          </a:xfrm>
+          <a:prstGeom prst="rect">
+            <a:avLst/>
+          </a:prstGeom>
+        </p:spPr>
+        <p:txBody>
+          <a:bodyPr vert="horz" lIns="91440" tIns="45720" rIns="91440" bIns="45720" rtlCol="0"/>
+          <a:lstStyle/>
+          <a:p>
+            <a:pPr lvl="0"/>
+            <a:r>
+              <a:rPr lang="de-DE"/>
+              <a:t>Mastertextformat bearbeiten</a:t>
+            </a:r>
+          </a:p>
+          <a:p>
+            <a:pPr lvl="1"/>
+            <a:r>
+              <a:rPr lang="de-DE"/>
+              <a:t>Zweite Ebene</a:t>
+            </a:r>
+          </a:p>
+          <a:p>
+            <a:pPr lvl="2"/>
+            <a:r>
+              <a:rPr lang="de-DE"/>
+              <a:t>Dritte Ebene</a:t>
+            </a:r>
+          </a:p>
+          <a:p>
+            <a:pPr lvl="3"/>
+            <a:r>
+              <a:rPr lang="de-DE"/>
+              <a:t>Vierte Ebene</a:t>
+            </a:r>
+          </a:p>
+          <a:p>
+            <a:pPr lvl="4"/>
+            <a:r>
+              <a:rPr lang="de-DE"/>
+              <a:t>Fünfte Ebene</a:t>
+            </a:r>
+          </a:p>
+        </p:txBody>
+      </p:sp>
+      <p:sp>
+        <p:nvSpPr>
+          <p:cNvPr id="6" name="Fußzeilenplatzhalter 5"/>
+          <p:cNvSpPr>
+            <a:spLocks noGrp="1"/>
+          </p:cNvSpPr>
+          <p:nvPr>
+            <p:ph type="ftr" sz="quarter" idx="4"/>
+          </p:nvPr>
+        </p:nvSpPr>
+        <p:spPr>
+          <a:xfrm>
+            <a:off x="0" y="8685213"/>
+            <a:ext cx="2971800" cy="458787"/>
+          </a:xfrm>
+          <a:prstGeom prst="rect">
+            <a:avLst/>
+          </a:prstGeom>
+        </p:spPr>
+        <p:txBody>
+          <a:bodyPr vert="horz" lIns="91440" tIns="45720" rIns="91440" bIns="45720" rtlCol="0" anchor="b"/>
+          <a:lstStyle>
+            <a:lvl1pPr algn="l">
+              <a:defRPr sz="1200"/>
+            </a:lvl1pPr>
+          </a:lstStyle>
+          <a:p>
+            <a:endParaRPr lang="de-DE"/>
+          </a:p>
+        </p:txBody>
+      </p:sp>
+      <p:sp>
+        <p:nvSpPr>
+          <p:cNvPr id="7" name="Foliennummernplatzhalter 6"/>
+          <p:cNvSpPr>
+            <a:spLocks noGrp="1"/>
+          </p:cNvSpPr>
+          <p:nvPr>
+            <p:ph type="sldNum" sz="quarter" idx="5"/>
+          </p:nvPr>
+        </p:nvSpPr>
+        <p:spPr>
+          <a:xfrm>
+            <a:off x="3884613" y="8685213"/>
+            <a:ext cx="2971800" cy="458787"/>
+          </a:xfrm>
+          <a:prstGeom prst="rect">
+            <a:avLst/>
+          </a:prstGeom>
+        </p:spPr>
+        <p:txBody>
+          <a:bodyPr vert="horz" lIns="91440" tIns="45720" rIns="91440" bIns="45720" rtlCol="0" anchor="b"/>
+          <a:lstStyle>
+            <a:lvl1pPr algn="r">
+              <a:defRPr sz="1200"/>
+            </a:lvl1pPr>
+          </a:lstStyle>
+          <a:p>
+            <a:fld id="{39F1B0E0-87D5-4787-8FB2-5A2212936685}" type="slidenum">
+              <a:rPr lang="de-DE" smtClean="0"/>
+              <a:t>‹Nr.›</a:t>
+            </a:fld>
+            <a:endParaRPr lang="de-DE"/>
+          </a:p>
+        </p:txBody>
+      </p:sp>
+    </p:spTree>
+    <p:extLst>
+      <p:ext uri="{BB962C8B-B14F-4D97-AF65-F5344CB8AC3E}">
+        <p14:creationId xmlns:p14="http://schemas.microsoft.com/office/powerpoint/2010/main" val="2620394951"/>
+      </p:ext>
+    </p:extLst>
+  </p:cSld>
+  <p:clrMap bg1="lt1" tx1="dk1" bg2="lt2" tx2="dk2" accent1="accent1" accent2="accent2" accent3="accent3" accent4="accent4" accent5="accent5" accent6="accent6" hlink="hlink" folHlink="folHlink"/>
+  <p:notesStyle>
+    <a:lvl1pPr marL="0" algn="l" defTabSz="914400" rtl="0" eaLnBrk="1" latinLnBrk="0" hangingPunct="1">
+      <a:defRPr sz="1200" kern="1200">
+        <a:solidFill>
+          <a:schemeClr val="tx1"/>
+        </a:solidFill>
+        <a:latin typeface="+mn-lt"/>
+        <a:ea typeface="+mn-ea"/>
+        <a:cs typeface="+mn-cs"/>
+      </a:defRPr>
+    </a:lvl1pPr>
+    <a:lvl2pPr marL="457200" algn="l" defTabSz="914400" rtl="0" eaLnBrk="1" latinLnBrk="0" hangingPunct="1">
+      <a:defRPr sz="1200" kern="1200">
+        <a:solidFill>
+          <a:schemeClr val="tx1"/>
+        </a:solidFill>
+        <a:latin typeface="+mn-lt"/>
+        <a:ea typeface="+mn-ea"/>
+        <a:cs typeface="+mn-cs"/>
+      </a:defRPr>
+    </a:lvl2pPr>
+    <a:lvl3pPr marL="914400" algn="l" defTabSz="914400" rtl="0" eaLnBrk="1" latinLnBrk="0" hangingPunct="1">
+      <a:defRPr sz="1200" kern="1200">
+        <a:solidFill>
+          <a:schemeClr val="tx1"/>
+        </a:solidFill>
+        <a:latin typeface="+mn-lt"/>
+        <a:ea typeface="+mn-ea"/>
+        <a:cs typeface="+mn-cs"/>
+      </a:defRPr>
+    </a:lvl3pPr>
+    <a:lvl4pPr marL="1371600" algn="l" defTabSz="914400" rtl="0" eaLnBrk="1" latinLnBrk="0" hangingPunct="1">
+      <a:defRPr sz="1200" kern="1200">
+        <a:solidFill>
+          <a:schemeClr val="tx1"/>
+        </a:solidFill>
+        <a:latin typeface="+mn-lt"/>
+        <a:ea typeface="+mn-ea"/>
+        <a:cs typeface="+mn-cs"/>
+      </a:defRPr>
+    </a:lvl4pPr>
+    <a:lvl5pPr marL="1828800" algn="l" defTabSz="914400" rtl="0" eaLnBrk="1" latinLnBrk="0" hangingPunct="1">
+      <a:defRPr sz="1200" kern="1200">
+        <a:solidFill>
+          <a:schemeClr val="tx1"/>
+        </a:solidFill>
+        <a:latin typeface="+mn-lt"/>
+        <a:ea typeface="+mn-ea"/>
+        <a:cs typeface="+mn-cs"/>
+      </a:defRPr>
+    </a:lvl5pPr>
+    <a:lvl6pPr marL="2286000" algn="l" defTabSz="914400" rtl="0" eaLnBrk="1" latinLnBrk="0" hangingPunct="1">
+      <a:defRPr sz="1200" kern="1200">
+        <a:solidFill>
+          <a:schemeClr val="tx1"/>
+        </a:solidFill>
+        <a:latin typeface="+mn-lt"/>
+        <a:ea typeface="+mn-ea"/>
+        <a:cs typeface="+mn-cs"/>
+      </a:defRPr>
+    </a:lvl6pPr>
+    <a:lvl7pPr marL="2743200" algn="l" defTabSz="914400" rtl="0" eaLnBrk="1" latinLnBrk="0" hangingPunct="1">
+      <a:defRPr sz="1200" kern="1200">
+        <a:solidFill>
+          <a:schemeClr val="tx1"/>
+        </a:solidFill>
+        <a:latin typeface="+mn-lt"/>
+        <a:ea typeface="+mn-ea"/>
+        <a:cs typeface="+mn-cs"/>
+      </a:defRPr>
+    </a:lvl7pPr>
+    <a:lvl8pPr marL="3200400" algn="l" defTabSz="914400" rtl="0" eaLnBrk="1" latinLnBrk="0" hangingPunct="1">
+      <a:defRPr sz="1200" kern="1200">
+        <a:solidFill>
+          <a:schemeClr val="tx1"/>
+        </a:solidFill>
+        <a:latin typeface="+mn-lt"/>
+        <a:ea typeface="+mn-ea"/>
+        <a:cs typeface="+mn-cs"/>
+      </a:defRPr>
+    </a:lvl8pPr>
+    <a:lvl9pPr marL="3657600" algn="l" defTabSz="914400" rtl="0" eaLnBrk="1" latinLnBrk="0" hangingPunct="1">
+      <a:defRPr sz="1200" kern="1200">
+        <a:solidFill>
+          <a:schemeClr val="tx1"/>
+        </a:solidFill>
+        <a:latin typeface="+mn-lt"/>
+        <a:ea typeface="+mn-ea"/>
+        <a:cs typeface="+mn-cs"/>
+      </a:defRPr>
+    </a:lvl9pPr>
+  </p:notesStyle>
+</p:notesMaster>
+</file>
+
+<file path=ppt/notesSlides/notesSlide1.xml><?xml version="1.0" encoding="utf-8"?>
+<p:notes xmlns:a="http://schemas.openxmlformats.org/drawingml/2006/main" xmlns:r="http://schemas.openxmlformats.org/officeDocument/2006/relationships" xmlns:p="http://schemas.openxmlformats.org/presentationml/2006/main">
+  <p:cSld>
+    <p:spTree>
+      <p:nvGrpSpPr>
+        <p:cNvPr id="1" name=""/>
+        <p:cNvGrpSpPr/>
+        <p:nvPr/>
+      </p:nvGrpSpPr>
+      <p:grpSpPr>
+        <a:xfrm>
+          <a:off x="0" y="0"/>
+          <a:ext cx="0" cy="0"/>
+          <a:chOff x="0" y="0"/>
+          <a:chExt cx="0" cy="0"/>
+        </a:xfrm>
+      </p:grpSpPr>
+      <p:sp>
+        <p:nvSpPr>
+          <p:cNvPr id="2" name="Folienbildplatzhalter 1"/>
+          <p:cNvSpPr>
+            <a:spLocks noGrp="1" noRot="1" noChangeAspect="1"/>
+          </p:cNvSpPr>
+          <p:nvPr>
+            <p:ph type="sldImg"/>
+          </p:nvPr>
+        </p:nvSpPr>
+        <p:spPr/>
+      </p:sp>
+      <p:sp>
+        <p:nvSpPr>
+          <p:cNvPr id="3" name="Notizenplatzhalter 2"/>
+          <p:cNvSpPr>
+            <a:spLocks noGrp="1"/>
+          </p:cNvSpPr>
+          <p:nvPr>
+            <p:ph type="body" idx="1"/>
+          </p:nvPr>
+        </p:nvSpPr>
+        <p:spPr/>
+        <p:txBody>
+          <a:bodyPr/>
+          <a:lstStyle/>
+          <a:p>
+            <a:endParaRPr lang="de-DE" dirty="0"/>
+          </a:p>
+        </p:txBody>
+      </p:sp>
+      <p:sp>
+        <p:nvSpPr>
+          <p:cNvPr id="4" name="Foliennummernplatzhalter 3"/>
+          <p:cNvSpPr>
+            <a:spLocks noGrp="1"/>
+          </p:cNvSpPr>
+          <p:nvPr>
+            <p:ph type="sldNum" sz="quarter" idx="5"/>
+          </p:nvPr>
+        </p:nvSpPr>
+        <p:spPr/>
+        <p:txBody>
+          <a:bodyPr/>
+          <a:lstStyle/>
+          <a:p>
+            <a:fld id="{39F1B0E0-87D5-4787-8FB2-5A2212936685}" type="slidenum">
+              <a:rPr lang="de-DE" smtClean="0"/>
+              <a:t>1</a:t>
+            </a:fld>
+            <a:endParaRPr lang="de-DE"/>
+          </a:p>
+        </p:txBody>
+      </p:sp>
+    </p:spTree>
+    <p:extLst>
+      <p:ext uri="{BB962C8B-B14F-4D97-AF65-F5344CB8AC3E}">
+        <p14:creationId xmlns:p14="http://schemas.microsoft.com/office/powerpoint/2010/main" val="1259749976"/>
+      </p:ext>
+    </p:extLst>
+  </p:cSld>
+  <p:clrMapOvr>
+    <a:masterClrMapping/>
+  </p:clrMapOvr>
+</p:notes>
+</file>
+
+<file path=ppt/notesSlides/notesSlide2.xml><?xml version="1.0" encoding="utf-8"?>
+<p:notes xmlns:a="http://schemas.openxmlformats.org/drawingml/2006/main" xmlns:r="http://schemas.openxmlformats.org/officeDocument/2006/relationships" xmlns:p="http://schemas.openxmlformats.org/presentationml/2006/main">
+  <p:cSld>
+    <p:spTree>
+      <p:nvGrpSpPr>
+        <p:cNvPr id="1" name=""/>
+        <p:cNvGrpSpPr/>
+        <p:nvPr/>
+      </p:nvGrpSpPr>
+      <p:grpSpPr>
+        <a:xfrm>
+          <a:off x="0" y="0"/>
+          <a:ext cx="0" cy="0"/>
+          <a:chOff x="0" y="0"/>
+          <a:chExt cx="0" cy="0"/>
+        </a:xfrm>
+      </p:grpSpPr>
+      <p:sp>
+        <p:nvSpPr>
+          <p:cNvPr id="2" name="Folienbildplatzhalter 1"/>
+          <p:cNvSpPr>
+            <a:spLocks noGrp="1" noRot="1" noChangeAspect="1"/>
+          </p:cNvSpPr>
+          <p:nvPr>
+            <p:ph type="sldImg"/>
+          </p:nvPr>
+        </p:nvSpPr>
+        <p:spPr/>
+      </p:sp>
+      <p:sp>
+        <p:nvSpPr>
+          <p:cNvPr id="3" name="Notizenplatzhalter 2"/>
+          <p:cNvSpPr>
+            <a:spLocks noGrp="1"/>
+          </p:cNvSpPr>
+          <p:nvPr>
+            <p:ph type="body" idx="1"/>
+          </p:nvPr>
+        </p:nvSpPr>
+        <p:spPr/>
+        <p:txBody>
+          <a:bodyPr/>
+          <a:lstStyle/>
+          <a:p>
+            <a:r>
+              <a:rPr lang="de-DE" dirty="0"/>
+              <a:t>Wir haben von Anfang an darauf wert gelegt, eine Testabdeckung für unser Projekt zu gewährleisten. Da es als Open Source Project geplant ist, ist eine hohe Testabdeckung von extremen Vorteil, da auch unabhängige Entwickler sich am Quellcode beteiligen können und Dinge verändern können und sich trotzdem sicher sein können, durch eine automatische Testabdeckung, dass nicht alles kaputt gegangen ist. Man kann einen steilen Anstieg der Unit-Tests im Juni beobachten, zu dieser Zeit haben wir festgelegt, dass wir eine </a:t>
+            </a:r>
+            <a:r>
+              <a:rPr lang="de-DE" dirty="0" err="1"/>
+              <a:t>mindest</a:t>
+            </a:r>
+            <a:r>
+              <a:rPr lang="de-DE" dirty="0"/>
+              <a:t> Testabdeckung von 80% erreichen wollen.</a:t>
+            </a:r>
+          </a:p>
+        </p:txBody>
+      </p:sp>
+      <p:sp>
+        <p:nvSpPr>
+          <p:cNvPr id="4" name="Foliennummernplatzhalter 3"/>
+          <p:cNvSpPr>
+            <a:spLocks noGrp="1"/>
+          </p:cNvSpPr>
+          <p:nvPr>
+            <p:ph type="sldNum" sz="quarter" idx="5"/>
+          </p:nvPr>
+        </p:nvSpPr>
+        <p:spPr/>
+        <p:txBody>
+          <a:bodyPr/>
+          <a:lstStyle/>
+          <a:p>
+            <a:fld id="{39F1B0E0-87D5-4787-8FB2-5A2212936685}" type="slidenum">
+              <a:rPr lang="de-DE" smtClean="0"/>
+              <a:t>6</a:t>
+            </a:fld>
+            <a:endParaRPr lang="de-DE"/>
+          </a:p>
+        </p:txBody>
+      </p:sp>
+    </p:spTree>
+    <p:extLst>
+      <p:ext uri="{BB962C8B-B14F-4D97-AF65-F5344CB8AC3E}">
+        <p14:creationId xmlns:p14="http://schemas.microsoft.com/office/powerpoint/2010/main" val="2444092647"/>
+      </p:ext>
+    </p:extLst>
+  </p:cSld>
+  <p:clrMapOvr>
+    <a:masterClrMapping/>
+  </p:clrMapOvr>
+</p:notes>
+</file>
+
+<file path=ppt/notesSlides/notesSlide3.xml><?xml version="1.0" encoding="utf-8"?>
+<p:notes xmlns:a="http://schemas.openxmlformats.org/drawingml/2006/main" xmlns:r="http://schemas.openxmlformats.org/officeDocument/2006/relationships" xmlns:p="http://schemas.openxmlformats.org/presentationml/2006/main">
+  <p:cSld>
+    <p:spTree>
+      <p:nvGrpSpPr>
+        <p:cNvPr id="1" name=""/>
+        <p:cNvGrpSpPr/>
+        <p:nvPr/>
+      </p:nvGrpSpPr>
+      <p:grpSpPr>
+        <a:xfrm>
+          <a:off x="0" y="0"/>
+          <a:ext cx="0" cy="0"/>
+          <a:chOff x="0" y="0"/>
+          <a:chExt cx="0" cy="0"/>
+        </a:xfrm>
+      </p:grpSpPr>
+      <p:sp>
+        <p:nvSpPr>
+          <p:cNvPr id="2" name="Folienbildplatzhalter 1"/>
+          <p:cNvSpPr>
+            <a:spLocks noGrp="1" noRot="1" noChangeAspect="1"/>
+          </p:cNvSpPr>
+          <p:nvPr>
+            <p:ph type="sldImg"/>
+          </p:nvPr>
+        </p:nvSpPr>
+        <p:spPr/>
+      </p:sp>
+      <p:sp>
+        <p:nvSpPr>
+          <p:cNvPr id="3" name="Notizenplatzhalter 2"/>
+          <p:cNvSpPr>
+            <a:spLocks noGrp="1"/>
+          </p:cNvSpPr>
+          <p:nvPr>
+            <p:ph type="body" idx="1"/>
+          </p:nvPr>
+        </p:nvSpPr>
+        <p:spPr/>
+        <p:txBody>
+          <a:bodyPr/>
+          <a:lstStyle/>
+          <a:p>
+            <a:r>
+              <a:rPr lang="de-DE" dirty="0"/>
+              <a:t>Hier zeigen wir live die </a:t>
+            </a:r>
+            <a:r>
+              <a:rPr lang="de-DE" dirty="0" err="1"/>
+              <a:t>Swagger</a:t>
+            </a:r>
+            <a:r>
+              <a:rPr lang="de-DE" dirty="0"/>
+              <a:t> UI mit den entsprechenden Endpoints</a:t>
+            </a:r>
+          </a:p>
+          <a:p>
+            <a:r>
+              <a:rPr lang="de-DE" dirty="0">
+                <a:hlinkClick r:id="rId3"/>
+              </a:rPr>
+              <a:t>https://taskapi-amos.cfapps.io/swagger-ui.html</a:t>
+            </a:r>
+            <a:endParaRPr lang="de-DE" dirty="0"/>
+          </a:p>
+          <a:p>
+            <a:r>
+              <a:rPr lang="de-DE" dirty="0">
+                <a:hlinkClick r:id="rId4"/>
+              </a:rPr>
+              <a:t>https://managementapi-amos.cfapps.io/swagger-ui.html#/task-api-controller</a:t>
+            </a:r>
+            <a:endParaRPr lang="de-DE" dirty="0"/>
+          </a:p>
+          <a:p>
+            <a:r>
+              <a:rPr lang="de-DE" dirty="0">
+                <a:hlinkClick r:id="rId5"/>
+              </a:rPr>
+              <a:t>https://groupapi-amos.cfapps.io/swagger-ui.html#/group-id-api-controller</a:t>
+            </a:r>
+            <a:endParaRPr lang="de-DE" dirty="0"/>
+          </a:p>
+          <a:p>
+            <a:endParaRPr lang="de-DE" dirty="0"/>
+          </a:p>
+        </p:txBody>
+      </p:sp>
+      <p:sp>
+        <p:nvSpPr>
+          <p:cNvPr id="4" name="Foliennummernplatzhalter 3"/>
+          <p:cNvSpPr>
+            <a:spLocks noGrp="1"/>
+          </p:cNvSpPr>
+          <p:nvPr>
+            <p:ph type="sldNum" sz="quarter" idx="5"/>
+          </p:nvPr>
+        </p:nvSpPr>
+        <p:spPr/>
+        <p:txBody>
+          <a:bodyPr/>
+          <a:lstStyle/>
+          <a:p>
+            <a:fld id="{39F1B0E0-87D5-4787-8FB2-5A2212936685}" type="slidenum">
+              <a:rPr lang="de-DE" smtClean="0"/>
+              <a:t>7</a:t>
+            </a:fld>
+            <a:endParaRPr lang="de-DE"/>
+          </a:p>
+        </p:txBody>
+      </p:sp>
+    </p:spTree>
+    <p:extLst>
+      <p:ext uri="{BB962C8B-B14F-4D97-AF65-F5344CB8AC3E}">
+        <p14:creationId xmlns:p14="http://schemas.microsoft.com/office/powerpoint/2010/main" val="3403159767"/>
+      </p:ext>
+    </p:extLst>
+  </p:cSld>
+  <p:clrMapOvr>
+    <a:masterClrMapping/>
+  </p:clrMapOvr>
+</p:notes>
+</file>
+
+<file path=ppt/notesSlides/notesSlide4.xml><?xml version="1.0" encoding="utf-8"?>
+<p:notes xmlns:a="http://schemas.openxmlformats.org/drawingml/2006/main" xmlns:r="http://schemas.openxmlformats.org/officeDocument/2006/relationships" xmlns:p="http://schemas.openxmlformats.org/presentationml/2006/main">
+  <p:cSld>
+    <p:spTree>
+      <p:nvGrpSpPr>
+        <p:cNvPr id="1" name=""/>
+        <p:cNvGrpSpPr/>
+        <p:nvPr/>
+      </p:nvGrpSpPr>
+      <p:grpSpPr>
+        <a:xfrm>
+          <a:off x="0" y="0"/>
+          <a:ext cx="0" cy="0"/>
+          <a:chOff x="0" y="0"/>
+          <a:chExt cx="0" cy="0"/>
+        </a:xfrm>
+      </p:grpSpPr>
+      <p:sp>
+        <p:nvSpPr>
+          <p:cNvPr id="2" name="Folienbildplatzhalter 1"/>
+          <p:cNvSpPr>
+            <a:spLocks noGrp="1" noRot="1" noChangeAspect="1"/>
+          </p:cNvSpPr>
+          <p:nvPr>
+            <p:ph type="sldImg"/>
+          </p:nvPr>
+        </p:nvSpPr>
+        <p:spPr/>
+      </p:sp>
+      <p:sp>
+        <p:nvSpPr>
+          <p:cNvPr id="3" name="Notizenplatzhalter 2"/>
+          <p:cNvSpPr>
+            <a:spLocks noGrp="1"/>
+          </p:cNvSpPr>
+          <p:nvPr>
+            <p:ph type="body" idx="1"/>
+          </p:nvPr>
+        </p:nvSpPr>
+        <p:spPr/>
+        <p:txBody>
+          <a:bodyPr/>
+          <a:lstStyle/>
+          <a:p>
+            <a:r>
+              <a:rPr lang="de-DE" dirty="0">
+                <a:hlinkClick r:id="rId3"/>
+              </a:rPr>
+              <a:t>https://themonkeycode.weebly.com/uploads/5/3/3/5/53357177/9718231_orig.jpg</a:t>
+            </a:r>
+            <a:endParaRPr lang="de-DE" dirty="0"/>
+          </a:p>
+        </p:txBody>
+      </p:sp>
+      <p:sp>
+        <p:nvSpPr>
+          <p:cNvPr id="4" name="Foliennummernplatzhalter 3"/>
+          <p:cNvSpPr>
+            <a:spLocks noGrp="1"/>
+          </p:cNvSpPr>
+          <p:nvPr>
+            <p:ph type="sldNum" sz="quarter" idx="5"/>
+          </p:nvPr>
+        </p:nvSpPr>
+        <p:spPr/>
+        <p:txBody>
+          <a:bodyPr/>
+          <a:lstStyle/>
+          <a:p>
+            <a:fld id="{39F1B0E0-87D5-4787-8FB2-5A2212936685}" type="slidenum">
+              <a:rPr lang="de-DE" smtClean="0"/>
+              <a:t>8</a:t>
+            </a:fld>
+            <a:endParaRPr lang="de-DE"/>
+          </a:p>
+        </p:txBody>
+      </p:sp>
+    </p:spTree>
+    <p:extLst>
+      <p:ext uri="{BB962C8B-B14F-4D97-AF65-F5344CB8AC3E}">
+        <p14:creationId xmlns:p14="http://schemas.microsoft.com/office/powerpoint/2010/main" val="3922084901"/>
+      </p:ext>
+    </p:extLst>
+  </p:cSld>
+  <p:clrMapOvr>
+    <a:masterClrMapping/>
+  </p:clrMapOvr>
+</p:notes>
+</file>
+
 <file path=ppt/slideLayouts/slideLayout1.xml><?xml version="1.0" encoding="utf-8"?>
 <p:sldLayout xmlns:a="http://schemas.openxmlformats.org/drawingml/2006/main" xmlns:r="http://schemas.openxmlformats.org/officeDocument/2006/relationships" xmlns:p="http://schemas.openxmlformats.org/presentationml/2006/main" type="title" preserve="1">
   <p:cSld name="Titelfolie">
@@ -267,7 +1046,7 @@
           <a:p>
             <a:fld id="{246CB39B-5F4C-4A7E-9BE3-AAFD45576D16}" type="datetime2">
               <a:rPr lang="en-US" smtClean="0"/>
-              <a:t>Tuesday, July 14, 2020</a:t>
+              <a:t>Friday, July 17, 2020</a:t>
             </a:fld>
             <a:endParaRPr lang="en-US" dirty="0"/>
           </a:p>
@@ -471,7 +1250,7 @@
           <a:p>
             <a:fld id="{246CB39B-5F4C-4A7E-9BE3-AAFD45576D16}" type="datetime2">
               <a:rPr lang="en-US" smtClean="0"/>
-              <a:t>Tuesday, July 14, 2020</a:t>
+              <a:t>Friday, July 17, 2020</a:t>
             </a:fld>
             <a:endParaRPr lang="en-US" dirty="0"/>
           </a:p>
@@ -685,7 +1464,7 @@
           <a:p>
             <a:fld id="{246CB39B-5F4C-4A7E-9BE3-AAFD45576D16}" type="datetime2">
               <a:rPr lang="en-US" smtClean="0"/>
-              <a:t>Tuesday, July 14, 2020</a:t>
+              <a:t>Friday, July 17, 2020</a:t>
             </a:fld>
             <a:endParaRPr lang="en-US" dirty="0"/>
           </a:p>
@@ -889,7 +1668,7 @@
           <a:p>
             <a:fld id="{246CB39B-5F4C-4A7E-9BE3-AAFD45576D16}" type="datetime2">
               <a:rPr lang="en-US" smtClean="0"/>
-              <a:t>Tuesday, July 14, 2020</a:t>
+              <a:t>Friday, July 17, 2020</a:t>
             </a:fld>
             <a:endParaRPr lang="en-US" dirty="0"/>
           </a:p>
@@ -1170,7 +1949,7 @@
           <a:p>
             <a:fld id="{246CB39B-5F4C-4A7E-9BE3-AAFD45576D16}" type="datetime2">
               <a:rPr lang="en-US" smtClean="0"/>
-              <a:t>Tuesday, July 14, 2020</a:t>
+              <a:t>Friday, July 17, 2020</a:t>
             </a:fld>
             <a:endParaRPr lang="en-US" dirty="0"/>
           </a:p>
@@ -1441,7 +2220,7 @@
           <a:p>
             <a:fld id="{246CB39B-5F4C-4A7E-9BE3-AAFD45576D16}" type="datetime2">
               <a:rPr lang="en-US" smtClean="0"/>
-              <a:t>Tuesday, July 14, 2020</a:t>
+              <a:t>Friday, July 17, 2020</a:t>
             </a:fld>
             <a:endParaRPr lang="en-US" dirty="0"/>
           </a:p>
@@ -1859,7 +2638,7 @@
           <a:p>
             <a:fld id="{246CB39B-5F4C-4A7E-9BE3-AAFD45576D16}" type="datetime2">
               <a:rPr lang="en-US" smtClean="0"/>
-              <a:t>Tuesday, July 14, 2020</a:t>
+              <a:t>Friday, July 17, 2020</a:t>
             </a:fld>
             <a:endParaRPr lang="en-US" dirty="0"/>
           </a:p>
@@ -2006,7 +2785,7 @@
           <a:p>
             <a:fld id="{246CB39B-5F4C-4A7E-9BE3-AAFD45576D16}" type="datetime2">
               <a:rPr lang="en-US" smtClean="0"/>
-              <a:t>Tuesday, July 14, 2020</a:t>
+              <a:t>Friday, July 17, 2020</a:t>
             </a:fld>
             <a:endParaRPr lang="en-US" dirty="0"/>
           </a:p>
@@ -2125,7 +2904,7 @@
           <a:p>
             <a:fld id="{246CB39B-5F4C-4A7E-9BE3-AAFD45576D16}" type="datetime2">
               <a:rPr lang="en-US" smtClean="0"/>
-              <a:t>Tuesday, July 14, 2020</a:t>
+              <a:t>Friday, July 17, 2020</a:t>
             </a:fld>
             <a:endParaRPr lang="en-US" dirty="0"/>
           </a:p>
@@ -2442,7 +3221,7 @@
           <a:p>
             <a:fld id="{246CB39B-5F4C-4A7E-9BE3-AAFD45576D16}" type="datetime2">
               <a:rPr lang="en-US" smtClean="0"/>
-              <a:t>Tuesday, July 14, 2020</a:t>
+              <a:t>Friday, July 17, 2020</a:t>
             </a:fld>
             <a:endParaRPr lang="en-US" dirty="0"/>
           </a:p>
@@ -2736,7 +3515,7 @@
           <a:p>
             <a:fld id="{246CB39B-5F4C-4A7E-9BE3-AAFD45576D16}" type="datetime2">
               <a:rPr lang="en-US" smtClean="0"/>
-              <a:t>Tuesday, July 14, 2020</a:t>
+              <a:t>Friday, July 17, 2020</a:t>
             </a:fld>
             <a:endParaRPr lang="en-US" dirty="0"/>
           </a:p>
@@ -2983,7 +3762,7 @@
           <a:p>
             <a:fld id="{246CB39B-5F4C-4A7E-9BE3-AAFD45576D16}" type="datetime2">
               <a:rPr lang="en-US" smtClean="0"/>
-              <a:t>Tuesday, July 14, 2020</a:t>
+              <a:t>Friday, July 17, 2020</a:t>
             </a:fld>
             <a:endParaRPr lang="en-US" dirty="0"/>
           </a:p>
@@ -3429,7 +4208,7 @@
           <p:nvPr/>
         </p:nvPicPr>
         <p:blipFill rotWithShape="1">
-          <a:blip r:embed="rId2"/>
+          <a:blip r:embed="rId3"/>
           <a:stretch/>
         </p:blipFill>
         <p:spPr>
@@ -3638,7 +4417,7 @@
           </p:nvPr>
         </p:nvPicPr>
         <p:blipFill>
-          <a:blip r:embed="rId3">
+          <a:blip r:embed="rId4">
             <a:extLst>
               <a:ext uri="{28A0092B-C50C-407E-A947-70E740481C1C}">
                 <a14:useLocalDpi xmlns:a14="http://schemas.microsoft.com/office/drawing/2010/main" val="0"/>
@@ -3838,7 +4617,7 @@
           <p:nvPr/>
         </p:nvPicPr>
         <p:blipFill>
-          <a:blip r:embed="rId4">
+          <a:blip r:embed="rId5">
             <a:extLst>
               <a:ext uri="{28A0092B-C50C-407E-A947-70E740481C1C}">
                 <a14:useLocalDpi xmlns:a14="http://schemas.microsoft.com/office/drawing/2010/main" val="0"/>
@@ -4212,7 +4991,7 @@
           <p:nvPr/>
         </p:nvPicPr>
         <p:blipFill>
-          <a:blip r:embed="rId5">
+          <a:blip r:embed="rId6">
             <a:extLst>
               <a:ext uri="{28A0092B-C50C-407E-A947-70E740481C1C}">
                 <a14:useLocalDpi xmlns:a14="http://schemas.microsoft.com/office/drawing/2010/main" val="0"/>
@@ -4296,232 +5075,7 @@
 </p:sld>
 </file>
 
-<file path=ppt/slides/slide2.xml><?xml version="1.0" encoding="utf-8"?>
-<p:sld xmlns:a="http://schemas.openxmlformats.org/drawingml/2006/main" xmlns:r="http://schemas.openxmlformats.org/officeDocument/2006/relationships" xmlns:p="http://schemas.openxmlformats.org/presentationml/2006/main">
-  <p:cSld>
-    <p:spTree>
-      <p:nvGrpSpPr>
-        <p:cNvPr id="1" name=""/>
-        <p:cNvGrpSpPr/>
-        <p:nvPr/>
-      </p:nvGrpSpPr>
-      <p:grpSpPr>
-        <a:xfrm>
-          <a:off x="0" y="0"/>
-          <a:ext cx="0" cy="0"/>
-          <a:chOff x="0" y="0"/>
-          <a:chExt cx="0" cy="0"/>
-        </a:xfrm>
-      </p:grpSpPr>
-      <p:sp>
-        <p:nvSpPr>
-          <p:cNvPr id="2" name="Titel 1">
-            <a:extLst>
-              <a:ext uri="{FF2B5EF4-FFF2-40B4-BE49-F238E27FC236}">
-                <a16:creationId xmlns:a16="http://schemas.microsoft.com/office/drawing/2014/main" id="{CEBCA313-6F73-48E5-90C1-08F7B75AFD4C}"/>
-              </a:ext>
-            </a:extLst>
-          </p:cNvPr>
-          <p:cNvSpPr>
-            <a:spLocks noGrp="1"/>
-          </p:cNvSpPr>
-          <p:nvPr>
-            <p:ph type="title"/>
-          </p:nvPr>
-        </p:nvSpPr>
-        <p:spPr/>
-        <p:txBody>
-          <a:bodyPr/>
-          <a:lstStyle/>
-          <a:p>
-            <a:r>
-              <a:rPr lang="de-DE" dirty="0"/>
-              <a:t>Main </a:t>
-            </a:r>
-            <a:r>
-              <a:rPr lang="de-DE" dirty="0" err="1"/>
-              <a:t>features</a:t>
-            </a:r>
-            <a:endParaRPr lang="de-DE" dirty="0"/>
-          </a:p>
-        </p:txBody>
-      </p:sp>
-      <p:sp>
-        <p:nvSpPr>
-          <p:cNvPr id="3" name="Inhaltsplatzhalter 2">
-            <a:extLst>
-              <a:ext uri="{FF2B5EF4-FFF2-40B4-BE49-F238E27FC236}">
-                <a16:creationId xmlns:a16="http://schemas.microsoft.com/office/drawing/2014/main" id="{9EC4E784-8F0A-4206-9458-9DC7D69D6F7F}"/>
-              </a:ext>
-            </a:extLst>
-          </p:cNvPr>
-          <p:cNvSpPr>
-            <a:spLocks noGrp="1"/>
-          </p:cNvSpPr>
-          <p:nvPr>
-            <p:ph idx="1"/>
-          </p:nvPr>
-        </p:nvSpPr>
-        <p:spPr/>
-        <p:txBody>
-          <a:bodyPr>
-            <a:normAutofit lnSpcReduction="10000"/>
-          </a:bodyPr>
-          <a:lstStyle/>
-          <a:p>
-            <a:r>
-              <a:rPr lang="de-DE" dirty="0"/>
-              <a:t>500 </a:t>
-            </a:r>
-            <a:r>
-              <a:rPr lang="de-DE" dirty="0" err="1"/>
-              <a:t>tasks</a:t>
-            </a:r>
-            <a:r>
-              <a:rPr lang="de-DE" dirty="0"/>
-              <a:t> stress </a:t>
-            </a:r>
-            <a:r>
-              <a:rPr lang="de-DE" dirty="0" err="1"/>
-              <a:t>test</a:t>
-            </a:r>
-            <a:endParaRPr lang="de-DE" dirty="0"/>
-          </a:p>
-          <a:p>
-            <a:r>
-              <a:rPr lang="de-DE" dirty="0"/>
-              <a:t>20k stress </a:t>
-            </a:r>
-            <a:r>
-              <a:rPr lang="de-DE" dirty="0" err="1"/>
-              <a:t>test</a:t>
-            </a:r>
-            <a:endParaRPr lang="de-DE" dirty="0"/>
-          </a:p>
-          <a:p>
-            <a:r>
-              <a:rPr lang="de-DE" dirty="0"/>
-              <a:t>Working </a:t>
-            </a:r>
-            <a:r>
-              <a:rPr lang="de-DE" dirty="0" err="1"/>
-              <a:t>days</a:t>
-            </a:r>
-            <a:endParaRPr lang="de-DE" dirty="0"/>
-          </a:p>
-          <a:p>
-            <a:r>
-              <a:rPr lang="de-DE" dirty="0"/>
-              <a:t>Working </a:t>
-            </a:r>
-            <a:r>
-              <a:rPr lang="de-DE" dirty="0" err="1"/>
-              <a:t>days</a:t>
-            </a:r>
-            <a:r>
-              <a:rPr lang="de-DE" dirty="0"/>
-              <a:t> multiple </a:t>
-            </a:r>
-            <a:r>
-              <a:rPr lang="de-DE" dirty="0" err="1"/>
-              <a:t>parents</a:t>
-            </a:r>
-            <a:endParaRPr lang="de-DE" dirty="0"/>
-          </a:p>
-          <a:p>
-            <a:r>
-              <a:rPr lang="de-DE" dirty="0" err="1"/>
-              <a:t>Active</a:t>
-            </a:r>
-            <a:r>
-              <a:rPr lang="de-DE" dirty="0"/>
-              <a:t> </a:t>
-            </a:r>
-            <a:r>
-              <a:rPr lang="de-DE" dirty="0" err="1"/>
-              <a:t>times</a:t>
-            </a:r>
-            <a:r>
-              <a:rPr lang="de-DE" dirty="0"/>
-              <a:t> </a:t>
-            </a:r>
-          </a:p>
-          <a:p>
-            <a:r>
-              <a:rPr lang="de-DE" dirty="0"/>
-              <a:t>Sequentielle Transaktion</a:t>
-            </a:r>
-          </a:p>
-          <a:p>
-            <a:r>
-              <a:rPr lang="de-DE" dirty="0"/>
-              <a:t>Management </a:t>
-            </a:r>
-            <a:r>
-              <a:rPr lang="de-DE" dirty="0" err="1"/>
-              <a:t>Api</a:t>
-            </a:r>
-            <a:r>
-              <a:rPr lang="de-DE" dirty="0"/>
-              <a:t> (</a:t>
-            </a:r>
-            <a:r>
-              <a:rPr lang="de-DE" dirty="0" err="1"/>
-              <a:t>start</a:t>
-            </a:r>
-            <a:r>
-              <a:rPr lang="de-DE" dirty="0"/>
-              <a:t>, </a:t>
-            </a:r>
-            <a:r>
-              <a:rPr lang="de-DE" dirty="0" err="1"/>
-              <a:t>stop</a:t>
-            </a:r>
-            <a:r>
-              <a:rPr lang="de-DE" dirty="0"/>
-              <a:t>, release)</a:t>
-            </a:r>
-          </a:p>
-          <a:p>
-            <a:r>
-              <a:rPr lang="de-DE" dirty="0" err="1"/>
-              <a:t>Prio</a:t>
-            </a:r>
-            <a:r>
-              <a:rPr lang="de-DE" dirty="0"/>
-              <a:t> Berechnung (mittels Unit-Test)</a:t>
-            </a:r>
-          </a:p>
-          <a:p>
-            <a:r>
-              <a:rPr lang="de-DE" dirty="0"/>
-              <a:t>20k stress </a:t>
-            </a:r>
-            <a:r>
-              <a:rPr lang="de-DE" dirty="0" err="1"/>
-              <a:t>test</a:t>
-            </a:r>
-            <a:r>
-              <a:rPr lang="de-DE" dirty="0"/>
-              <a:t> Ergebnis</a:t>
-            </a:r>
-          </a:p>
-        </p:txBody>
-      </p:sp>
-    </p:spTree>
-    <p:extLst>
-      <p:ext uri="{BB962C8B-B14F-4D97-AF65-F5344CB8AC3E}">
-        <p14:creationId xmlns:p14="http://schemas.microsoft.com/office/powerpoint/2010/main" val="2503532059"/>
-      </p:ext>
-    </p:extLst>
-  </p:cSld>
-  <p:clrMapOvr>
-    <a:masterClrMapping/>
-  </p:clrMapOvr>
-</p:sld>
-</file>
-
-<file path=ppt/slides/slide3.xml><?xml version="1.0" encoding="utf-8"?>
+<file path=ppt/slides/slide10.xml><?xml version="1.0" encoding="utf-8"?>
 <p:sld xmlns:a="http://schemas.openxmlformats.org/drawingml/2006/main" xmlns:r="http://schemas.openxmlformats.org/officeDocument/2006/relationships" xmlns:p="http://schemas.openxmlformats.org/presentationml/2006/main">
   <p:cSld>
     <p:spTree>
@@ -8589,7 +9143,7 @@
 </p:sld>
 </file>
 
-<file path=ppt/slides/slide4.xml><?xml version="1.0" encoding="utf-8"?>
+<file path=ppt/slides/slide11.xml><?xml version="1.0" encoding="utf-8"?>
 <p:sld xmlns:a="http://schemas.openxmlformats.org/drawingml/2006/main" xmlns:r="http://schemas.openxmlformats.org/officeDocument/2006/relationships" xmlns:p="http://schemas.openxmlformats.org/presentationml/2006/main">
   <p:cSld>
     <p:spTree>
@@ -14049,7 +14603,7 @@
 </p:sld>
 </file>
 
-<file path=ppt/slides/slide5.xml><?xml version="1.0" encoding="utf-8"?>
+<file path=ppt/slides/slide12.xml><?xml version="1.0" encoding="utf-8"?>
 <p:sld xmlns:a="http://schemas.openxmlformats.org/drawingml/2006/main" xmlns:r="http://schemas.openxmlformats.org/officeDocument/2006/relationships" xmlns:p="http://schemas.openxmlformats.org/presentationml/2006/main">
   <p:cSld>
     <p:spTree>
@@ -19220,7 +19774,7 @@
 </p:sld>
 </file>
 
-<file path=ppt/slides/slide6.xml><?xml version="1.0" encoding="utf-8"?>
+<file path=ppt/slides/slide13.xml><?xml version="1.0" encoding="utf-8"?>
 <p:sld xmlns:a="http://schemas.openxmlformats.org/drawingml/2006/main" xmlns:r="http://schemas.openxmlformats.org/officeDocument/2006/relationships" xmlns:p="http://schemas.openxmlformats.org/presentationml/2006/main">
   <p:cSld>
     <p:spTree>
@@ -23537,7 +24091,7 @@
 </p:sld>
 </file>
 
-<file path=ppt/slides/slide7.xml><?xml version="1.0" encoding="utf-8"?>
+<file path=ppt/slides/slide14.xml><?xml version="1.0" encoding="utf-8"?>
 <p:sld xmlns:a="http://schemas.openxmlformats.org/drawingml/2006/main" xmlns:r="http://schemas.openxmlformats.org/officeDocument/2006/relationships" xmlns:p="http://schemas.openxmlformats.org/presentationml/2006/main">
   <p:cSld>
     <p:spTree>
@@ -28077,7 +28631,7 @@
 </p:sld>
 </file>
 
-<file path=ppt/slides/slide8.xml><?xml version="1.0" encoding="utf-8"?>
+<file path=ppt/slides/slide15.xml><?xml version="1.0" encoding="utf-8"?>
 <p:sld xmlns:a="http://schemas.openxmlformats.org/drawingml/2006/main" xmlns:r="http://schemas.openxmlformats.org/officeDocument/2006/relationships" xmlns:p="http://schemas.openxmlformats.org/presentationml/2006/main">
   <p:cSld>
     <p:spTree>
@@ -28170,7 +28724,7 @@
 </p:sld>
 </file>
 
-<file path=ppt/slides/slide9.xml><?xml version="1.0" encoding="utf-8"?>
+<file path=ppt/slides/slide16.xml><?xml version="1.0" encoding="utf-8"?>
 <p:sld xmlns:a="http://schemas.openxmlformats.org/drawingml/2006/main" xmlns:r="http://schemas.openxmlformats.org/officeDocument/2006/relationships" xmlns:p="http://schemas.openxmlformats.org/presentationml/2006/main">
   <p:cSld>
     <p:spTree>
@@ -28301,6 +28855,3174 @@
   <p:clrMapOvr>
     <a:masterClrMapping/>
   </p:clrMapOvr>
+</p:sld>
+</file>
+
+<file path=ppt/slides/slide2.xml><?xml version="1.0" encoding="utf-8"?>
+<p:sld xmlns:a="http://schemas.openxmlformats.org/drawingml/2006/main" xmlns:r="http://schemas.openxmlformats.org/officeDocument/2006/relationships" xmlns:p="http://schemas.openxmlformats.org/presentationml/2006/main">
+  <p:cSld>
+    <p:spTree>
+      <p:nvGrpSpPr>
+        <p:cNvPr id="1" name=""/>
+        <p:cNvGrpSpPr/>
+        <p:nvPr/>
+      </p:nvGrpSpPr>
+      <p:grpSpPr>
+        <a:xfrm>
+          <a:off x="0" y="0"/>
+          <a:ext cx="0" cy="0"/>
+          <a:chOff x="0" y="0"/>
+          <a:chExt cx="0" cy="0"/>
+        </a:xfrm>
+      </p:grpSpPr>
+      <p:sp>
+        <p:nvSpPr>
+          <p:cNvPr id="2" name="Titel 1">
+            <a:extLst>
+              <a:ext uri="{FF2B5EF4-FFF2-40B4-BE49-F238E27FC236}">
+                <a16:creationId xmlns:a16="http://schemas.microsoft.com/office/drawing/2014/main" id="{CEBCA313-6F73-48E5-90C1-08F7B75AFD4C}"/>
+              </a:ext>
+            </a:extLst>
+          </p:cNvPr>
+          <p:cNvSpPr>
+            <a:spLocks noGrp="1"/>
+          </p:cNvSpPr>
+          <p:nvPr>
+            <p:ph type="title"/>
+          </p:nvPr>
+        </p:nvSpPr>
+        <p:spPr/>
+        <p:txBody>
+          <a:bodyPr/>
+          <a:lstStyle/>
+          <a:p>
+            <a:r>
+              <a:rPr lang="de-DE" dirty="0"/>
+              <a:t>Main </a:t>
+            </a:r>
+            <a:r>
+              <a:rPr lang="de-DE" dirty="0" err="1"/>
+              <a:t>features</a:t>
+            </a:r>
+            <a:endParaRPr lang="de-DE" dirty="0"/>
+          </a:p>
+        </p:txBody>
+      </p:sp>
+      <p:sp>
+        <p:nvSpPr>
+          <p:cNvPr id="3" name="Inhaltsplatzhalter 2">
+            <a:extLst>
+              <a:ext uri="{FF2B5EF4-FFF2-40B4-BE49-F238E27FC236}">
+                <a16:creationId xmlns:a16="http://schemas.microsoft.com/office/drawing/2014/main" id="{9EC4E784-8F0A-4206-9458-9DC7D69D6F7F}"/>
+              </a:ext>
+            </a:extLst>
+          </p:cNvPr>
+          <p:cNvSpPr>
+            <a:spLocks noGrp="1"/>
+          </p:cNvSpPr>
+          <p:nvPr>
+            <p:ph idx="1"/>
+          </p:nvPr>
+        </p:nvSpPr>
+        <p:spPr/>
+        <p:txBody>
+          <a:bodyPr>
+            <a:normAutofit lnSpcReduction="10000"/>
+          </a:bodyPr>
+          <a:lstStyle/>
+          <a:p>
+            <a:r>
+              <a:rPr lang="de-DE" dirty="0"/>
+              <a:t>500 </a:t>
+            </a:r>
+            <a:r>
+              <a:rPr lang="de-DE" dirty="0" err="1"/>
+              <a:t>tasks</a:t>
+            </a:r>
+            <a:r>
+              <a:rPr lang="de-DE" dirty="0"/>
+              <a:t> stress </a:t>
+            </a:r>
+            <a:r>
+              <a:rPr lang="de-DE" dirty="0" err="1"/>
+              <a:t>test</a:t>
+            </a:r>
+            <a:endParaRPr lang="de-DE" dirty="0"/>
+          </a:p>
+          <a:p>
+            <a:r>
+              <a:rPr lang="de-DE" dirty="0"/>
+              <a:t>20k stress </a:t>
+            </a:r>
+            <a:r>
+              <a:rPr lang="de-DE" dirty="0" err="1"/>
+              <a:t>test</a:t>
+            </a:r>
+            <a:endParaRPr lang="de-DE" dirty="0"/>
+          </a:p>
+          <a:p>
+            <a:r>
+              <a:rPr lang="de-DE" dirty="0"/>
+              <a:t>Working </a:t>
+            </a:r>
+            <a:r>
+              <a:rPr lang="de-DE" dirty="0" err="1"/>
+              <a:t>days</a:t>
+            </a:r>
+            <a:endParaRPr lang="de-DE" dirty="0"/>
+          </a:p>
+          <a:p>
+            <a:r>
+              <a:rPr lang="de-DE" dirty="0"/>
+              <a:t>Working </a:t>
+            </a:r>
+            <a:r>
+              <a:rPr lang="de-DE" dirty="0" err="1"/>
+              <a:t>days</a:t>
+            </a:r>
+            <a:r>
+              <a:rPr lang="de-DE" dirty="0"/>
+              <a:t> multiple </a:t>
+            </a:r>
+            <a:r>
+              <a:rPr lang="de-DE" dirty="0" err="1"/>
+              <a:t>parents</a:t>
+            </a:r>
+            <a:endParaRPr lang="de-DE" dirty="0"/>
+          </a:p>
+          <a:p>
+            <a:r>
+              <a:rPr lang="de-DE" dirty="0" err="1"/>
+              <a:t>Active</a:t>
+            </a:r>
+            <a:r>
+              <a:rPr lang="de-DE" dirty="0"/>
+              <a:t> </a:t>
+            </a:r>
+            <a:r>
+              <a:rPr lang="de-DE" dirty="0" err="1"/>
+              <a:t>times</a:t>
+            </a:r>
+            <a:r>
+              <a:rPr lang="de-DE" dirty="0"/>
+              <a:t> </a:t>
+            </a:r>
+          </a:p>
+          <a:p>
+            <a:r>
+              <a:rPr lang="de-DE" dirty="0"/>
+              <a:t>Sequentielle Transaktion</a:t>
+            </a:r>
+          </a:p>
+          <a:p>
+            <a:r>
+              <a:rPr lang="de-DE" dirty="0"/>
+              <a:t>Management </a:t>
+            </a:r>
+            <a:r>
+              <a:rPr lang="de-DE" dirty="0" err="1"/>
+              <a:t>Api</a:t>
+            </a:r>
+            <a:r>
+              <a:rPr lang="de-DE" dirty="0"/>
+              <a:t> (</a:t>
+            </a:r>
+            <a:r>
+              <a:rPr lang="de-DE" dirty="0" err="1"/>
+              <a:t>start</a:t>
+            </a:r>
+            <a:r>
+              <a:rPr lang="de-DE" dirty="0"/>
+              <a:t>, </a:t>
+            </a:r>
+            <a:r>
+              <a:rPr lang="de-DE" dirty="0" err="1"/>
+              <a:t>stop</a:t>
+            </a:r>
+            <a:r>
+              <a:rPr lang="de-DE" dirty="0"/>
+              <a:t>, release)</a:t>
+            </a:r>
+          </a:p>
+          <a:p>
+            <a:r>
+              <a:rPr lang="de-DE" dirty="0" err="1"/>
+              <a:t>Prio</a:t>
+            </a:r>
+            <a:r>
+              <a:rPr lang="de-DE" dirty="0"/>
+              <a:t> Berechnung (mittels Unit-Test)</a:t>
+            </a:r>
+          </a:p>
+          <a:p>
+            <a:r>
+              <a:rPr lang="de-DE" dirty="0"/>
+              <a:t>20k stress </a:t>
+            </a:r>
+            <a:r>
+              <a:rPr lang="de-DE" dirty="0" err="1"/>
+              <a:t>test</a:t>
+            </a:r>
+            <a:r>
+              <a:rPr lang="de-DE" dirty="0"/>
+              <a:t> Ergebnis</a:t>
+            </a:r>
+          </a:p>
+        </p:txBody>
+      </p:sp>
+    </p:spTree>
+    <p:extLst>
+      <p:ext uri="{BB962C8B-B14F-4D97-AF65-F5344CB8AC3E}">
+        <p14:creationId xmlns:p14="http://schemas.microsoft.com/office/powerpoint/2010/main" val="2503532059"/>
+      </p:ext>
+    </p:extLst>
+  </p:cSld>
+  <p:clrMapOvr>
+    <a:masterClrMapping/>
+  </p:clrMapOvr>
+</p:sld>
+</file>
+
+<file path=ppt/slides/slide3.xml><?xml version="1.0" encoding="utf-8"?>
+<p:sld xmlns:a="http://schemas.openxmlformats.org/drawingml/2006/main" xmlns:r="http://schemas.openxmlformats.org/officeDocument/2006/relationships" xmlns:p="http://schemas.openxmlformats.org/presentationml/2006/main">
+  <p:cSld>
+    <p:bg>
+      <p:bgPr>
+        <a:solidFill>
+          <a:schemeClr val="bg1"/>
+        </a:solidFill>
+        <a:effectLst/>
+      </p:bgPr>
+    </p:bg>
+    <p:spTree>
+      <p:nvGrpSpPr>
+        <p:cNvPr id="1" name=""/>
+        <p:cNvGrpSpPr/>
+        <p:nvPr/>
+      </p:nvGrpSpPr>
+      <p:grpSpPr>
+        <a:xfrm>
+          <a:off x="0" y="0"/>
+          <a:ext cx="0" cy="0"/>
+          <a:chOff x="0" y="0"/>
+          <a:chExt cx="0" cy="0"/>
+        </a:xfrm>
+      </p:grpSpPr>
+      <p:sp>
+        <p:nvSpPr>
+          <p:cNvPr id="17" name="Rectangle 14">
+            <a:extLst>
+              <a:ext uri="{FF2B5EF4-FFF2-40B4-BE49-F238E27FC236}">
+                <a16:creationId xmlns:a16="http://schemas.microsoft.com/office/drawing/2014/main" id="{42A4FC2C-047E-45A5-965D-8E1E3BF09BC6}"/>
+              </a:ext>
+              <a:ext uri="{C183D7F6-B498-43B3-948B-1728B52AA6E4}">
+                <adec:decorative xmlns:adec="http://schemas.microsoft.com/office/drawing/2017/decorative" val="1"/>
+              </a:ext>
+            </a:extLst>
+          </p:cNvPr>
+          <p:cNvSpPr>
+            <a:spLocks noGrp="1" noRot="1" noChangeAspect="1" noMove="1" noResize="1" noEditPoints="1" noAdjustHandles="1" noChangeArrowheads="1" noChangeShapeType="1" noTextEdit="1"/>
+          </p:cNvSpPr>
+          <p:nvPr>
+            <p:extLst>
+              <p:ext uri="{386F3935-93C4-4BCD-93E2-E3B085C9AB24}">
+                <p16:designElem xmlns:p16="http://schemas.microsoft.com/office/powerpoint/2015/main" val="1"/>
+              </p:ext>
+            </p:extLst>
+          </p:nvPr>
+        </p:nvSpPr>
+        <p:spPr bwMode="white">
+          <a:xfrm>
+            <a:off x="1524" y="0"/>
+            <a:ext cx="12188952" cy="6858000"/>
+          </a:xfrm>
+          <a:prstGeom prst="rect">
+            <a:avLst/>
+          </a:prstGeom>
+          <a:noFill/>
+          <a:ln>
+            <a:noFill/>
+          </a:ln>
+        </p:spPr>
+        <p:style>
+          <a:lnRef idx="2">
+            <a:schemeClr val="accent1">
+              <a:shade val="50000"/>
+            </a:schemeClr>
+          </a:lnRef>
+          <a:fillRef idx="1">
+            <a:schemeClr val="accent1"/>
+          </a:fillRef>
+          <a:effectRef idx="0">
+            <a:schemeClr val="accent1"/>
+          </a:effectRef>
+          <a:fontRef idx="minor">
+            <a:schemeClr val="lt1"/>
+          </a:fontRef>
+        </p:style>
+        <p:txBody>
+          <a:bodyPr rtlCol="0" anchor="ctr"/>
+          <a:lstStyle>
+            <a:defPPr>
+              <a:defRPr lang="en-US"/>
+            </a:defPPr>
+            <a:lvl1pPr marL="0" algn="l" defTabSz="914400" rtl="0" eaLnBrk="1" latinLnBrk="0" hangingPunct="1">
+              <a:defRPr sz="1800" kern="1200">
+                <a:solidFill>
+                  <a:schemeClr val="lt1"/>
+                </a:solidFill>
+                <a:latin typeface="+mn-lt"/>
+                <a:ea typeface="+mn-ea"/>
+                <a:cs typeface="+mn-cs"/>
+              </a:defRPr>
+            </a:lvl1pPr>
+            <a:lvl2pPr marL="457200" algn="l" defTabSz="914400" rtl="0" eaLnBrk="1" latinLnBrk="0" hangingPunct="1">
+              <a:defRPr sz="1800" kern="1200">
+                <a:solidFill>
+                  <a:schemeClr val="lt1"/>
+                </a:solidFill>
+                <a:latin typeface="+mn-lt"/>
+                <a:ea typeface="+mn-ea"/>
+                <a:cs typeface="+mn-cs"/>
+              </a:defRPr>
+            </a:lvl2pPr>
+            <a:lvl3pPr marL="914400" algn="l" defTabSz="914400" rtl="0" eaLnBrk="1" latinLnBrk="0" hangingPunct="1">
+              <a:defRPr sz="1800" kern="1200">
+                <a:solidFill>
+                  <a:schemeClr val="lt1"/>
+                </a:solidFill>
+                <a:latin typeface="+mn-lt"/>
+                <a:ea typeface="+mn-ea"/>
+                <a:cs typeface="+mn-cs"/>
+              </a:defRPr>
+            </a:lvl3pPr>
+            <a:lvl4pPr marL="1371600" algn="l" defTabSz="914400" rtl="0" eaLnBrk="1" latinLnBrk="0" hangingPunct="1">
+              <a:defRPr sz="1800" kern="1200">
+                <a:solidFill>
+                  <a:schemeClr val="lt1"/>
+                </a:solidFill>
+                <a:latin typeface="+mn-lt"/>
+                <a:ea typeface="+mn-ea"/>
+                <a:cs typeface="+mn-cs"/>
+              </a:defRPr>
+            </a:lvl4pPr>
+            <a:lvl5pPr marL="1828800" algn="l" defTabSz="914400" rtl="0" eaLnBrk="1" latinLnBrk="0" hangingPunct="1">
+              <a:defRPr sz="1800" kern="1200">
+                <a:solidFill>
+                  <a:schemeClr val="lt1"/>
+                </a:solidFill>
+                <a:latin typeface="+mn-lt"/>
+                <a:ea typeface="+mn-ea"/>
+                <a:cs typeface="+mn-cs"/>
+              </a:defRPr>
+            </a:lvl5pPr>
+            <a:lvl6pPr marL="2286000" algn="l" defTabSz="914400" rtl="0" eaLnBrk="1" latinLnBrk="0" hangingPunct="1">
+              <a:defRPr sz="1800" kern="1200">
+                <a:solidFill>
+                  <a:schemeClr val="lt1"/>
+                </a:solidFill>
+                <a:latin typeface="+mn-lt"/>
+                <a:ea typeface="+mn-ea"/>
+                <a:cs typeface="+mn-cs"/>
+              </a:defRPr>
+            </a:lvl6pPr>
+            <a:lvl7pPr marL="2743200" algn="l" defTabSz="914400" rtl="0" eaLnBrk="1" latinLnBrk="0" hangingPunct="1">
+              <a:defRPr sz="1800" kern="1200">
+                <a:solidFill>
+                  <a:schemeClr val="lt1"/>
+                </a:solidFill>
+                <a:latin typeface="+mn-lt"/>
+                <a:ea typeface="+mn-ea"/>
+                <a:cs typeface="+mn-cs"/>
+              </a:defRPr>
+            </a:lvl7pPr>
+            <a:lvl8pPr marL="3200400" algn="l" defTabSz="914400" rtl="0" eaLnBrk="1" latinLnBrk="0" hangingPunct="1">
+              <a:defRPr sz="1800" kern="1200">
+                <a:solidFill>
+                  <a:schemeClr val="lt1"/>
+                </a:solidFill>
+                <a:latin typeface="+mn-lt"/>
+                <a:ea typeface="+mn-ea"/>
+                <a:cs typeface="+mn-cs"/>
+              </a:defRPr>
+            </a:lvl8pPr>
+            <a:lvl9pPr marL="3657600" algn="l" defTabSz="914400" rtl="0" eaLnBrk="1" latinLnBrk="0" hangingPunct="1">
+              <a:defRPr sz="1800" kern="1200">
+                <a:solidFill>
+                  <a:schemeClr val="lt1"/>
+                </a:solidFill>
+                <a:latin typeface="+mn-lt"/>
+                <a:ea typeface="+mn-ea"/>
+                <a:cs typeface="+mn-cs"/>
+              </a:defRPr>
+            </a:lvl9pPr>
+          </a:lstStyle>
+          <a:p>
+            <a:pPr algn="ctr"/>
+            <a:endParaRPr lang="en-US"/>
+          </a:p>
+        </p:txBody>
+      </p:sp>
+      <p:pic>
+        <p:nvPicPr>
+          <p:cNvPr id="7" name="Grafik 6">
+            <a:extLst>
+              <a:ext uri="{FF2B5EF4-FFF2-40B4-BE49-F238E27FC236}">
+                <a16:creationId xmlns:a16="http://schemas.microsoft.com/office/drawing/2014/main" id="{4CB893E5-EE8C-4D89-8405-7F738FABEBDD}"/>
+              </a:ext>
+            </a:extLst>
+          </p:cNvPr>
+          <p:cNvPicPr>
+            <a:picLocks noChangeAspect="1"/>
+          </p:cNvPicPr>
+          <p:nvPr/>
+        </p:nvPicPr>
+        <p:blipFill rotWithShape="1">
+          <a:blip r:embed="rId2"/>
+          <a:srcRect r="362" b="-2"/>
+          <a:stretch/>
+        </p:blipFill>
+        <p:spPr>
+          <a:xfrm>
+            <a:off x="0" y="0"/>
+            <a:ext cx="12188952" cy="6858000"/>
+          </a:xfrm>
+          <a:prstGeom prst="rect">
+            <a:avLst/>
+          </a:prstGeom>
+        </p:spPr>
+      </p:pic>
+    </p:spTree>
+    <p:extLst>
+      <p:ext uri="{BB962C8B-B14F-4D97-AF65-F5344CB8AC3E}">
+        <p14:creationId xmlns:p14="http://schemas.microsoft.com/office/powerpoint/2010/main" val="436257386"/>
+      </p:ext>
+    </p:extLst>
+  </p:cSld>
+  <p:clrMapOvr>
+    <a:masterClrMapping/>
+  </p:clrMapOvr>
+</p:sld>
+</file>
+
+<file path=ppt/slides/slide4.xml><?xml version="1.0" encoding="utf-8"?>
+<p:sld xmlns:a="http://schemas.openxmlformats.org/drawingml/2006/main" xmlns:r="http://schemas.openxmlformats.org/officeDocument/2006/relationships" xmlns:p="http://schemas.openxmlformats.org/presentationml/2006/main">
+  <p:cSld>
+    <p:spTree>
+      <p:nvGrpSpPr>
+        <p:cNvPr id="1" name=""/>
+        <p:cNvGrpSpPr/>
+        <p:nvPr/>
+      </p:nvGrpSpPr>
+      <p:grpSpPr>
+        <a:xfrm>
+          <a:off x="0" y="0"/>
+          <a:ext cx="0" cy="0"/>
+          <a:chOff x="0" y="0"/>
+          <a:chExt cx="0" cy="0"/>
+        </a:xfrm>
+      </p:grpSpPr>
+      <p:pic>
+        <p:nvPicPr>
+          <p:cNvPr id="5" name="Grafik 4" descr="Ein Bild, das Text, Karte enthält.&#10;&#10;Automatisch generierte Beschreibung">
+            <a:extLst>
+              <a:ext uri="{FF2B5EF4-FFF2-40B4-BE49-F238E27FC236}">
+                <a16:creationId xmlns:a16="http://schemas.microsoft.com/office/drawing/2014/main" id="{6169775E-DC63-4970-A3D7-DE574EC41328}"/>
+              </a:ext>
+            </a:extLst>
+          </p:cNvPr>
+          <p:cNvPicPr>
+            <a:picLocks noChangeAspect="1"/>
+          </p:cNvPicPr>
+          <p:nvPr/>
+        </p:nvPicPr>
+        <p:blipFill>
+          <a:blip r:embed="rId2">
+            <a:extLst>
+              <a:ext uri="{28A0092B-C50C-407E-A947-70E740481C1C}">
+                <a14:useLocalDpi xmlns:a14="http://schemas.microsoft.com/office/drawing/2010/main" val="0"/>
+              </a:ext>
+            </a:extLst>
+          </a:blip>
+          <a:stretch>
+            <a:fillRect/>
+          </a:stretch>
+        </p:blipFill>
+        <p:spPr>
+          <a:xfrm>
+            <a:off x="517042" y="0"/>
+            <a:ext cx="11157915" cy="6858000"/>
+          </a:xfrm>
+          <a:prstGeom prst="rect">
+            <a:avLst/>
+          </a:prstGeom>
+        </p:spPr>
+      </p:pic>
+      <p:sp>
+        <p:nvSpPr>
+          <p:cNvPr id="11" name="Ellipse 10">
+            <a:extLst>
+              <a:ext uri="{FF2B5EF4-FFF2-40B4-BE49-F238E27FC236}">
+                <a16:creationId xmlns:a16="http://schemas.microsoft.com/office/drawing/2014/main" id="{9F3446E3-7E2A-461D-96C5-F20341A4BF25}"/>
+              </a:ext>
+            </a:extLst>
+          </p:cNvPr>
+          <p:cNvSpPr/>
+          <p:nvPr/>
+        </p:nvSpPr>
+        <p:spPr>
+          <a:xfrm>
+            <a:off x="3313651" y="402672"/>
+            <a:ext cx="4387443" cy="3649211"/>
+          </a:xfrm>
+          <a:prstGeom prst="ellipse">
+            <a:avLst/>
+          </a:prstGeom>
+          <a:noFill/>
+          <a:ln w="57150">
+            <a:solidFill>
+              <a:srgbClr val="FF0000"/>
+            </a:solidFill>
+          </a:ln>
+        </p:spPr>
+        <p:style>
+          <a:lnRef idx="2">
+            <a:schemeClr val="accent1">
+              <a:shade val="50000"/>
+            </a:schemeClr>
+          </a:lnRef>
+          <a:fillRef idx="1">
+            <a:schemeClr val="accent1"/>
+          </a:fillRef>
+          <a:effectRef idx="0">
+            <a:schemeClr val="accent1"/>
+          </a:effectRef>
+          <a:fontRef idx="minor">
+            <a:schemeClr val="lt1"/>
+          </a:fontRef>
+        </p:style>
+        <p:txBody>
+          <a:bodyPr rtlCol="0" anchor="ctr"/>
+          <a:lstStyle/>
+          <a:p>
+            <a:pPr algn="ctr"/>
+            <a:endParaRPr lang="de-DE"/>
+          </a:p>
+        </p:txBody>
+      </p:sp>
+      <p:sp>
+        <p:nvSpPr>
+          <p:cNvPr id="15" name="Rechteck 14">
+            <a:extLst>
+              <a:ext uri="{FF2B5EF4-FFF2-40B4-BE49-F238E27FC236}">
+                <a16:creationId xmlns:a16="http://schemas.microsoft.com/office/drawing/2014/main" id="{114AA7AB-1FC0-4EF6-B2EA-8E82873BC34F}"/>
+              </a:ext>
+            </a:extLst>
+          </p:cNvPr>
+          <p:cNvSpPr/>
+          <p:nvPr/>
+        </p:nvSpPr>
+        <p:spPr>
+          <a:xfrm>
+            <a:off x="8029661" y="1838528"/>
+            <a:ext cx="1726735" cy="3123974"/>
+          </a:xfrm>
+          <a:prstGeom prst="rect">
+            <a:avLst/>
+          </a:prstGeom>
+          <a:solidFill>
+            <a:schemeClr val="bg1"/>
+          </a:solidFill>
+          <a:ln>
+            <a:solidFill>
+              <a:schemeClr val="bg1"/>
+            </a:solidFill>
+          </a:ln>
+        </p:spPr>
+        <p:style>
+          <a:lnRef idx="2">
+            <a:schemeClr val="accent1">
+              <a:shade val="50000"/>
+            </a:schemeClr>
+          </a:lnRef>
+          <a:fillRef idx="1">
+            <a:schemeClr val="accent1"/>
+          </a:fillRef>
+          <a:effectRef idx="0">
+            <a:schemeClr val="accent1"/>
+          </a:effectRef>
+          <a:fontRef idx="minor">
+            <a:schemeClr val="lt1"/>
+          </a:fontRef>
+        </p:style>
+        <p:txBody>
+          <a:bodyPr rtlCol="0" anchor="ctr"/>
+          <a:lstStyle/>
+          <a:p>
+            <a:pPr algn="ctr"/>
+            <a:endParaRPr lang="de-DE"/>
+          </a:p>
+        </p:txBody>
+      </p:sp>
+      <p:sp>
+        <p:nvSpPr>
+          <p:cNvPr id="17" name="Rechteck 16">
+            <a:extLst>
+              <a:ext uri="{FF2B5EF4-FFF2-40B4-BE49-F238E27FC236}">
+                <a16:creationId xmlns:a16="http://schemas.microsoft.com/office/drawing/2014/main" id="{423B2EC4-7141-4B09-BFFD-FED7B0108526}"/>
+              </a:ext>
+            </a:extLst>
+          </p:cNvPr>
+          <p:cNvSpPr/>
+          <p:nvPr/>
+        </p:nvSpPr>
+        <p:spPr>
+          <a:xfrm>
+            <a:off x="2013356" y="634068"/>
+            <a:ext cx="6016305" cy="3698146"/>
+          </a:xfrm>
+          <a:prstGeom prst="rect">
+            <a:avLst/>
+          </a:prstGeom>
+          <a:solidFill>
+            <a:schemeClr val="bg1"/>
+          </a:solidFill>
+          <a:ln>
+            <a:solidFill>
+              <a:schemeClr val="bg1"/>
+            </a:solidFill>
+          </a:ln>
+        </p:spPr>
+        <p:style>
+          <a:lnRef idx="2">
+            <a:schemeClr val="accent1">
+              <a:shade val="50000"/>
+            </a:schemeClr>
+          </a:lnRef>
+          <a:fillRef idx="1">
+            <a:schemeClr val="accent1"/>
+          </a:fillRef>
+          <a:effectRef idx="0">
+            <a:schemeClr val="accent1"/>
+          </a:effectRef>
+          <a:fontRef idx="minor">
+            <a:schemeClr val="lt1"/>
+          </a:fontRef>
+        </p:style>
+        <p:txBody>
+          <a:bodyPr rtlCol="0" anchor="ctr"/>
+          <a:lstStyle/>
+          <a:p>
+            <a:pPr algn="ctr"/>
+            <a:endParaRPr lang="de-DE"/>
+          </a:p>
+        </p:txBody>
+      </p:sp>
+      <p:sp>
+        <p:nvSpPr>
+          <p:cNvPr id="21" name="Rechteck 20">
+            <a:extLst>
+              <a:ext uri="{FF2B5EF4-FFF2-40B4-BE49-F238E27FC236}">
+                <a16:creationId xmlns:a16="http://schemas.microsoft.com/office/drawing/2014/main" id="{FB89D581-7657-4094-9E65-6A828A9CABB6}"/>
+              </a:ext>
+            </a:extLst>
+          </p:cNvPr>
+          <p:cNvSpPr/>
+          <p:nvPr/>
+        </p:nvSpPr>
+        <p:spPr>
+          <a:xfrm>
+            <a:off x="2184602" y="4764946"/>
+            <a:ext cx="7395625" cy="1931215"/>
+          </a:xfrm>
+          <a:prstGeom prst="rect">
+            <a:avLst/>
+          </a:prstGeom>
+          <a:solidFill>
+            <a:schemeClr val="bg1"/>
+          </a:solidFill>
+          <a:ln>
+            <a:solidFill>
+              <a:schemeClr val="bg1"/>
+            </a:solidFill>
+          </a:ln>
+        </p:spPr>
+        <p:style>
+          <a:lnRef idx="2">
+            <a:schemeClr val="accent1">
+              <a:shade val="50000"/>
+            </a:schemeClr>
+          </a:lnRef>
+          <a:fillRef idx="1">
+            <a:schemeClr val="accent1"/>
+          </a:fillRef>
+          <a:effectRef idx="0">
+            <a:schemeClr val="accent1"/>
+          </a:effectRef>
+          <a:fontRef idx="minor">
+            <a:schemeClr val="lt1"/>
+          </a:fontRef>
+        </p:style>
+        <p:txBody>
+          <a:bodyPr rtlCol="0" anchor="ctr"/>
+          <a:lstStyle/>
+          <a:p>
+            <a:pPr algn="ctr"/>
+            <a:endParaRPr lang="de-DE"/>
+          </a:p>
+        </p:txBody>
+      </p:sp>
+      <p:sp>
+        <p:nvSpPr>
+          <p:cNvPr id="23" name="Rechteck 22">
+            <a:extLst>
+              <a:ext uri="{FF2B5EF4-FFF2-40B4-BE49-F238E27FC236}">
+                <a16:creationId xmlns:a16="http://schemas.microsoft.com/office/drawing/2014/main" id="{7A53D229-DA64-4F4F-9DDA-BC30822B6A1F}"/>
+              </a:ext>
+            </a:extLst>
+          </p:cNvPr>
+          <p:cNvSpPr/>
+          <p:nvPr/>
+        </p:nvSpPr>
+        <p:spPr>
+          <a:xfrm>
+            <a:off x="9580228" y="2785143"/>
+            <a:ext cx="1770077" cy="3819937"/>
+          </a:xfrm>
+          <a:prstGeom prst="rect">
+            <a:avLst/>
+          </a:prstGeom>
+          <a:solidFill>
+            <a:schemeClr val="bg1"/>
+          </a:solidFill>
+          <a:ln>
+            <a:solidFill>
+              <a:schemeClr val="bg1"/>
+            </a:solidFill>
+          </a:ln>
+        </p:spPr>
+        <p:style>
+          <a:lnRef idx="2">
+            <a:schemeClr val="accent1">
+              <a:shade val="50000"/>
+            </a:schemeClr>
+          </a:lnRef>
+          <a:fillRef idx="1">
+            <a:schemeClr val="accent1"/>
+          </a:fillRef>
+          <a:effectRef idx="0">
+            <a:schemeClr val="accent1"/>
+          </a:effectRef>
+          <a:fontRef idx="minor">
+            <a:schemeClr val="lt1"/>
+          </a:fontRef>
+        </p:style>
+        <p:txBody>
+          <a:bodyPr rtlCol="0" anchor="ctr"/>
+          <a:lstStyle/>
+          <a:p>
+            <a:pPr algn="ctr"/>
+            <a:endParaRPr lang="de-DE"/>
+          </a:p>
+        </p:txBody>
+      </p:sp>
+      <p:sp>
+        <p:nvSpPr>
+          <p:cNvPr id="25" name="Rechteck 24">
+            <a:extLst>
+              <a:ext uri="{FF2B5EF4-FFF2-40B4-BE49-F238E27FC236}">
+                <a16:creationId xmlns:a16="http://schemas.microsoft.com/office/drawing/2014/main" id="{0FFACF7F-B95F-44A7-A83A-64620B4ECE74}"/>
+              </a:ext>
+            </a:extLst>
+          </p:cNvPr>
+          <p:cNvSpPr/>
+          <p:nvPr/>
+        </p:nvSpPr>
+        <p:spPr>
+          <a:xfrm>
+            <a:off x="7072009" y="713064"/>
+            <a:ext cx="3344184" cy="1125464"/>
+          </a:xfrm>
+          <a:prstGeom prst="rect">
+            <a:avLst/>
+          </a:prstGeom>
+          <a:solidFill>
+            <a:schemeClr val="bg1"/>
+          </a:solidFill>
+          <a:ln>
+            <a:solidFill>
+              <a:schemeClr val="bg1"/>
+            </a:solidFill>
+          </a:ln>
+        </p:spPr>
+        <p:style>
+          <a:lnRef idx="2">
+            <a:schemeClr val="accent1">
+              <a:shade val="50000"/>
+            </a:schemeClr>
+          </a:lnRef>
+          <a:fillRef idx="1">
+            <a:schemeClr val="accent1"/>
+          </a:fillRef>
+          <a:effectRef idx="0">
+            <a:schemeClr val="accent1"/>
+          </a:effectRef>
+          <a:fontRef idx="minor">
+            <a:schemeClr val="lt1"/>
+          </a:fontRef>
+        </p:style>
+        <p:txBody>
+          <a:bodyPr rtlCol="0" anchor="ctr"/>
+          <a:lstStyle/>
+          <a:p>
+            <a:pPr algn="ctr"/>
+            <a:endParaRPr lang="de-DE"/>
+          </a:p>
+        </p:txBody>
+      </p:sp>
+      <p:sp>
+        <p:nvSpPr>
+          <p:cNvPr id="26" name="Rechteck 25">
+            <a:extLst>
+              <a:ext uri="{FF2B5EF4-FFF2-40B4-BE49-F238E27FC236}">
+                <a16:creationId xmlns:a16="http://schemas.microsoft.com/office/drawing/2014/main" id="{03626CB5-9F86-4661-BAF1-65695461787C}"/>
+              </a:ext>
+            </a:extLst>
+          </p:cNvPr>
+          <p:cNvSpPr/>
+          <p:nvPr/>
+        </p:nvSpPr>
+        <p:spPr>
+          <a:xfrm>
+            <a:off x="2013355" y="4108642"/>
+            <a:ext cx="6225972" cy="703625"/>
+          </a:xfrm>
+          <a:prstGeom prst="rect">
+            <a:avLst/>
+          </a:prstGeom>
+          <a:solidFill>
+            <a:schemeClr val="bg1"/>
+          </a:solidFill>
+          <a:ln>
+            <a:solidFill>
+              <a:schemeClr val="bg1"/>
+            </a:solidFill>
+          </a:ln>
+        </p:spPr>
+        <p:style>
+          <a:lnRef idx="2">
+            <a:schemeClr val="accent1">
+              <a:shade val="50000"/>
+            </a:schemeClr>
+          </a:lnRef>
+          <a:fillRef idx="1">
+            <a:schemeClr val="accent1"/>
+          </a:fillRef>
+          <a:effectRef idx="0">
+            <a:schemeClr val="accent1"/>
+          </a:effectRef>
+          <a:fontRef idx="minor">
+            <a:schemeClr val="lt1"/>
+          </a:fontRef>
+        </p:style>
+        <p:txBody>
+          <a:bodyPr rtlCol="0" anchor="ctr"/>
+          <a:lstStyle/>
+          <a:p>
+            <a:pPr algn="ctr"/>
+            <a:endParaRPr lang="de-DE"/>
+          </a:p>
+        </p:txBody>
+      </p:sp>
+      <p:sp>
+        <p:nvSpPr>
+          <p:cNvPr id="27" name="Rechteck 26">
+            <a:extLst>
+              <a:ext uri="{FF2B5EF4-FFF2-40B4-BE49-F238E27FC236}">
+                <a16:creationId xmlns:a16="http://schemas.microsoft.com/office/drawing/2014/main" id="{49F1E478-A6D7-4860-BA9C-888927970FD3}"/>
+              </a:ext>
+            </a:extLst>
+          </p:cNvPr>
+          <p:cNvSpPr/>
+          <p:nvPr/>
+        </p:nvSpPr>
+        <p:spPr>
+          <a:xfrm>
+            <a:off x="457868" y="922787"/>
+            <a:ext cx="1555487" cy="5857392"/>
+          </a:xfrm>
+          <a:prstGeom prst="rect">
+            <a:avLst/>
+          </a:prstGeom>
+          <a:solidFill>
+            <a:schemeClr val="bg1"/>
+          </a:solidFill>
+          <a:ln>
+            <a:solidFill>
+              <a:schemeClr val="bg1"/>
+            </a:solidFill>
+          </a:ln>
+        </p:spPr>
+        <p:style>
+          <a:lnRef idx="2">
+            <a:schemeClr val="accent1">
+              <a:shade val="50000"/>
+            </a:schemeClr>
+          </a:lnRef>
+          <a:fillRef idx="1">
+            <a:schemeClr val="accent1"/>
+          </a:fillRef>
+          <a:effectRef idx="0">
+            <a:schemeClr val="accent1"/>
+          </a:effectRef>
+          <a:fontRef idx="minor">
+            <a:schemeClr val="lt1"/>
+          </a:fontRef>
+        </p:style>
+        <p:txBody>
+          <a:bodyPr rtlCol="0" anchor="ctr"/>
+          <a:lstStyle/>
+          <a:p>
+            <a:pPr algn="ctr"/>
+            <a:endParaRPr lang="de-DE"/>
+          </a:p>
+        </p:txBody>
+      </p:sp>
+      <p:sp>
+        <p:nvSpPr>
+          <p:cNvPr id="28" name="Rechteck 27">
+            <a:extLst>
+              <a:ext uri="{FF2B5EF4-FFF2-40B4-BE49-F238E27FC236}">
+                <a16:creationId xmlns:a16="http://schemas.microsoft.com/office/drawing/2014/main" id="{7355CCFA-FFF9-4213-A3DD-49ACFA4B77D3}"/>
+              </a:ext>
+            </a:extLst>
+          </p:cNvPr>
+          <p:cNvSpPr/>
+          <p:nvPr/>
+        </p:nvSpPr>
+        <p:spPr>
+          <a:xfrm>
+            <a:off x="1923047" y="4182894"/>
+            <a:ext cx="1004979" cy="2597285"/>
+          </a:xfrm>
+          <a:prstGeom prst="rect">
+            <a:avLst/>
+          </a:prstGeom>
+          <a:solidFill>
+            <a:schemeClr val="bg1"/>
+          </a:solidFill>
+          <a:ln>
+            <a:solidFill>
+              <a:schemeClr val="bg1"/>
+            </a:solidFill>
+          </a:ln>
+        </p:spPr>
+        <p:style>
+          <a:lnRef idx="2">
+            <a:schemeClr val="accent1">
+              <a:shade val="50000"/>
+            </a:schemeClr>
+          </a:lnRef>
+          <a:fillRef idx="1">
+            <a:schemeClr val="accent1"/>
+          </a:fillRef>
+          <a:effectRef idx="0">
+            <a:schemeClr val="accent1"/>
+          </a:effectRef>
+          <a:fontRef idx="minor">
+            <a:schemeClr val="lt1"/>
+          </a:fontRef>
+        </p:style>
+        <p:txBody>
+          <a:bodyPr rtlCol="0" anchor="ctr"/>
+          <a:lstStyle/>
+          <a:p>
+            <a:pPr algn="ctr"/>
+            <a:endParaRPr lang="de-DE"/>
+          </a:p>
+        </p:txBody>
+      </p:sp>
+      <p:sp>
+        <p:nvSpPr>
+          <p:cNvPr id="29" name="Rechteck 28">
+            <a:extLst>
+              <a:ext uri="{FF2B5EF4-FFF2-40B4-BE49-F238E27FC236}">
+                <a16:creationId xmlns:a16="http://schemas.microsoft.com/office/drawing/2014/main" id="{C1B279EC-2334-4AF7-A98B-C8ED5199286B}"/>
+              </a:ext>
+            </a:extLst>
+          </p:cNvPr>
+          <p:cNvSpPr/>
+          <p:nvPr/>
+        </p:nvSpPr>
+        <p:spPr>
+          <a:xfrm>
+            <a:off x="9001389" y="2412461"/>
+            <a:ext cx="1824882" cy="3054484"/>
+          </a:xfrm>
+          <a:prstGeom prst="rect">
+            <a:avLst/>
+          </a:prstGeom>
+          <a:solidFill>
+            <a:schemeClr val="bg1"/>
+          </a:solidFill>
+          <a:ln>
+            <a:solidFill>
+              <a:schemeClr val="bg1"/>
+            </a:solidFill>
+          </a:ln>
+        </p:spPr>
+        <p:style>
+          <a:lnRef idx="2">
+            <a:schemeClr val="accent1">
+              <a:shade val="50000"/>
+            </a:schemeClr>
+          </a:lnRef>
+          <a:fillRef idx="1">
+            <a:schemeClr val="accent1"/>
+          </a:fillRef>
+          <a:effectRef idx="0">
+            <a:schemeClr val="accent1"/>
+          </a:effectRef>
+          <a:fontRef idx="minor">
+            <a:schemeClr val="lt1"/>
+          </a:fontRef>
+        </p:style>
+        <p:txBody>
+          <a:bodyPr rtlCol="0" anchor="ctr"/>
+          <a:lstStyle/>
+          <a:p>
+            <a:pPr algn="ctr"/>
+            <a:endParaRPr lang="de-DE"/>
+          </a:p>
+        </p:txBody>
+      </p:sp>
+      <p:sp>
+        <p:nvSpPr>
+          <p:cNvPr id="30" name="Rechteck 29">
+            <a:extLst>
+              <a:ext uri="{FF2B5EF4-FFF2-40B4-BE49-F238E27FC236}">
+                <a16:creationId xmlns:a16="http://schemas.microsoft.com/office/drawing/2014/main" id="{6DCA47C4-9B3E-4AA7-AECD-C36CB9B57AC1}"/>
+              </a:ext>
+            </a:extLst>
+          </p:cNvPr>
+          <p:cNvSpPr/>
+          <p:nvPr/>
+        </p:nvSpPr>
+        <p:spPr>
+          <a:xfrm>
+            <a:off x="6851854" y="2199779"/>
+            <a:ext cx="1506373" cy="351813"/>
+          </a:xfrm>
+          <a:prstGeom prst="rect">
+            <a:avLst/>
+          </a:prstGeom>
+          <a:solidFill>
+            <a:schemeClr val="bg1"/>
+          </a:solidFill>
+          <a:ln>
+            <a:solidFill>
+              <a:schemeClr val="bg1"/>
+            </a:solidFill>
+          </a:ln>
+        </p:spPr>
+        <p:style>
+          <a:lnRef idx="2">
+            <a:schemeClr val="accent1">
+              <a:shade val="50000"/>
+            </a:schemeClr>
+          </a:lnRef>
+          <a:fillRef idx="1">
+            <a:schemeClr val="accent1"/>
+          </a:fillRef>
+          <a:effectRef idx="0">
+            <a:schemeClr val="accent1"/>
+          </a:effectRef>
+          <a:fontRef idx="minor">
+            <a:schemeClr val="lt1"/>
+          </a:fontRef>
+        </p:style>
+        <p:txBody>
+          <a:bodyPr rtlCol="0" anchor="ctr"/>
+          <a:lstStyle/>
+          <a:p>
+            <a:pPr algn="ctr"/>
+            <a:endParaRPr lang="de-DE"/>
+          </a:p>
+        </p:txBody>
+      </p:sp>
+    </p:spTree>
+    <p:extLst>
+      <p:ext uri="{BB962C8B-B14F-4D97-AF65-F5344CB8AC3E}">
+        <p14:creationId xmlns:p14="http://schemas.microsoft.com/office/powerpoint/2010/main" val="1574691362"/>
+      </p:ext>
+    </p:extLst>
+  </p:cSld>
+  <p:clrMapOvr>
+    <a:masterClrMapping/>
+  </p:clrMapOvr>
+  <p:timing>
+    <p:tnLst>
+      <p:par>
+        <p:cTn id="1" dur="indefinite" restart="never" nodeType="tmRoot">
+          <p:childTnLst>
+            <p:seq concurrent="1" nextAc="seek">
+              <p:cTn id="2" dur="indefinite" nodeType="mainSeq">
+                <p:childTnLst>
+                  <p:par>
+                    <p:cTn id="3" fill="hold">
+                      <p:stCondLst>
+                        <p:cond delay="indefinite"/>
+                      </p:stCondLst>
+                      <p:childTnLst>
+                        <p:par>
+                          <p:cTn id="4" fill="hold">
+                            <p:stCondLst>
+                              <p:cond delay="0"/>
+                            </p:stCondLst>
+                            <p:childTnLst>
+                              <p:par>
+                                <p:cTn id="5" presetID="10" presetClass="exit" presetSubtype="0" fill="hold" grpId="0" nodeType="clickEffect">
+                                  <p:stCondLst>
+                                    <p:cond delay="0"/>
+                                  </p:stCondLst>
+                                  <p:childTnLst>
+                                    <p:animEffect transition="out" filter="fade">
+                                      <p:cBhvr>
+                                        <p:cTn id="6" dur="500"/>
+                                        <p:tgtEl>
+                                          <p:spTgt spid="26"/>
+                                        </p:tgtEl>
+                                      </p:cBhvr>
+                                    </p:animEffect>
+                                    <p:set>
+                                      <p:cBhvr>
+                                        <p:cTn id="7" dur="1" fill="hold">
+                                          <p:stCondLst>
+                                            <p:cond delay="499"/>
+                                          </p:stCondLst>
+                                        </p:cTn>
+                                        <p:tgtEl>
+                                          <p:spTgt spid="26"/>
+                                        </p:tgtEl>
+                                        <p:attrNameLst>
+                                          <p:attrName>style.visibility</p:attrName>
+                                        </p:attrNameLst>
+                                      </p:cBhvr>
+                                      <p:to>
+                                        <p:strVal val="hidden"/>
+                                      </p:to>
+                                    </p:set>
+                                  </p:childTnLst>
+                                </p:cTn>
+                              </p:par>
+                              <p:par>
+                                <p:cTn id="8" presetID="10" presetClass="exit" presetSubtype="0" fill="hold" grpId="0" nodeType="withEffect">
+                                  <p:stCondLst>
+                                    <p:cond delay="0"/>
+                                  </p:stCondLst>
+                                  <p:childTnLst>
+                                    <p:animEffect transition="out" filter="fade">
+                                      <p:cBhvr>
+                                        <p:cTn id="9" dur="500"/>
+                                        <p:tgtEl>
+                                          <p:spTgt spid="21"/>
+                                        </p:tgtEl>
+                                      </p:cBhvr>
+                                    </p:animEffect>
+                                    <p:set>
+                                      <p:cBhvr>
+                                        <p:cTn id="10" dur="1" fill="hold">
+                                          <p:stCondLst>
+                                            <p:cond delay="499"/>
+                                          </p:stCondLst>
+                                        </p:cTn>
+                                        <p:tgtEl>
+                                          <p:spTgt spid="21"/>
+                                        </p:tgtEl>
+                                        <p:attrNameLst>
+                                          <p:attrName>style.visibility</p:attrName>
+                                        </p:attrNameLst>
+                                      </p:cBhvr>
+                                      <p:to>
+                                        <p:strVal val="hidden"/>
+                                      </p:to>
+                                    </p:set>
+                                  </p:childTnLst>
+                                </p:cTn>
+                              </p:par>
+                            </p:childTnLst>
+                          </p:cTn>
+                        </p:par>
+                      </p:childTnLst>
+                    </p:cTn>
+                  </p:par>
+                  <p:par>
+                    <p:cTn id="11" fill="hold">
+                      <p:stCondLst>
+                        <p:cond delay="indefinite"/>
+                      </p:stCondLst>
+                      <p:childTnLst>
+                        <p:par>
+                          <p:cTn id="12" fill="hold">
+                            <p:stCondLst>
+                              <p:cond delay="0"/>
+                            </p:stCondLst>
+                            <p:childTnLst>
+                              <p:par>
+                                <p:cTn id="13" presetID="10" presetClass="exit" presetSubtype="0" fill="hold" grpId="0" nodeType="clickEffect">
+                                  <p:stCondLst>
+                                    <p:cond delay="0"/>
+                                  </p:stCondLst>
+                                  <p:childTnLst>
+                                    <p:animEffect transition="out" filter="fade">
+                                      <p:cBhvr>
+                                        <p:cTn id="14" dur="500"/>
+                                        <p:tgtEl>
+                                          <p:spTgt spid="15"/>
+                                        </p:tgtEl>
+                                      </p:cBhvr>
+                                    </p:animEffect>
+                                    <p:set>
+                                      <p:cBhvr>
+                                        <p:cTn id="15" dur="1" fill="hold">
+                                          <p:stCondLst>
+                                            <p:cond delay="499"/>
+                                          </p:stCondLst>
+                                        </p:cTn>
+                                        <p:tgtEl>
+                                          <p:spTgt spid="15"/>
+                                        </p:tgtEl>
+                                        <p:attrNameLst>
+                                          <p:attrName>style.visibility</p:attrName>
+                                        </p:attrNameLst>
+                                      </p:cBhvr>
+                                      <p:to>
+                                        <p:strVal val="hidden"/>
+                                      </p:to>
+                                    </p:set>
+                                  </p:childTnLst>
+                                </p:cTn>
+                              </p:par>
+                              <p:par>
+                                <p:cTn id="16" presetID="10" presetClass="exit" presetSubtype="0" fill="hold" grpId="0" nodeType="withEffect">
+                                  <p:stCondLst>
+                                    <p:cond delay="0"/>
+                                  </p:stCondLst>
+                                  <p:childTnLst>
+                                    <p:animEffect transition="out" filter="fade">
+                                      <p:cBhvr>
+                                        <p:cTn id="17" dur="500"/>
+                                        <p:tgtEl>
+                                          <p:spTgt spid="28"/>
+                                        </p:tgtEl>
+                                      </p:cBhvr>
+                                    </p:animEffect>
+                                    <p:set>
+                                      <p:cBhvr>
+                                        <p:cTn id="18" dur="1" fill="hold">
+                                          <p:stCondLst>
+                                            <p:cond delay="499"/>
+                                          </p:stCondLst>
+                                        </p:cTn>
+                                        <p:tgtEl>
+                                          <p:spTgt spid="28"/>
+                                        </p:tgtEl>
+                                        <p:attrNameLst>
+                                          <p:attrName>style.visibility</p:attrName>
+                                        </p:attrNameLst>
+                                      </p:cBhvr>
+                                      <p:to>
+                                        <p:strVal val="hidden"/>
+                                      </p:to>
+                                    </p:set>
+                                  </p:childTnLst>
+                                </p:cTn>
+                              </p:par>
+                            </p:childTnLst>
+                          </p:cTn>
+                        </p:par>
+                      </p:childTnLst>
+                    </p:cTn>
+                  </p:par>
+                  <p:par>
+                    <p:cTn id="19" fill="hold">
+                      <p:stCondLst>
+                        <p:cond delay="indefinite"/>
+                      </p:stCondLst>
+                      <p:childTnLst>
+                        <p:par>
+                          <p:cTn id="20" fill="hold">
+                            <p:stCondLst>
+                              <p:cond delay="0"/>
+                            </p:stCondLst>
+                            <p:childTnLst>
+                              <p:par>
+                                <p:cTn id="21" presetID="10" presetClass="exit" presetSubtype="0" fill="hold" grpId="0" nodeType="clickEffect">
+                                  <p:stCondLst>
+                                    <p:cond delay="0"/>
+                                  </p:stCondLst>
+                                  <p:childTnLst>
+                                    <p:animEffect transition="out" filter="fade">
+                                      <p:cBhvr>
+                                        <p:cTn id="22" dur="500"/>
+                                        <p:tgtEl>
+                                          <p:spTgt spid="30"/>
+                                        </p:tgtEl>
+                                      </p:cBhvr>
+                                    </p:animEffect>
+                                    <p:set>
+                                      <p:cBhvr>
+                                        <p:cTn id="23" dur="1" fill="hold">
+                                          <p:stCondLst>
+                                            <p:cond delay="499"/>
+                                          </p:stCondLst>
+                                        </p:cTn>
+                                        <p:tgtEl>
+                                          <p:spTgt spid="30"/>
+                                        </p:tgtEl>
+                                        <p:attrNameLst>
+                                          <p:attrName>style.visibility</p:attrName>
+                                        </p:attrNameLst>
+                                      </p:cBhvr>
+                                      <p:to>
+                                        <p:strVal val="hidden"/>
+                                      </p:to>
+                                    </p:set>
+                                  </p:childTnLst>
+                                </p:cTn>
+                              </p:par>
+                              <p:par>
+                                <p:cTn id="24" presetID="10" presetClass="exit" presetSubtype="0" fill="hold" grpId="0" nodeType="withEffect">
+                                  <p:stCondLst>
+                                    <p:cond delay="0"/>
+                                  </p:stCondLst>
+                                  <p:childTnLst>
+                                    <p:animEffect transition="out" filter="fade">
+                                      <p:cBhvr>
+                                        <p:cTn id="25" dur="500"/>
+                                        <p:tgtEl>
+                                          <p:spTgt spid="17"/>
+                                        </p:tgtEl>
+                                      </p:cBhvr>
+                                    </p:animEffect>
+                                    <p:set>
+                                      <p:cBhvr>
+                                        <p:cTn id="26" dur="1" fill="hold">
+                                          <p:stCondLst>
+                                            <p:cond delay="499"/>
+                                          </p:stCondLst>
+                                        </p:cTn>
+                                        <p:tgtEl>
+                                          <p:spTgt spid="17"/>
+                                        </p:tgtEl>
+                                        <p:attrNameLst>
+                                          <p:attrName>style.visibility</p:attrName>
+                                        </p:attrNameLst>
+                                      </p:cBhvr>
+                                      <p:to>
+                                        <p:strVal val="hidden"/>
+                                      </p:to>
+                                    </p:set>
+                                  </p:childTnLst>
+                                </p:cTn>
+                              </p:par>
+                            </p:childTnLst>
+                          </p:cTn>
+                        </p:par>
+                      </p:childTnLst>
+                    </p:cTn>
+                  </p:par>
+                  <p:par>
+                    <p:cTn id="27" fill="hold">
+                      <p:stCondLst>
+                        <p:cond delay="indefinite"/>
+                      </p:stCondLst>
+                      <p:childTnLst>
+                        <p:par>
+                          <p:cTn id="28" fill="hold">
+                            <p:stCondLst>
+                              <p:cond delay="0"/>
+                            </p:stCondLst>
+                            <p:childTnLst>
+                              <p:par>
+                                <p:cTn id="29" presetID="10" presetClass="exit" presetSubtype="0" fill="hold" grpId="0" nodeType="clickEffect">
+                                  <p:stCondLst>
+                                    <p:cond delay="0"/>
+                                  </p:stCondLst>
+                                  <p:childTnLst>
+                                    <p:animEffect transition="out" filter="fade">
+                                      <p:cBhvr>
+                                        <p:cTn id="30" dur="500"/>
+                                        <p:tgtEl>
+                                          <p:spTgt spid="27"/>
+                                        </p:tgtEl>
+                                      </p:cBhvr>
+                                    </p:animEffect>
+                                    <p:set>
+                                      <p:cBhvr>
+                                        <p:cTn id="31" dur="1" fill="hold">
+                                          <p:stCondLst>
+                                            <p:cond delay="499"/>
+                                          </p:stCondLst>
+                                        </p:cTn>
+                                        <p:tgtEl>
+                                          <p:spTgt spid="27"/>
+                                        </p:tgtEl>
+                                        <p:attrNameLst>
+                                          <p:attrName>style.visibility</p:attrName>
+                                        </p:attrNameLst>
+                                      </p:cBhvr>
+                                      <p:to>
+                                        <p:strVal val="hidden"/>
+                                      </p:to>
+                                    </p:set>
+                                  </p:childTnLst>
+                                </p:cTn>
+                              </p:par>
+                            </p:childTnLst>
+                          </p:cTn>
+                        </p:par>
+                      </p:childTnLst>
+                    </p:cTn>
+                  </p:par>
+                  <p:par>
+                    <p:cTn id="32" fill="hold">
+                      <p:stCondLst>
+                        <p:cond delay="indefinite"/>
+                      </p:stCondLst>
+                      <p:childTnLst>
+                        <p:par>
+                          <p:cTn id="33" fill="hold">
+                            <p:stCondLst>
+                              <p:cond delay="0"/>
+                            </p:stCondLst>
+                            <p:childTnLst>
+                              <p:par>
+                                <p:cTn id="34" presetID="10" presetClass="exit" presetSubtype="0" fill="hold" grpId="0" nodeType="clickEffect">
+                                  <p:stCondLst>
+                                    <p:cond delay="0"/>
+                                  </p:stCondLst>
+                                  <p:childTnLst>
+                                    <p:animEffect transition="out" filter="fade">
+                                      <p:cBhvr>
+                                        <p:cTn id="35" dur="500"/>
+                                        <p:tgtEl>
+                                          <p:spTgt spid="25"/>
+                                        </p:tgtEl>
+                                      </p:cBhvr>
+                                    </p:animEffect>
+                                    <p:set>
+                                      <p:cBhvr>
+                                        <p:cTn id="36" dur="1" fill="hold">
+                                          <p:stCondLst>
+                                            <p:cond delay="499"/>
+                                          </p:stCondLst>
+                                        </p:cTn>
+                                        <p:tgtEl>
+                                          <p:spTgt spid="25"/>
+                                        </p:tgtEl>
+                                        <p:attrNameLst>
+                                          <p:attrName>style.visibility</p:attrName>
+                                        </p:attrNameLst>
+                                      </p:cBhvr>
+                                      <p:to>
+                                        <p:strVal val="hidden"/>
+                                      </p:to>
+                                    </p:set>
+                                  </p:childTnLst>
+                                </p:cTn>
+                              </p:par>
+                            </p:childTnLst>
+                          </p:cTn>
+                        </p:par>
+                      </p:childTnLst>
+                    </p:cTn>
+                  </p:par>
+                  <p:par>
+                    <p:cTn id="37" fill="hold">
+                      <p:stCondLst>
+                        <p:cond delay="indefinite"/>
+                      </p:stCondLst>
+                      <p:childTnLst>
+                        <p:par>
+                          <p:cTn id="38" fill="hold">
+                            <p:stCondLst>
+                              <p:cond delay="0"/>
+                            </p:stCondLst>
+                            <p:childTnLst>
+                              <p:par>
+                                <p:cTn id="39" presetID="10" presetClass="exit" presetSubtype="0" fill="hold" grpId="0" nodeType="clickEffect">
+                                  <p:stCondLst>
+                                    <p:cond delay="0"/>
+                                  </p:stCondLst>
+                                  <p:childTnLst>
+                                    <p:animEffect transition="out" filter="fade">
+                                      <p:cBhvr>
+                                        <p:cTn id="40" dur="500"/>
+                                        <p:tgtEl>
+                                          <p:spTgt spid="23"/>
+                                        </p:tgtEl>
+                                      </p:cBhvr>
+                                    </p:animEffect>
+                                    <p:set>
+                                      <p:cBhvr>
+                                        <p:cTn id="41" dur="1" fill="hold">
+                                          <p:stCondLst>
+                                            <p:cond delay="499"/>
+                                          </p:stCondLst>
+                                        </p:cTn>
+                                        <p:tgtEl>
+                                          <p:spTgt spid="23"/>
+                                        </p:tgtEl>
+                                        <p:attrNameLst>
+                                          <p:attrName>style.visibility</p:attrName>
+                                        </p:attrNameLst>
+                                      </p:cBhvr>
+                                      <p:to>
+                                        <p:strVal val="hidden"/>
+                                      </p:to>
+                                    </p:set>
+                                  </p:childTnLst>
+                                </p:cTn>
+                              </p:par>
+                              <p:par>
+                                <p:cTn id="42" presetID="10" presetClass="exit" presetSubtype="0" fill="hold" grpId="0" nodeType="withEffect">
+                                  <p:stCondLst>
+                                    <p:cond delay="0"/>
+                                  </p:stCondLst>
+                                  <p:childTnLst>
+                                    <p:animEffect transition="out" filter="fade">
+                                      <p:cBhvr>
+                                        <p:cTn id="43" dur="500"/>
+                                        <p:tgtEl>
+                                          <p:spTgt spid="29"/>
+                                        </p:tgtEl>
+                                      </p:cBhvr>
+                                    </p:animEffect>
+                                    <p:set>
+                                      <p:cBhvr>
+                                        <p:cTn id="44" dur="1" fill="hold">
+                                          <p:stCondLst>
+                                            <p:cond delay="499"/>
+                                          </p:stCondLst>
+                                        </p:cTn>
+                                        <p:tgtEl>
+                                          <p:spTgt spid="29"/>
+                                        </p:tgtEl>
+                                        <p:attrNameLst>
+                                          <p:attrName>style.visibility</p:attrName>
+                                        </p:attrNameLst>
+                                      </p:cBhvr>
+                                      <p:to>
+                                        <p:strVal val="hidden"/>
+                                      </p:to>
+                                    </p:set>
+                                  </p:childTnLst>
+                                </p:cTn>
+                              </p:par>
+                            </p:childTnLst>
+                          </p:cTn>
+                        </p:par>
+                      </p:childTnLst>
+                    </p:cTn>
+                  </p:par>
+                  <p:par>
+                    <p:cTn id="45" fill="hold">
+                      <p:stCondLst>
+                        <p:cond delay="indefinite"/>
+                      </p:stCondLst>
+                      <p:childTnLst>
+                        <p:par>
+                          <p:cTn id="46" fill="hold">
+                            <p:stCondLst>
+                              <p:cond delay="0"/>
+                            </p:stCondLst>
+                            <p:childTnLst>
+                              <p:par>
+                                <p:cTn id="47" presetID="1" presetClass="entr" presetSubtype="0" fill="hold" grpId="0" nodeType="clickEffect">
+                                  <p:stCondLst>
+                                    <p:cond delay="0"/>
+                                  </p:stCondLst>
+                                  <p:childTnLst>
+                                    <p:set>
+                                      <p:cBhvr>
+                                        <p:cTn id="48" dur="1" fill="hold">
+                                          <p:stCondLst>
+                                            <p:cond delay="0"/>
+                                          </p:stCondLst>
+                                        </p:cTn>
+                                        <p:tgtEl>
+                                          <p:spTgt spid="11"/>
+                                        </p:tgtEl>
+                                        <p:attrNameLst>
+                                          <p:attrName>style.visibility</p:attrName>
+                                        </p:attrNameLst>
+                                      </p:cBhvr>
+                                      <p:to>
+                                        <p:strVal val="visible"/>
+                                      </p:to>
+                                    </p:set>
+                                  </p:childTnLst>
+                                </p:cTn>
+                              </p:par>
+                            </p:childTnLst>
+                          </p:cTn>
+                        </p:par>
+                      </p:childTnLst>
+                    </p:cTn>
+                  </p:par>
+                </p:childTnLst>
+              </p:cTn>
+              <p:prevCondLst>
+                <p:cond evt="onPrev" delay="0">
+                  <p:tgtEl>
+                    <p:sldTgt/>
+                  </p:tgtEl>
+                </p:cond>
+              </p:prevCondLst>
+              <p:nextCondLst>
+                <p:cond evt="onNext" delay="0">
+                  <p:tgtEl>
+                    <p:sldTgt/>
+                  </p:tgtEl>
+                </p:cond>
+              </p:nextCondLst>
+            </p:seq>
+          </p:childTnLst>
+        </p:cTn>
+      </p:par>
+    </p:tnLst>
+    <p:bldLst>
+      <p:bldP spid="11" grpId="0" animBg="1"/>
+      <p:bldP spid="15" grpId="0" animBg="1"/>
+      <p:bldP spid="17" grpId="0" animBg="1"/>
+      <p:bldP spid="21" grpId="0" animBg="1"/>
+      <p:bldP spid="23" grpId="0" animBg="1"/>
+      <p:bldP spid="25" grpId="0" animBg="1"/>
+      <p:bldP spid="26" grpId="0" animBg="1"/>
+      <p:bldP spid="27" grpId="0" animBg="1"/>
+      <p:bldP spid="28" grpId="0" animBg="1"/>
+      <p:bldP spid="29" grpId="0" animBg="1"/>
+      <p:bldP spid="30" grpId="0" animBg="1"/>
+    </p:bldLst>
+  </p:timing>
+</p:sld>
+</file>
+
+<file path=ppt/slides/slide5.xml><?xml version="1.0" encoding="utf-8"?>
+<p:sld xmlns:a="http://schemas.openxmlformats.org/drawingml/2006/main" xmlns:r="http://schemas.openxmlformats.org/officeDocument/2006/relationships" xmlns:p="http://schemas.openxmlformats.org/presentationml/2006/main">
+  <p:cSld>
+    <p:spTree>
+      <p:nvGrpSpPr>
+        <p:cNvPr id="1" name=""/>
+        <p:cNvGrpSpPr/>
+        <p:nvPr/>
+      </p:nvGrpSpPr>
+      <p:grpSpPr>
+        <a:xfrm>
+          <a:off x="0" y="0"/>
+          <a:ext cx="0" cy="0"/>
+          <a:chOff x="0" y="0"/>
+          <a:chExt cx="0" cy="0"/>
+        </a:xfrm>
+      </p:grpSpPr>
+      <p:pic>
+        <p:nvPicPr>
+          <p:cNvPr id="5" name="Inhaltsplatzhalter 4" descr="Ein Bild, das Screenshot enthält.&#10;&#10;Automatisch generierte Beschreibung">
+            <a:extLst>
+              <a:ext uri="{FF2B5EF4-FFF2-40B4-BE49-F238E27FC236}">
+                <a16:creationId xmlns:a16="http://schemas.microsoft.com/office/drawing/2014/main" id="{4A7709A0-5F8E-4DDA-A740-4FC9292116A3}"/>
+              </a:ext>
+            </a:extLst>
+          </p:cNvPr>
+          <p:cNvPicPr>
+            <a:picLocks noGrp="1" noChangeAspect="1"/>
+          </p:cNvPicPr>
+          <p:nvPr>
+            <p:ph idx="1"/>
+          </p:nvPr>
+        </p:nvPicPr>
+        <p:blipFill>
+          <a:blip r:embed="rId2">
+            <a:extLst>
+              <a:ext uri="{28A0092B-C50C-407E-A947-70E740481C1C}">
+                <a14:useLocalDpi xmlns:a14="http://schemas.microsoft.com/office/drawing/2010/main" val="0"/>
+              </a:ext>
+            </a:extLst>
+          </a:blip>
+          <a:stretch>
+            <a:fillRect/>
+          </a:stretch>
+        </p:blipFill>
+        <p:spPr>
+          <a:xfrm>
+            <a:off x="0" y="1"/>
+            <a:ext cx="12192000" cy="7692272"/>
+          </a:xfrm>
+        </p:spPr>
+      </p:pic>
+      <p:sp>
+        <p:nvSpPr>
+          <p:cNvPr id="6" name="Rechteck 5">
+            <a:extLst>
+              <a:ext uri="{FF2B5EF4-FFF2-40B4-BE49-F238E27FC236}">
+                <a16:creationId xmlns:a16="http://schemas.microsoft.com/office/drawing/2014/main" id="{918DC84F-20A7-49CF-9FB8-4586F03878B0}"/>
+              </a:ext>
+            </a:extLst>
+          </p:cNvPr>
+          <p:cNvSpPr/>
+          <p:nvPr/>
+        </p:nvSpPr>
+        <p:spPr>
+          <a:xfrm>
+            <a:off x="8246378" y="4630723"/>
+            <a:ext cx="4093828" cy="3288484"/>
+          </a:xfrm>
+          <a:prstGeom prst="rect">
+            <a:avLst/>
+          </a:prstGeom>
+          <a:solidFill>
+            <a:schemeClr val="bg1"/>
+          </a:solidFill>
+          <a:ln>
+            <a:solidFill>
+              <a:schemeClr val="bg1"/>
+            </a:solidFill>
+          </a:ln>
+        </p:spPr>
+        <p:style>
+          <a:lnRef idx="2">
+            <a:schemeClr val="accent1">
+              <a:shade val="50000"/>
+            </a:schemeClr>
+          </a:lnRef>
+          <a:fillRef idx="1">
+            <a:schemeClr val="accent1"/>
+          </a:fillRef>
+          <a:effectRef idx="0">
+            <a:schemeClr val="accent1"/>
+          </a:effectRef>
+          <a:fontRef idx="minor">
+            <a:schemeClr val="lt1"/>
+          </a:fontRef>
+        </p:style>
+        <p:txBody>
+          <a:bodyPr rtlCol="0" anchor="ctr"/>
+          <a:lstStyle/>
+          <a:p>
+            <a:pPr algn="ctr"/>
+            <a:endParaRPr lang="de-DE"/>
+          </a:p>
+        </p:txBody>
+      </p:sp>
+      <p:sp>
+        <p:nvSpPr>
+          <p:cNvPr id="7" name="Rechteck 6">
+            <a:extLst>
+              <a:ext uri="{FF2B5EF4-FFF2-40B4-BE49-F238E27FC236}">
+                <a16:creationId xmlns:a16="http://schemas.microsoft.com/office/drawing/2014/main" id="{50FBF4EB-A50A-41E8-A2C2-85D7099D8C42}"/>
+              </a:ext>
+            </a:extLst>
+          </p:cNvPr>
+          <p:cNvSpPr/>
+          <p:nvPr/>
+        </p:nvSpPr>
+        <p:spPr>
+          <a:xfrm>
+            <a:off x="1688491" y="5037320"/>
+            <a:ext cx="7395625" cy="1931215"/>
+          </a:xfrm>
+          <a:prstGeom prst="rect">
+            <a:avLst/>
+          </a:prstGeom>
+          <a:solidFill>
+            <a:schemeClr val="bg1"/>
+          </a:solidFill>
+          <a:ln>
+            <a:solidFill>
+              <a:schemeClr val="bg1"/>
+            </a:solidFill>
+          </a:ln>
+        </p:spPr>
+        <p:style>
+          <a:lnRef idx="2">
+            <a:schemeClr val="accent1">
+              <a:shade val="50000"/>
+            </a:schemeClr>
+          </a:lnRef>
+          <a:fillRef idx="1">
+            <a:schemeClr val="accent1"/>
+          </a:fillRef>
+          <a:effectRef idx="0">
+            <a:schemeClr val="accent1"/>
+          </a:effectRef>
+          <a:fontRef idx="minor">
+            <a:schemeClr val="lt1"/>
+          </a:fontRef>
+        </p:style>
+        <p:txBody>
+          <a:bodyPr rtlCol="0" anchor="ctr"/>
+          <a:lstStyle/>
+          <a:p>
+            <a:pPr algn="ctr"/>
+            <a:endParaRPr lang="de-DE"/>
+          </a:p>
+        </p:txBody>
+      </p:sp>
+      <p:sp>
+        <p:nvSpPr>
+          <p:cNvPr id="8" name="Rechteck 7">
+            <a:extLst>
+              <a:ext uri="{FF2B5EF4-FFF2-40B4-BE49-F238E27FC236}">
+                <a16:creationId xmlns:a16="http://schemas.microsoft.com/office/drawing/2014/main" id="{A5E0D0F2-39A3-4F14-BC02-2DABC48831A2}"/>
+              </a:ext>
+            </a:extLst>
+          </p:cNvPr>
+          <p:cNvSpPr/>
+          <p:nvPr/>
+        </p:nvSpPr>
+        <p:spPr>
+          <a:xfrm>
+            <a:off x="3455685" y="699482"/>
+            <a:ext cx="3674689" cy="1931215"/>
+          </a:xfrm>
+          <a:prstGeom prst="rect">
+            <a:avLst/>
+          </a:prstGeom>
+          <a:solidFill>
+            <a:schemeClr val="bg1"/>
+          </a:solidFill>
+          <a:ln>
+            <a:solidFill>
+              <a:schemeClr val="bg1"/>
+            </a:solidFill>
+          </a:ln>
+        </p:spPr>
+        <p:style>
+          <a:lnRef idx="2">
+            <a:schemeClr val="accent1">
+              <a:shade val="50000"/>
+            </a:schemeClr>
+          </a:lnRef>
+          <a:fillRef idx="1">
+            <a:schemeClr val="accent1"/>
+          </a:fillRef>
+          <a:effectRef idx="0">
+            <a:schemeClr val="accent1"/>
+          </a:effectRef>
+          <a:fontRef idx="minor">
+            <a:schemeClr val="lt1"/>
+          </a:fontRef>
+        </p:style>
+        <p:txBody>
+          <a:bodyPr rtlCol="0" anchor="ctr"/>
+          <a:lstStyle/>
+          <a:p>
+            <a:pPr algn="ctr"/>
+            <a:endParaRPr lang="de-DE"/>
+          </a:p>
+        </p:txBody>
+      </p:sp>
+      <p:sp>
+        <p:nvSpPr>
+          <p:cNvPr id="9" name="Rechteck 8">
+            <a:extLst>
+              <a:ext uri="{FF2B5EF4-FFF2-40B4-BE49-F238E27FC236}">
+                <a16:creationId xmlns:a16="http://schemas.microsoft.com/office/drawing/2014/main" id="{80C841D9-ADF2-45A2-BA46-D5587D8AD6DC}"/>
+              </a:ext>
+            </a:extLst>
+          </p:cNvPr>
+          <p:cNvSpPr/>
+          <p:nvPr/>
+        </p:nvSpPr>
+        <p:spPr>
+          <a:xfrm>
+            <a:off x="7130374" y="584269"/>
+            <a:ext cx="4377447" cy="1236412"/>
+          </a:xfrm>
+          <a:prstGeom prst="rect">
+            <a:avLst/>
+          </a:prstGeom>
+          <a:solidFill>
+            <a:schemeClr val="bg1"/>
+          </a:solidFill>
+          <a:ln>
+            <a:solidFill>
+              <a:schemeClr val="bg1"/>
+            </a:solidFill>
+          </a:ln>
+        </p:spPr>
+        <p:style>
+          <a:lnRef idx="2">
+            <a:schemeClr val="accent1">
+              <a:shade val="50000"/>
+            </a:schemeClr>
+          </a:lnRef>
+          <a:fillRef idx="1">
+            <a:schemeClr val="accent1"/>
+          </a:fillRef>
+          <a:effectRef idx="0">
+            <a:schemeClr val="accent1"/>
+          </a:effectRef>
+          <a:fontRef idx="minor">
+            <a:schemeClr val="lt1"/>
+          </a:fontRef>
+        </p:style>
+        <p:txBody>
+          <a:bodyPr rtlCol="0" anchor="ctr"/>
+          <a:lstStyle/>
+          <a:p>
+            <a:pPr algn="ctr"/>
+            <a:endParaRPr lang="de-DE"/>
+          </a:p>
+        </p:txBody>
+      </p:sp>
+      <p:sp>
+        <p:nvSpPr>
+          <p:cNvPr id="10" name="Rechteck 9">
+            <a:extLst>
+              <a:ext uri="{FF2B5EF4-FFF2-40B4-BE49-F238E27FC236}">
+                <a16:creationId xmlns:a16="http://schemas.microsoft.com/office/drawing/2014/main" id="{D7FACCB7-F0FA-4781-B4D3-36EE4B0BF75C}"/>
+              </a:ext>
+            </a:extLst>
+          </p:cNvPr>
+          <p:cNvSpPr/>
+          <p:nvPr/>
+        </p:nvSpPr>
+        <p:spPr>
+          <a:xfrm>
+            <a:off x="7237379" y="1820680"/>
+            <a:ext cx="4484451" cy="2226526"/>
+          </a:xfrm>
+          <a:prstGeom prst="rect">
+            <a:avLst/>
+          </a:prstGeom>
+          <a:solidFill>
+            <a:schemeClr val="bg1"/>
+          </a:solidFill>
+          <a:ln>
+            <a:solidFill>
+              <a:schemeClr val="bg1"/>
+            </a:solidFill>
+          </a:ln>
+        </p:spPr>
+        <p:style>
+          <a:lnRef idx="2">
+            <a:schemeClr val="accent1">
+              <a:shade val="50000"/>
+            </a:schemeClr>
+          </a:lnRef>
+          <a:fillRef idx="1">
+            <a:schemeClr val="accent1"/>
+          </a:fillRef>
+          <a:effectRef idx="0">
+            <a:schemeClr val="accent1"/>
+          </a:effectRef>
+          <a:fontRef idx="minor">
+            <a:schemeClr val="lt1"/>
+          </a:fontRef>
+        </p:style>
+        <p:txBody>
+          <a:bodyPr rtlCol="0" anchor="ctr"/>
+          <a:lstStyle/>
+          <a:p>
+            <a:pPr algn="ctr"/>
+            <a:endParaRPr lang="de-DE"/>
+          </a:p>
+        </p:txBody>
+      </p:sp>
+    </p:spTree>
+    <p:extLst>
+      <p:ext uri="{BB962C8B-B14F-4D97-AF65-F5344CB8AC3E}">
+        <p14:creationId xmlns:p14="http://schemas.microsoft.com/office/powerpoint/2010/main" val="974619692"/>
+      </p:ext>
+    </p:extLst>
+  </p:cSld>
+  <p:clrMapOvr>
+    <a:masterClrMapping/>
+  </p:clrMapOvr>
+  <p:timing>
+    <p:tnLst>
+      <p:par>
+        <p:cTn id="1" dur="indefinite" restart="never" nodeType="tmRoot">
+          <p:childTnLst>
+            <p:seq concurrent="1" nextAc="seek">
+              <p:cTn id="2" dur="indefinite" nodeType="mainSeq">
+                <p:childTnLst>
+                  <p:par>
+                    <p:cTn id="3" fill="hold">
+                      <p:stCondLst>
+                        <p:cond delay="indefinite"/>
+                      </p:stCondLst>
+                      <p:childTnLst>
+                        <p:par>
+                          <p:cTn id="4" fill="hold">
+                            <p:stCondLst>
+                              <p:cond delay="0"/>
+                            </p:stCondLst>
+                            <p:childTnLst>
+                              <p:par>
+                                <p:cTn id="5" presetID="10" presetClass="exit" presetSubtype="0" fill="hold" grpId="0" nodeType="clickEffect">
+                                  <p:stCondLst>
+                                    <p:cond delay="0"/>
+                                  </p:stCondLst>
+                                  <p:childTnLst>
+                                    <p:animEffect transition="out" filter="fade">
+                                      <p:cBhvr>
+                                        <p:cTn id="6" dur="500"/>
+                                        <p:tgtEl>
+                                          <p:spTgt spid="8"/>
+                                        </p:tgtEl>
+                                      </p:cBhvr>
+                                    </p:animEffect>
+                                    <p:set>
+                                      <p:cBhvr>
+                                        <p:cTn id="7" dur="1" fill="hold">
+                                          <p:stCondLst>
+                                            <p:cond delay="499"/>
+                                          </p:stCondLst>
+                                        </p:cTn>
+                                        <p:tgtEl>
+                                          <p:spTgt spid="8"/>
+                                        </p:tgtEl>
+                                        <p:attrNameLst>
+                                          <p:attrName>style.visibility</p:attrName>
+                                        </p:attrNameLst>
+                                      </p:cBhvr>
+                                      <p:to>
+                                        <p:strVal val="hidden"/>
+                                      </p:to>
+                                    </p:set>
+                                  </p:childTnLst>
+                                </p:cTn>
+                              </p:par>
+                            </p:childTnLst>
+                          </p:cTn>
+                        </p:par>
+                      </p:childTnLst>
+                    </p:cTn>
+                  </p:par>
+                  <p:par>
+                    <p:cTn id="8" fill="hold">
+                      <p:stCondLst>
+                        <p:cond delay="indefinite"/>
+                      </p:stCondLst>
+                      <p:childTnLst>
+                        <p:par>
+                          <p:cTn id="9" fill="hold">
+                            <p:stCondLst>
+                              <p:cond delay="0"/>
+                            </p:stCondLst>
+                            <p:childTnLst>
+                              <p:par>
+                                <p:cTn id="10" presetID="10" presetClass="exit" presetSubtype="0" fill="hold" grpId="0" nodeType="clickEffect">
+                                  <p:stCondLst>
+                                    <p:cond delay="0"/>
+                                  </p:stCondLst>
+                                  <p:childTnLst>
+                                    <p:animEffect transition="out" filter="fade">
+                                      <p:cBhvr>
+                                        <p:cTn id="11" dur="500"/>
+                                        <p:tgtEl>
+                                          <p:spTgt spid="9"/>
+                                        </p:tgtEl>
+                                      </p:cBhvr>
+                                    </p:animEffect>
+                                    <p:set>
+                                      <p:cBhvr>
+                                        <p:cTn id="12" dur="1" fill="hold">
+                                          <p:stCondLst>
+                                            <p:cond delay="499"/>
+                                          </p:stCondLst>
+                                        </p:cTn>
+                                        <p:tgtEl>
+                                          <p:spTgt spid="9"/>
+                                        </p:tgtEl>
+                                        <p:attrNameLst>
+                                          <p:attrName>style.visibility</p:attrName>
+                                        </p:attrNameLst>
+                                      </p:cBhvr>
+                                      <p:to>
+                                        <p:strVal val="hidden"/>
+                                      </p:to>
+                                    </p:set>
+                                  </p:childTnLst>
+                                </p:cTn>
+                              </p:par>
+                            </p:childTnLst>
+                          </p:cTn>
+                        </p:par>
+                      </p:childTnLst>
+                    </p:cTn>
+                  </p:par>
+                  <p:par>
+                    <p:cTn id="13" fill="hold">
+                      <p:stCondLst>
+                        <p:cond delay="indefinite"/>
+                      </p:stCondLst>
+                      <p:childTnLst>
+                        <p:par>
+                          <p:cTn id="14" fill="hold">
+                            <p:stCondLst>
+                              <p:cond delay="0"/>
+                            </p:stCondLst>
+                            <p:childTnLst>
+                              <p:par>
+                                <p:cTn id="15" presetID="10" presetClass="exit" presetSubtype="0" fill="hold" grpId="0" nodeType="clickEffect">
+                                  <p:stCondLst>
+                                    <p:cond delay="0"/>
+                                  </p:stCondLst>
+                                  <p:childTnLst>
+                                    <p:animEffect transition="out" filter="fade">
+                                      <p:cBhvr>
+                                        <p:cTn id="16" dur="500"/>
+                                        <p:tgtEl>
+                                          <p:spTgt spid="10"/>
+                                        </p:tgtEl>
+                                      </p:cBhvr>
+                                    </p:animEffect>
+                                    <p:set>
+                                      <p:cBhvr>
+                                        <p:cTn id="17" dur="1" fill="hold">
+                                          <p:stCondLst>
+                                            <p:cond delay="499"/>
+                                          </p:stCondLst>
+                                        </p:cTn>
+                                        <p:tgtEl>
+                                          <p:spTgt spid="10"/>
+                                        </p:tgtEl>
+                                        <p:attrNameLst>
+                                          <p:attrName>style.visibility</p:attrName>
+                                        </p:attrNameLst>
+                                      </p:cBhvr>
+                                      <p:to>
+                                        <p:strVal val="hidden"/>
+                                      </p:to>
+                                    </p:set>
+                                  </p:childTnLst>
+                                </p:cTn>
+                              </p:par>
+                            </p:childTnLst>
+                          </p:cTn>
+                        </p:par>
+                      </p:childTnLst>
+                    </p:cTn>
+                  </p:par>
+                  <p:par>
+                    <p:cTn id="18" fill="hold">
+                      <p:stCondLst>
+                        <p:cond delay="indefinite"/>
+                      </p:stCondLst>
+                      <p:childTnLst>
+                        <p:par>
+                          <p:cTn id="19" fill="hold">
+                            <p:stCondLst>
+                              <p:cond delay="0"/>
+                            </p:stCondLst>
+                            <p:childTnLst>
+                              <p:par>
+                                <p:cTn id="20" presetID="10" presetClass="exit" presetSubtype="0" fill="hold" grpId="0" nodeType="clickEffect">
+                                  <p:stCondLst>
+                                    <p:cond delay="0"/>
+                                  </p:stCondLst>
+                                  <p:childTnLst>
+                                    <p:animEffect transition="out" filter="fade">
+                                      <p:cBhvr>
+                                        <p:cTn id="21" dur="500"/>
+                                        <p:tgtEl>
+                                          <p:spTgt spid="7"/>
+                                        </p:tgtEl>
+                                      </p:cBhvr>
+                                    </p:animEffect>
+                                    <p:set>
+                                      <p:cBhvr>
+                                        <p:cTn id="22" dur="1" fill="hold">
+                                          <p:stCondLst>
+                                            <p:cond delay="499"/>
+                                          </p:stCondLst>
+                                        </p:cTn>
+                                        <p:tgtEl>
+                                          <p:spTgt spid="7"/>
+                                        </p:tgtEl>
+                                        <p:attrNameLst>
+                                          <p:attrName>style.visibility</p:attrName>
+                                        </p:attrNameLst>
+                                      </p:cBhvr>
+                                      <p:to>
+                                        <p:strVal val="hidden"/>
+                                      </p:to>
+                                    </p:set>
+                                  </p:childTnLst>
+                                </p:cTn>
+                              </p:par>
+                            </p:childTnLst>
+                          </p:cTn>
+                        </p:par>
+                      </p:childTnLst>
+                    </p:cTn>
+                  </p:par>
+                </p:childTnLst>
+              </p:cTn>
+              <p:prevCondLst>
+                <p:cond evt="onPrev" delay="0">
+                  <p:tgtEl>
+                    <p:sldTgt/>
+                  </p:tgtEl>
+                </p:cond>
+              </p:prevCondLst>
+              <p:nextCondLst>
+                <p:cond evt="onNext" delay="0">
+                  <p:tgtEl>
+                    <p:sldTgt/>
+                  </p:tgtEl>
+                </p:cond>
+              </p:nextCondLst>
+            </p:seq>
+          </p:childTnLst>
+        </p:cTn>
+      </p:par>
+    </p:tnLst>
+    <p:bldLst>
+      <p:bldP spid="7" grpId="0" animBg="1"/>
+      <p:bldP spid="8" grpId="0" animBg="1"/>
+      <p:bldP spid="9" grpId="0" animBg="1"/>
+      <p:bldP spid="10" grpId="0" animBg="1"/>
+    </p:bldLst>
+  </p:timing>
+</p:sld>
+</file>
+
+<file path=ppt/slides/slide6.xml><?xml version="1.0" encoding="utf-8"?>
+<p:sld xmlns:a="http://schemas.openxmlformats.org/drawingml/2006/main" xmlns:r="http://schemas.openxmlformats.org/officeDocument/2006/relationships" xmlns:p="http://schemas.openxmlformats.org/presentationml/2006/main">
+  <p:cSld>
+    <p:spTree>
+      <p:nvGrpSpPr>
+        <p:cNvPr id="1" name=""/>
+        <p:cNvGrpSpPr/>
+        <p:nvPr/>
+      </p:nvGrpSpPr>
+      <p:grpSpPr>
+        <a:xfrm>
+          <a:off x="0" y="0"/>
+          <a:ext cx="0" cy="0"/>
+          <a:chOff x="0" y="0"/>
+          <a:chExt cx="0" cy="0"/>
+        </a:xfrm>
+      </p:grpSpPr>
+      <p:pic>
+        <p:nvPicPr>
+          <p:cNvPr id="5" name="Grafik 4">
+            <a:extLst>
+              <a:ext uri="{FF2B5EF4-FFF2-40B4-BE49-F238E27FC236}">
+                <a16:creationId xmlns:a16="http://schemas.microsoft.com/office/drawing/2014/main" id="{0E2A6737-0F0C-438B-8D50-DDC9F3FE91A9}"/>
+              </a:ext>
+            </a:extLst>
+          </p:cNvPr>
+          <p:cNvPicPr>
+            <a:picLocks noChangeAspect="1"/>
+          </p:cNvPicPr>
+          <p:nvPr/>
+        </p:nvPicPr>
+        <p:blipFill>
+          <a:blip r:embed="rId3"/>
+          <a:stretch>
+            <a:fillRect/>
+          </a:stretch>
+        </p:blipFill>
+        <p:spPr>
+          <a:xfrm>
+            <a:off x="2289386" y="1439829"/>
+            <a:ext cx="7613225" cy="5418171"/>
+          </a:xfrm>
+          <a:prstGeom prst="rect">
+            <a:avLst/>
+          </a:prstGeom>
+        </p:spPr>
+      </p:pic>
+      <p:pic>
+        <p:nvPicPr>
+          <p:cNvPr id="9" name="Grafik 8">
+            <a:extLst>
+              <a:ext uri="{FF2B5EF4-FFF2-40B4-BE49-F238E27FC236}">
+                <a16:creationId xmlns:a16="http://schemas.microsoft.com/office/drawing/2014/main" id="{E79440EA-8E85-4EAE-AD1F-BD4448ABC98A}"/>
+              </a:ext>
+            </a:extLst>
+          </p:cNvPr>
+          <p:cNvPicPr>
+            <a:picLocks noChangeAspect="1"/>
+          </p:cNvPicPr>
+          <p:nvPr/>
+        </p:nvPicPr>
+        <p:blipFill>
+          <a:blip r:embed="rId4"/>
+          <a:stretch>
+            <a:fillRect/>
+          </a:stretch>
+        </p:blipFill>
+        <p:spPr>
+          <a:xfrm>
+            <a:off x="457198" y="566252"/>
+            <a:ext cx="11277600" cy="742950"/>
+          </a:xfrm>
+          <a:prstGeom prst="rect">
+            <a:avLst/>
+          </a:prstGeom>
+        </p:spPr>
+      </p:pic>
+      <p:sp>
+        <p:nvSpPr>
+          <p:cNvPr id="11" name="Textfeld 10">
+            <a:extLst>
+              <a:ext uri="{FF2B5EF4-FFF2-40B4-BE49-F238E27FC236}">
+                <a16:creationId xmlns:a16="http://schemas.microsoft.com/office/drawing/2014/main" id="{6317C169-D5BD-4187-9BE1-C0B9F010A5E3}"/>
+              </a:ext>
+            </a:extLst>
+          </p:cNvPr>
+          <p:cNvSpPr txBox="1"/>
+          <p:nvPr/>
+        </p:nvSpPr>
+        <p:spPr>
+          <a:xfrm>
+            <a:off x="457198" y="100829"/>
+            <a:ext cx="5075853" cy="523220"/>
+          </a:xfrm>
+          <a:prstGeom prst="rect">
+            <a:avLst/>
+          </a:prstGeom>
+          <a:noFill/>
+        </p:spPr>
+        <p:txBody>
+          <a:bodyPr wrap="square" rtlCol="0">
+            <a:spAutoFit/>
+          </a:bodyPr>
+          <a:lstStyle/>
+          <a:p>
+            <a:r>
+              <a:rPr lang="de-DE" sz="2800" dirty="0" err="1">
+                <a:solidFill>
+                  <a:schemeClr val="bg1">
+                    <a:lumMod val="50000"/>
+                  </a:schemeClr>
+                </a:solidFill>
+              </a:rPr>
+              <a:t>Jacoco</a:t>
+            </a:r>
+            <a:r>
+              <a:rPr lang="de-DE" sz="2800" dirty="0">
+                <a:solidFill>
+                  <a:schemeClr val="bg1">
+                    <a:lumMod val="50000"/>
+                  </a:schemeClr>
+                </a:solidFill>
+              </a:rPr>
+              <a:t> Test Coverage</a:t>
+            </a:r>
+          </a:p>
+        </p:txBody>
+      </p:sp>
+    </p:spTree>
+    <p:extLst>
+      <p:ext uri="{BB962C8B-B14F-4D97-AF65-F5344CB8AC3E}">
+        <p14:creationId xmlns:p14="http://schemas.microsoft.com/office/powerpoint/2010/main" val="3351201703"/>
+      </p:ext>
+    </p:extLst>
+  </p:cSld>
+  <p:clrMapOvr>
+    <a:masterClrMapping/>
+  </p:clrMapOvr>
+  <p:timing>
+    <p:tnLst>
+      <p:par>
+        <p:cTn id="1" dur="indefinite" restart="never" nodeType="tmRoot">
+          <p:childTnLst>
+            <p:seq concurrent="1" nextAc="seek">
+              <p:cTn id="2" dur="indefinite" nodeType="mainSeq">
+                <p:childTnLst>
+                  <p:par>
+                    <p:cTn id="3" fill="hold">
+                      <p:stCondLst>
+                        <p:cond delay="indefinite"/>
+                      </p:stCondLst>
+                      <p:childTnLst>
+                        <p:par>
+                          <p:cTn id="4" fill="hold">
+                            <p:stCondLst>
+                              <p:cond delay="0"/>
+                            </p:stCondLst>
+                            <p:childTnLst>
+                              <p:par>
+                                <p:cTn id="5" presetID="1" presetClass="entr" presetSubtype="0" fill="hold" nodeType="clickEffect">
+                                  <p:stCondLst>
+                                    <p:cond delay="0"/>
+                                  </p:stCondLst>
+                                  <p:childTnLst>
+                                    <p:set>
+                                      <p:cBhvr>
+                                        <p:cTn id="6" dur="1" fill="hold">
+                                          <p:stCondLst>
+                                            <p:cond delay="0"/>
+                                          </p:stCondLst>
+                                        </p:cTn>
+                                        <p:tgtEl>
+                                          <p:spTgt spid="5"/>
+                                        </p:tgtEl>
+                                        <p:attrNameLst>
+                                          <p:attrName>style.visibility</p:attrName>
+                                        </p:attrNameLst>
+                                      </p:cBhvr>
+                                      <p:to>
+                                        <p:strVal val="visible"/>
+                                      </p:to>
+                                    </p:set>
+                                  </p:childTnLst>
+                                </p:cTn>
+                              </p:par>
+                            </p:childTnLst>
+                          </p:cTn>
+                        </p:par>
+                      </p:childTnLst>
+                    </p:cTn>
+                  </p:par>
+                </p:childTnLst>
+              </p:cTn>
+              <p:prevCondLst>
+                <p:cond evt="onPrev" delay="0">
+                  <p:tgtEl>
+                    <p:sldTgt/>
+                  </p:tgtEl>
+                </p:cond>
+              </p:prevCondLst>
+              <p:nextCondLst>
+                <p:cond evt="onNext" delay="0">
+                  <p:tgtEl>
+                    <p:sldTgt/>
+                  </p:tgtEl>
+                </p:cond>
+              </p:nextCondLst>
+            </p:seq>
+          </p:childTnLst>
+        </p:cTn>
+      </p:par>
+    </p:tnLst>
+  </p:timing>
+</p:sld>
+</file>
+
+<file path=ppt/slides/slide7.xml><?xml version="1.0" encoding="utf-8"?>
+<p:sld xmlns:a="http://schemas.openxmlformats.org/drawingml/2006/main" xmlns:r="http://schemas.openxmlformats.org/officeDocument/2006/relationships" xmlns:p="http://schemas.openxmlformats.org/presentationml/2006/main">
+  <p:cSld>
+    <p:bg>
+      <p:bgPr>
+        <a:solidFill>
+          <a:schemeClr val="tx1">
+            <a:lumMod val="85000"/>
+            <a:lumOff val="15000"/>
+          </a:schemeClr>
+        </a:solidFill>
+        <a:effectLst/>
+      </p:bgPr>
+    </p:bg>
+    <p:spTree>
+      <p:nvGrpSpPr>
+        <p:cNvPr id="1" name=""/>
+        <p:cNvGrpSpPr/>
+        <p:nvPr/>
+      </p:nvGrpSpPr>
+      <p:grpSpPr>
+        <a:xfrm>
+          <a:off x="0" y="0"/>
+          <a:ext cx="0" cy="0"/>
+          <a:chOff x="0" y="0"/>
+          <a:chExt cx="0" cy="0"/>
+        </a:xfrm>
+      </p:grpSpPr>
+      <p:pic>
+        <p:nvPicPr>
+          <p:cNvPr id="9" name="giphy">
+            <a:hlinkClick r:id="" action="ppaction://media"/>
+            <a:extLst>
+              <a:ext uri="{FF2B5EF4-FFF2-40B4-BE49-F238E27FC236}">
+                <a16:creationId xmlns:a16="http://schemas.microsoft.com/office/drawing/2014/main" id="{20EB0B86-89E0-4B54-A91C-D3226589A20F}"/>
+              </a:ext>
+            </a:extLst>
+          </p:cNvPr>
+          <p:cNvPicPr>
+            <a:picLocks noChangeAspect="1"/>
+          </p:cNvPicPr>
+          <p:nvPr>
+            <a:videoFile r:link="rId2"/>
+            <p:extLst>
+              <p:ext uri="{DAA4B4D4-6D71-4841-9C94-3DE7FCFB9230}">
+                <p14:media xmlns:p14="http://schemas.microsoft.com/office/powerpoint/2010/main" r:embed="rId1"/>
+              </p:ext>
+            </p:extLst>
+          </p:nvPr>
+        </p:nvPicPr>
+        <p:blipFill>
+          <a:blip r:embed="rId5"/>
+          <a:stretch>
+            <a:fillRect/>
+          </a:stretch>
+        </p:blipFill>
+        <p:spPr>
+          <a:xfrm>
+            <a:off x="2594881" y="-1"/>
+            <a:ext cx="6858001" cy="6858001"/>
+          </a:xfrm>
+          <a:prstGeom prst="rect">
+            <a:avLst/>
+          </a:prstGeom>
+        </p:spPr>
+      </p:pic>
+    </p:spTree>
+    <p:extLst>
+      <p:ext uri="{BB962C8B-B14F-4D97-AF65-F5344CB8AC3E}">
+        <p14:creationId xmlns:p14="http://schemas.microsoft.com/office/powerpoint/2010/main" val="2407855400"/>
+      </p:ext>
+    </p:extLst>
+  </p:cSld>
+  <p:clrMapOvr>
+    <a:masterClrMapping/>
+  </p:clrMapOvr>
+  <p:timing>
+    <p:tnLst>
+      <p:par>
+        <p:cTn id="1" dur="indefinite" restart="never" nodeType="tmRoot">
+          <p:childTnLst>
+            <p:seq concurrent="1" nextAc="seek">
+              <p:cTn id="2" dur="indefinite" nodeType="mainSeq">
+                <p:childTnLst>
+                  <p:par>
+                    <p:cTn id="3" fill="hold">
+                      <p:stCondLst>
+                        <p:cond delay="indefinite"/>
+                      </p:stCondLst>
+                      <p:childTnLst>
+                        <p:par>
+                          <p:cTn id="4" fill="hold">
+                            <p:stCondLst>
+                              <p:cond delay="0"/>
+                            </p:stCondLst>
+                            <p:childTnLst>
+                              <p:par>
+                                <p:cTn id="5" presetID="1" presetClass="mediacall" presetSubtype="0" fill="hold" nodeType="clickEffect">
+                                  <p:stCondLst>
+                                    <p:cond delay="0"/>
+                                  </p:stCondLst>
+                                  <p:childTnLst>
+                                    <p:cmd type="call" cmd="playFrom(0.0)">
+                                      <p:cBhvr>
+                                        <p:cTn id="6" dur="4040" fill="hold"/>
+                                        <p:tgtEl>
+                                          <p:spTgt spid="9"/>
+                                        </p:tgtEl>
+                                      </p:cBhvr>
+                                    </p:cmd>
+                                  </p:childTnLst>
+                                </p:cTn>
+                              </p:par>
+                            </p:childTnLst>
+                          </p:cTn>
+                        </p:par>
+                      </p:childTnLst>
+                    </p:cTn>
+                  </p:par>
+                </p:childTnLst>
+              </p:cTn>
+              <p:prevCondLst>
+                <p:cond evt="onPrev" delay="0">
+                  <p:tgtEl>
+                    <p:sldTgt/>
+                  </p:tgtEl>
+                </p:cond>
+              </p:prevCondLst>
+              <p:nextCondLst>
+                <p:cond evt="onNext" delay="0">
+                  <p:tgtEl>
+                    <p:sldTgt/>
+                  </p:tgtEl>
+                </p:cond>
+              </p:nextCondLst>
+            </p:seq>
+            <p:video>
+              <p:cMediaNode vol="80000">
+                <p:cTn id="7" fill="hold" display="0">
+                  <p:stCondLst>
+                    <p:cond delay="indefinite"/>
+                  </p:stCondLst>
+                </p:cTn>
+                <p:tgtEl>
+                  <p:spTgt spid="9"/>
+                </p:tgtEl>
+              </p:cMediaNode>
+            </p:video>
+            <p:seq concurrent="1" nextAc="seek">
+              <p:cTn id="8" restart="whenNotActive" fill="hold" evtFilter="cancelBubble" nodeType="interactiveSeq">
+                <p:stCondLst>
+                  <p:cond evt="onClick" delay="0">
+                    <p:tgtEl>
+                      <p:spTgt spid="9"/>
+                    </p:tgtEl>
+                  </p:cond>
+                </p:stCondLst>
+                <p:endSync evt="end" delay="0">
+                  <p:rtn val="all"/>
+                </p:endSync>
+                <p:childTnLst>
+                  <p:par>
+                    <p:cTn id="9" fill="hold">
+                      <p:stCondLst>
+                        <p:cond delay="0"/>
+                      </p:stCondLst>
+                      <p:childTnLst>
+                        <p:par>
+                          <p:cTn id="10" fill="hold">
+                            <p:stCondLst>
+                              <p:cond delay="0"/>
+                            </p:stCondLst>
+                            <p:childTnLst>
+                              <p:par>
+                                <p:cTn id="11" presetID="2" presetClass="mediacall" presetSubtype="0" fill="hold" nodeType="clickEffect">
+                                  <p:stCondLst>
+                                    <p:cond delay="0"/>
+                                  </p:stCondLst>
+                                  <p:childTnLst>
+                                    <p:cmd type="call" cmd="togglePause">
+                                      <p:cBhvr>
+                                        <p:cTn id="12" dur="1" fill="hold"/>
+                                        <p:tgtEl>
+                                          <p:spTgt spid="9"/>
+                                        </p:tgtEl>
+                                      </p:cBhvr>
+                                    </p:cmd>
+                                  </p:childTnLst>
+                                </p:cTn>
+                              </p:par>
+                            </p:childTnLst>
+                          </p:cTn>
+                        </p:par>
+                      </p:childTnLst>
+                    </p:cTn>
+                  </p:par>
+                </p:childTnLst>
+              </p:cTn>
+              <p:nextCondLst>
+                <p:cond evt="onClick" delay="0">
+                  <p:tgtEl>
+                    <p:spTgt spid="9"/>
+                  </p:tgtEl>
+                </p:cond>
+              </p:nextCondLst>
+            </p:seq>
+          </p:childTnLst>
+        </p:cTn>
+      </p:par>
+    </p:tnLst>
+  </p:timing>
+</p:sld>
+</file>
+
+<file path=ppt/slides/slide8.xml><?xml version="1.0" encoding="utf-8"?>
+<p:sld xmlns:a="http://schemas.openxmlformats.org/drawingml/2006/main" xmlns:r="http://schemas.openxmlformats.org/officeDocument/2006/relationships" xmlns:p="http://schemas.openxmlformats.org/presentationml/2006/main">
+  <p:cSld>
+    <p:bg>
+      <p:bgPr>
+        <a:solidFill>
+          <a:schemeClr val="bg1"/>
+        </a:solidFill>
+        <a:effectLst/>
+      </p:bgPr>
+    </p:bg>
+    <p:spTree>
+      <p:nvGrpSpPr>
+        <p:cNvPr id="1" name=""/>
+        <p:cNvGrpSpPr/>
+        <p:nvPr/>
+      </p:nvGrpSpPr>
+      <p:grpSpPr>
+        <a:xfrm>
+          <a:off x="0" y="0"/>
+          <a:ext cx="0" cy="0"/>
+          <a:chOff x="0" y="0"/>
+          <a:chExt cx="0" cy="0"/>
+        </a:xfrm>
+      </p:grpSpPr>
+      <p:sp>
+        <p:nvSpPr>
+          <p:cNvPr id="71" name="Rectangle 70">
+            <a:extLst>
+              <a:ext uri="{FF2B5EF4-FFF2-40B4-BE49-F238E27FC236}">
+                <a16:creationId xmlns:a16="http://schemas.microsoft.com/office/drawing/2014/main" id="{42A4FC2C-047E-45A5-965D-8E1E3BF09BC6}"/>
+              </a:ext>
+              <a:ext uri="{C183D7F6-B498-43B3-948B-1728B52AA6E4}">
+                <adec:decorative xmlns:adec="http://schemas.microsoft.com/office/drawing/2017/decorative" val="1"/>
+              </a:ext>
+            </a:extLst>
+          </p:cNvPr>
+          <p:cNvSpPr>
+            <a:spLocks noGrp="1" noRot="1" noChangeAspect="1" noMove="1" noResize="1" noEditPoints="1" noAdjustHandles="1" noChangeArrowheads="1" noChangeShapeType="1" noTextEdit="1"/>
+          </p:cNvSpPr>
+          <p:nvPr>
+            <p:extLst>
+              <p:ext uri="{386F3935-93C4-4BCD-93E2-E3B085C9AB24}">
+                <p16:designElem xmlns:p16="http://schemas.microsoft.com/office/powerpoint/2015/main" val="1"/>
+              </p:ext>
+            </p:extLst>
+          </p:nvPr>
+        </p:nvSpPr>
+        <p:spPr bwMode="white">
+          <a:xfrm>
+            <a:off x="1524" y="0"/>
+            <a:ext cx="12188952" cy="6858000"/>
+          </a:xfrm>
+          <a:prstGeom prst="rect">
+            <a:avLst/>
+          </a:prstGeom>
+          <a:noFill/>
+          <a:ln>
+            <a:noFill/>
+          </a:ln>
+        </p:spPr>
+        <p:style>
+          <a:lnRef idx="2">
+            <a:schemeClr val="accent1">
+              <a:shade val="50000"/>
+            </a:schemeClr>
+          </a:lnRef>
+          <a:fillRef idx="1">
+            <a:schemeClr val="accent1"/>
+          </a:fillRef>
+          <a:effectRef idx="0">
+            <a:schemeClr val="accent1"/>
+          </a:effectRef>
+          <a:fontRef idx="minor">
+            <a:schemeClr val="lt1"/>
+          </a:fontRef>
+        </p:style>
+        <p:txBody>
+          <a:bodyPr rtlCol="0" anchor="ctr"/>
+          <a:lstStyle>
+            <a:defPPr>
+              <a:defRPr lang="en-US"/>
+            </a:defPPr>
+            <a:lvl1pPr marL="0" algn="l" defTabSz="914400" rtl="0" eaLnBrk="1" latinLnBrk="0" hangingPunct="1">
+              <a:defRPr sz="1800" kern="1200">
+                <a:solidFill>
+                  <a:schemeClr val="lt1"/>
+                </a:solidFill>
+                <a:latin typeface="+mn-lt"/>
+                <a:ea typeface="+mn-ea"/>
+                <a:cs typeface="+mn-cs"/>
+              </a:defRPr>
+            </a:lvl1pPr>
+            <a:lvl2pPr marL="457200" algn="l" defTabSz="914400" rtl="0" eaLnBrk="1" latinLnBrk="0" hangingPunct="1">
+              <a:defRPr sz="1800" kern="1200">
+                <a:solidFill>
+                  <a:schemeClr val="lt1"/>
+                </a:solidFill>
+                <a:latin typeface="+mn-lt"/>
+                <a:ea typeface="+mn-ea"/>
+                <a:cs typeface="+mn-cs"/>
+              </a:defRPr>
+            </a:lvl2pPr>
+            <a:lvl3pPr marL="914400" algn="l" defTabSz="914400" rtl="0" eaLnBrk="1" latinLnBrk="0" hangingPunct="1">
+              <a:defRPr sz="1800" kern="1200">
+                <a:solidFill>
+                  <a:schemeClr val="lt1"/>
+                </a:solidFill>
+                <a:latin typeface="+mn-lt"/>
+                <a:ea typeface="+mn-ea"/>
+                <a:cs typeface="+mn-cs"/>
+              </a:defRPr>
+            </a:lvl3pPr>
+            <a:lvl4pPr marL="1371600" algn="l" defTabSz="914400" rtl="0" eaLnBrk="1" latinLnBrk="0" hangingPunct="1">
+              <a:defRPr sz="1800" kern="1200">
+                <a:solidFill>
+                  <a:schemeClr val="lt1"/>
+                </a:solidFill>
+                <a:latin typeface="+mn-lt"/>
+                <a:ea typeface="+mn-ea"/>
+                <a:cs typeface="+mn-cs"/>
+              </a:defRPr>
+            </a:lvl4pPr>
+            <a:lvl5pPr marL="1828800" algn="l" defTabSz="914400" rtl="0" eaLnBrk="1" latinLnBrk="0" hangingPunct="1">
+              <a:defRPr sz="1800" kern="1200">
+                <a:solidFill>
+                  <a:schemeClr val="lt1"/>
+                </a:solidFill>
+                <a:latin typeface="+mn-lt"/>
+                <a:ea typeface="+mn-ea"/>
+                <a:cs typeface="+mn-cs"/>
+              </a:defRPr>
+            </a:lvl5pPr>
+            <a:lvl6pPr marL="2286000" algn="l" defTabSz="914400" rtl="0" eaLnBrk="1" latinLnBrk="0" hangingPunct="1">
+              <a:defRPr sz="1800" kern="1200">
+                <a:solidFill>
+                  <a:schemeClr val="lt1"/>
+                </a:solidFill>
+                <a:latin typeface="+mn-lt"/>
+                <a:ea typeface="+mn-ea"/>
+                <a:cs typeface="+mn-cs"/>
+              </a:defRPr>
+            </a:lvl6pPr>
+            <a:lvl7pPr marL="2743200" algn="l" defTabSz="914400" rtl="0" eaLnBrk="1" latinLnBrk="0" hangingPunct="1">
+              <a:defRPr sz="1800" kern="1200">
+                <a:solidFill>
+                  <a:schemeClr val="lt1"/>
+                </a:solidFill>
+                <a:latin typeface="+mn-lt"/>
+                <a:ea typeface="+mn-ea"/>
+                <a:cs typeface="+mn-cs"/>
+              </a:defRPr>
+            </a:lvl7pPr>
+            <a:lvl8pPr marL="3200400" algn="l" defTabSz="914400" rtl="0" eaLnBrk="1" latinLnBrk="0" hangingPunct="1">
+              <a:defRPr sz="1800" kern="1200">
+                <a:solidFill>
+                  <a:schemeClr val="lt1"/>
+                </a:solidFill>
+                <a:latin typeface="+mn-lt"/>
+                <a:ea typeface="+mn-ea"/>
+                <a:cs typeface="+mn-cs"/>
+              </a:defRPr>
+            </a:lvl8pPr>
+            <a:lvl9pPr marL="3657600" algn="l" defTabSz="914400" rtl="0" eaLnBrk="1" latinLnBrk="0" hangingPunct="1">
+              <a:defRPr sz="1800" kern="1200">
+                <a:solidFill>
+                  <a:schemeClr val="lt1"/>
+                </a:solidFill>
+                <a:latin typeface="+mn-lt"/>
+                <a:ea typeface="+mn-ea"/>
+                <a:cs typeface="+mn-cs"/>
+              </a:defRPr>
+            </a:lvl9pPr>
+          </a:lstStyle>
+          <a:p>
+            <a:pPr algn="ctr"/>
+            <a:endParaRPr lang="en-US"/>
+          </a:p>
+        </p:txBody>
+      </p:sp>
+      <p:pic>
+        <p:nvPicPr>
+          <p:cNvPr id="1026" name="Picture 2" descr="Ein Bild, das sitzend, Computer, Katze, Mann enthält.&#10;&#10;Automatisch generierte Beschreibung">
+            <a:extLst>
+              <a:ext uri="{FF2B5EF4-FFF2-40B4-BE49-F238E27FC236}">
+                <a16:creationId xmlns:a16="http://schemas.microsoft.com/office/drawing/2014/main" id="{A677FEDA-86E4-4911-B9C8-D73533B38A29}"/>
+              </a:ext>
+            </a:extLst>
+          </p:cNvPr>
+          <p:cNvPicPr>
+            <a:picLocks noChangeAspect="1" noChangeArrowheads="1"/>
+          </p:cNvPicPr>
+          <p:nvPr/>
+        </p:nvPicPr>
+        <p:blipFill rotWithShape="1">
+          <a:blip r:embed="rId3">
+            <a:extLst>
+              <a:ext uri="{28A0092B-C50C-407E-A947-70E740481C1C}">
+                <a14:useLocalDpi xmlns:a14="http://schemas.microsoft.com/office/drawing/2010/main" val="0"/>
+              </a:ext>
+            </a:extLst>
+          </a:blip>
+          <a:srcRect l="461" r="32859" b="-1"/>
+          <a:stretch/>
+        </p:blipFill>
+        <p:spPr bwMode="auto">
+          <a:xfrm>
+            <a:off x="20" y="1282"/>
+            <a:ext cx="12191980" cy="6856718"/>
+          </a:xfrm>
+          <a:prstGeom prst="rect">
+            <a:avLst/>
+          </a:prstGeom>
+          <a:noFill/>
+          <a:extLst>
+            <a:ext uri="{909E8E84-426E-40DD-AFC4-6F175D3DCCD1}">
+              <a14:hiddenFill xmlns:a14="http://schemas.microsoft.com/office/drawing/2010/main">
+                <a:solidFill>
+                  <a:srgbClr val="FFFFFF"/>
+                </a:solidFill>
+              </a14:hiddenFill>
+            </a:ext>
+          </a:extLst>
+        </p:spPr>
+      </p:pic>
+      <p:sp>
+        <p:nvSpPr>
+          <p:cNvPr id="4" name="Textfeld 3">
+            <a:extLst>
+              <a:ext uri="{FF2B5EF4-FFF2-40B4-BE49-F238E27FC236}">
+                <a16:creationId xmlns:a16="http://schemas.microsoft.com/office/drawing/2014/main" id="{4E0A2872-23F6-460E-BC99-024A6BC12952}"/>
+              </a:ext>
+            </a:extLst>
+          </p:cNvPr>
+          <p:cNvSpPr txBox="1"/>
+          <p:nvPr/>
+        </p:nvSpPr>
+        <p:spPr>
+          <a:xfrm>
+            <a:off x="1932977" y="3696286"/>
+            <a:ext cx="8326045" cy="2308324"/>
+          </a:xfrm>
+          <a:prstGeom prst="rect">
+            <a:avLst/>
+          </a:prstGeom>
+          <a:solidFill>
+            <a:schemeClr val="bg2">
+              <a:alpha val="67000"/>
+            </a:schemeClr>
+          </a:solidFill>
+        </p:spPr>
+        <p:txBody>
+          <a:bodyPr wrap="square" rtlCol="0">
+            <a:spAutoFit/>
+          </a:bodyPr>
+          <a:lstStyle/>
+          <a:p>
+            <a:pPr algn="ctr"/>
+            <a:r>
+              <a:rPr lang="de-DE" sz="7200" dirty="0"/>
+              <a:t>DOES CODING MAKE YOU HAPPY?</a:t>
+            </a:r>
+          </a:p>
+        </p:txBody>
+      </p:sp>
+    </p:spTree>
+    <p:extLst>
+      <p:ext uri="{BB962C8B-B14F-4D97-AF65-F5344CB8AC3E}">
+        <p14:creationId xmlns:p14="http://schemas.microsoft.com/office/powerpoint/2010/main" val="3866595558"/>
+      </p:ext>
+    </p:extLst>
+  </p:cSld>
+  <p:clrMapOvr>
+    <a:masterClrMapping/>
+  </p:clrMapOvr>
+</p:sld>
+</file>
+
+<file path=ppt/slides/slide9.xml><?xml version="1.0" encoding="utf-8"?>
+<p:sld xmlns:a="http://schemas.openxmlformats.org/drawingml/2006/main" xmlns:r="http://schemas.openxmlformats.org/officeDocument/2006/relationships" xmlns:p="http://schemas.openxmlformats.org/presentationml/2006/main">
+  <p:cSld>
+    <p:spTree>
+      <p:nvGrpSpPr>
+        <p:cNvPr id="1" name=""/>
+        <p:cNvGrpSpPr/>
+        <p:nvPr/>
+      </p:nvGrpSpPr>
+      <p:grpSpPr>
+        <a:xfrm>
+          <a:off x="0" y="0"/>
+          <a:ext cx="0" cy="0"/>
+          <a:chOff x="0" y="0"/>
+          <a:chExt cx="0" cy="0"/>
+        </a:xfrm>
+      </p:grpSpPr>
+      <p:pic>
+        <p:nvPicPr>
+          <p:cNvPr id="5" name="Grafik 4">
+            <a:extLst>
+              <a:ext uri="{FF2B5EF4-FFF2-40B4-BE49-F238E27FC236}">
+                <a16:creationId xmlns:a16="http://schemas.microsoft.com/office/drawing/2014/main" id="{4E4873E0-8611-4489-8FE3-BB9E580548A3}"/>
+              </a:ext>
+            </a:extLst>
+          </p:cNvPr>
+          <p:cNvPicPr>
+            <a:picLocks noChangeAspect="1"/>
+          </p:cNvPicPr>
+          <p:nvPr/>
+        </p:nvPicPr>
+        <p:blipFill>
+          <a:blip r:embed="rId2"/>
+          <a:stretch>
+            <a:fillRect/>
+          </a:stretch>
+        </p:blipFill>
+        <p:spPr>
+          <a:xfrm>
+            <a:off x="1843086" y="74646"/>
+            <a:ext cx="8505825" cy="4114800"/>
+          </a:xfrm>
+          <a:prstGeom prst="rect">
+            <a:avLst/>
+          </a:prstGeom>
+        </p:spPr>
+      </p:pic>
+      <p:pic>
+        <p:nvPicPr>
+          <p:cNvPr id="7" name="Grafik 6">
+            <a:extLst>
+              <a:ext uri="{FF2B5EF4-FFF2-40B4-BE49-F238E27FC236}">
+                <a16:creationId xmlns:a16="http://schemas.microsoft.com/office/drawing/2014/main" id="{0FA3DF6B-F5BB-4931-86C0-7D44871902A3}"/>
+              </a:ext>
+            </a:extLst>
+          </p:cNvPr>
+          <p:cNvPicPr>
+            <a:picLocks noChangeAspect="1"/>
+          </p:cNvPicPr>
+          <p:nvPr/>
+        </p:nvPicPr>
+        <p:blipFill>
+          <a:blip r:embed="rId3"/>
+          <a:stretch>
+            <a:fillRect/>
+          </a:stretch>
+        </p:blipFill>
+        <p:spPr>
+          <a:xfrm>
+            <a:off x="2149407" y="4049486"/>
+            <a:ext cx="7893185" cy="2827237"/>
+          </a:xfrm>
+          <a:prstGeom prst="rect">
+            <a:avLst/>
+          </a:prstGeom>
+        </p:spPr>
+      </p:pic>
+      <p:sp>
+        <p:nvSpPr>
+          <p:cNvPr id="8" name="Textfeld 7">
+            <a:extLst>
+              <a:ext uri="{FF2B5EF4-FFF2-40B4-BE49-F238E27FC236}">
+                <a16:creationId xmlns:a16="http://schemas.microsoft.com/office/drawing/2014/main" id="{84EB5198-2876-4212-AF8B-71F1A637CB43}"/>
+              </a:ext>
+            </a:extLst>
+          </p:cNvPr>
+          <p:cNvSpPr txBox="1"/>
+          <p:nvPr/>
+        </p:nvSpPr>
+        <p:spPr>
+          <a:xfrm>
+            <a:off x="2239346" y="167952"/>
+            <a:ext cx="5075853" cy="400110"/>
+          </a:xfrm>
+          <a:prstGeom prst="rect">
+            <a:avLst/>
+          </a:prstGeom>
+          <a:noFill/>
+        </p:spPr>
+        <p:txBody>
+          <a:bodyPr wrap="square" rtlCol="0">
+            <a:spAutoFit/>
+          </a:bodyPr>
+          <a:lstStyle/>
+          <a:p>
+            <a:r>
+              <a:rPr lang="de-DE" sz="2000" dirty="0">
+                <a:solidFill>
+                  <a:schemeClr val="bg1">
+                    <a:lumMod val="50000"/>
+                  </a:schemeClr>
+                </a:solidFill>
+              </a:rPr>
+              <a:t>Amos Team </a:t>
+            </a:r>
+            <a:r>
+              <a:rPr lang="de-DE" sz="2000" dirty="0" err="1">
+                <a:solidFill>
+                  <a:schemeClr val="bg1">
+                    <a:lumMod val="50000"/>
+                  </a:schemeClr>
+                </a:solidFill>
+              </a:rPr>
+              <a:t>Happiness</a:t>
+            </a:r>
+            <a:r>
+              <a:rPr lang="de-DE" sz="2000" dirty="0">
+                <a:solidFill>
+                  <a:schemeClr val="bg1">
+                    <a:lumMod val="50000"/>
+                  </a:schemeClr>
+                </a:solidFill>
+              </a:rPr>
+              <a:t> Index </a:t>
+            </a:r>
+          </a:p>
+        </p:txBody>
+      </p:sp>
+    </p:spTree>
+    <p:extLst>
+      <p:ext uri="{BB962C8B-B14F-4D97-AF65-F5344CB8AC3E}">
+        <p14:creationId xmlns:p14="http://schemas.microsoft.com/office/powerpoint/2010/main" val="538481422"/>
+      </p:ext>
+    </p:extLst>
+  </p:cSld>
+  <p:clrMapOvr>
+    <a:masterClrMapping/>
+  </p:clrMapOvr>
+  <p:timing>
+    <p:tnLst>
+      <p:par>
+        <p:cTn id="1" dur="indefinite" restart="never" nodeType="tmRoot">
+          <p:childTnLst>
+            <p:seq concurrent="1" nextAc="seek">
+              <p:cTn id="2" dur="indefinite" nodeType="mainSeq">
+                <p:childTnLst>
+                  <p:par>
+                    <p:cTn id="3" fill="hold">
+                      <p:stCondLst>
+                        <p:cond delay="indefinite"/>
+                      </p:stCondLst>
+                      <p:childTnLst>
+                        <p:par>
+                          <p:cTn id="4" fill="hold">
+                            <p:stCondLst>
+                              <p:cond delay="0"/>
+                            </p:stCondLst>
+                            <p:childTnLst>
+                              <p:par>
+                                <p:cTn id="5" presetID="1" presetClass="entr" presetSubtype="0" fill="hold" nodeType="clickEffect">
+                                  <p:stCondLst>
+                                    <p:cond delay="0"/>
+                                  </p:stCondLst>
+                                  <p:childTnLst>
+                                    <p:set>
+                                      <p:cBhvr>
+                                        <p:cTn id="6" dur="1" fill="hold">
+                                          <p:stCondLst>
+                                            <p:cond delay="0"/>
+                                          </p:stCondLst>
+                                        </p:cTn>
+                                        <p:tgtEl>
+                                          <p:spTgt spid="7"/>
+                                        </p:tgtEl>
+                                        <p:attrNameLst>
+                                          <p:attrName>style.visibility</p:attrName>
+                                        </p:attrNameLst>
+                                      </p:cBhvr>
+                                      <p:to>
+                                        <p:strVal val="visible"/>
+                                      </p:to>
+                                    </p:set>
+                                  </p:childTnLst>
+                                </p:cTn>
+                              </p:par>
+                            </p:childTnLst>
+                          </p:cTn>
+                        </p:par>
+                      </p:childTnLst>
+                    </p:cTn>
+                  </p:par>
+                </p:childTnLst>
+              </p:cTn>
+              <p:prevCondLst>
+                <p:cond evt="onPrev" delay="0">
+                  <p:tgtEl>
+                    <p:sldTgt/>
+                  </p:tgtEl>
+                </p:cond>
+              </p:prevCondLst>
+              <p:nextCondLst>
+                <p:cond evt="onNext" delay="0">
+                  <p:tgtEl>
+                    <p:sldTgt/>
+                  </p:tgtEl>
+                </p:cond>
+              </p:nextCondLst>
+            </p:seq>
+          </p:childTnLst>
+        </p:cTn>
+      </p:par>
+    </p:tnLst>
+  </p:timing>
 </p:sld>
 </file>
 
@@ -28597,4 +32319,299 @@
     </a:ext>
   </a:extLst>
 </a:theme>
+</file>
+
+<file path=ppt/theme/theme2.xml><?xml version="1.0" encoding="utf-8"?>
+<a:theme xmlns:a="http://schemas.openxmlformats.org/drawingml/2006/main" name="Office">
+  <a:themeElements>
+    <a:clrScheme name="Office">
+      <a:dk1>
+        <a:sysClr val="windowText" lastClr="000000"/>
+      </a:dk1>
+      <a:lt1>
+        <a:sysClr val="window" lastClr="FFFFFF"/>
+      </a:lt1>
+      <a:dk2>
+        <a:srgbClr val="44546A"/>
+      </a:dk2>
+      <a:lt2>
+        <a:srgbClr val="E7E6E6"/>
+      </a:lt2>
+      <a:accent1>
+        <a:srgbClr val="4472C4"/>
+      </a:accent1>
+      <a:accent2>
+        <a:srgbClr val="ED7D31"/>
+      </a:accent2>
+      <a:accent3>
+        <a:srgbClr val="A5A5A5"/>
+      </a:accent3>
+      <a:accent4>
+        <a:srgbClr val="FFC000"/>
+      </a:accent4>
+      <a:accent5>
+        <a:srgbClr val="5B9BD5"/>
+      </a:accent5>
+      <a:accent6>
+        <a:srgbClr val="70AD47"/>
+      </a:accent6>
+      <a:hlink>
+        <a:srgbClr val="0563C1"/>
+      </a:hlink>
+      <a:folHlink>
+        <a:srgbClr val="954F72"/>
+      </a:folHlink>
+    </a:clrScheme>
+    <a:fontScheme name="Office">
+      <a:majorFont>
+        <a:latin typeface="Calibri Light" panose="020F0302020204030204"/>
+        <a:ea typeface=""/>
+        <a:cs typeface=""/>
+        <a:font script="Jpan" typeface="游ゴシック Light"/>
+        <a:font script="Hang" typeface="맑은 고딕"/>
+        <a:font script="Hans" typeface="等线 Light"/>
+        <a:font script="Hant" typeface="新細明體"/>
+        <a:font script="Arab" typeface="Times New Roman"/>
+        <a:font script="Hebr" typeface="Times New Roman"/>
+        <a:font script="Thai" typeface="Angsana New"/>
+        <a:font script="Ethi" typeface="Nyala"/>
+        <a:font script="Beng" typeface="Vrinda"/>
+        <a:font script="Gujr" typeface="Shruti"/>
+        <a:font script="Khmr" typeface="MoolBoran"/>
+        <a:font script="Knda" typeface="Tunga"/>
+        <a:font script="Guru" typeface="Raavi"/>
+        <a:font script="Cans" typeface="Euphemia"/>
+        <a:font script="Cher" typeface="Plantagenet Cherokee"/>
+        <a:font script="Yiii" typeface="Microsoft Yi Baiti"/>
+        <a:font script="Tibt" typeface="Microsoft Himalaya"/>
+        <a:font script="Thaa" typeface="MV Boli"/>
+        <a:font script="Deva" typeface="Mangal"/>
+        <a:font script="Telu" typeface="Gautami"/>
+        <a:font script="Taml" typeface="Latha"/>
+        <a:font script="Syrc" typeface="Estrangelo Edessa"/>
+        <a:font script="Orya" typeface="Kalinga"/>
+        <a:font script="Mlym" typeface="Kartika"/>
+        <a:font script="Laoo" typeface="DokChampa"/>
+        <a:font script="Sinh" typeface="Iskoola Pota"/>
+        <a:font script="Mong" typeface="Mongolian Baiti"/>
+        <a:font script="Viet" typeface="Times New Roman"/>
+        <a:font script="Uigh" typeface="Microsoft Uighur"/>
+        <a:font script="Geor" typeface="Sylfaen"/>
+        <a:font script="Armn" typeface="Arial"/>
+        <a:font script="Bugi" typeface="Leelawadee UI"/>
+        <a:font script="Bopo" typeface="Microsoft JhengHei"/>
+        <a:font script="Java" typeface="Javanese Text"/>
+        <a:font script="Lisu" typeface="Segoe UI"/>
+        <a:font script="Mymr" typeface="Myanmar Text"/>
+        <a:font script="Nkoo" typeface="Ebrima"/>
+        <a:font script="Olck" typeface="Nirmala UI"/>
+        <a:font script="Osma" typeface="Ebrima"/>
+        <a:font script="Phag" typeface="Phagspa"/>
+        <a:font script="Syrn" typeface="Estrangelo Edessa"/>
+        <a:font script="Syrj" typeface="Estrangelo Edessa"/>
+        <a:font script="Syre" typeface="Estrangelo Edessa"/>
+        <a:font script="Sora" typeface="Nirmala UI"/>
+        <a:font script="Tale" typeface="Microsoft Tai Le"/>
+        <a:font script="Talu" typeface="Microsoft New Tai Lue"/>
+        <a:font script="Tfng" typeface="Ebrima"/>
+      </a:majorFont>
+      <a:minorFont>
+        <a:latin typeface="Calibri" panose="020F0502020204030204"/>
+        <a:ea typeface=""/>
+        <a:cs typeface=""/>
+        <a:font script="Jpan" typeface="游ゴシック"/>
+        <a:font script="Hang" typeface="맑은 고딕"/>
+        <a:font script="Hans" typeface="等线"/>
+        <a:font script="Hant" typeface="新細明體"/>
+        <a:font script="Arab" typeface="Arial"/>
+        <a:font script="Hebr" typeface="Arial"/>
+        <a:font script="Thai" typeface="Cordia New"/>
+        <a:font script="Ethi" typeface="Nyala"/>
+        <a:font script="Beng" typeface="Vrinda"/>
+        <a:font script="Gujr" typeface="Shruti"/>
+        <a:font script="Khmr" typeface="DaunPenh"/>
+        <a:font script="Knda" typeface="Tunga"/>
+        <a:font script="Guru" typeface="Raavi"/>
+        <a:font script="Cans" typeface="Euphemia"/>
+        <a:font script="Cher" typeface="Plantagenet Cherokee"/>
+        <a:font script="Yiii" typeface="Microsoft Yi Baiti"/>
+        <a:font script="Tibt" typeface="Microsoft Himalaya"/>
+        <a:font script="Thaa" typeface="MV Boli"/>
+        <a:font script="Deva" typeface="Mangal"/>
+        <a:font script="Telu" typeface="Gautami"/>
+        <a:font script="Taml" typeface="Latha"/>
+        <a:font script="Syrc" typeface="Estrangelo Edessa"/>
+        <a:font script="Orya" typeface="Kalinga"/>
+        <a:font script="Mlym" typeface="Kartika"/>
+        <a:font script="Laoo" typeface="DokChampa"/>
+        <a:font script="Sinh" typeface="Iskoola Pota"/>
+        <a:font script="Mong" typeface="Mongolian Baiti"/>
+        <a:font script="Viet" typeface="Arial"/>
+        <a:font script="Uigh" typeface="Microsoft Uighur"/>
+        <a:font script="Geor" typeface="Sylfaen"/>
+        <a:font script="Armn" typeface="Arial"/>
+        <a:font script="Bugi" typeface="Leelawadee UI"/>
+        <a:font script="Bopo" typeface="Microsoft JhengHei"/>
+        <a:font script="Java" typeface="Javanese Text"/>
+        <a:font script="Lisu" typeface="Segoe UI"/>
+        <a:font script="Mymr" typeface="Myanmar Text"/>
+        <a:font script="Nkoo" typeface="Ebrima"/>
+        <a:font script="Olck" typeface="Nirmala UI"/>
+        <a:font script="Osma" typeface="Ebrima"/>
+        <a:font script="Phag" typeface="Phagspa"/>
+        <a:font script="Syrn" typeface="Estrangelo Edessa"/>
+        <a:font script="Syrj" typeface="Estrangelo Edessa"/>
+        <a:font script="Syre" typeface="Estrangelo Edessa"/>
+        <a:font script="Sora" typeface="Nirmala UI"/>
+        <a:font script="Tale" typeface="Microsoft Tai Le"/>
+        <a:font script="Talu" typeface="Microsoft New Tai Lue"/>
+        <a:font script="Tfng" typeface="Ebrima"/>
+      </a:minorFont>
+    </a:fontScheme>
+    <a:fmtScheme name="Office">
+      <a:fillStyleLst>
+        <a:solidFill>
+          <a:schemeClr val="phClr"/>
+        </a:solidFill>
+        <a:gradFill rotWithShape="1">
+          <a:gsLst>
+            <a:gs pos="0">
+              <a:schemeClr val="phClr">
+                <a:lumMod val="110000"/>
+                <a:satMod val="105000"/>
+                <a:tint val="67000"/>
+              </a:schemeClr>
+            </a:gs>
+            <a:gs pos="50000">
+              <a:schemeClr val="phClr">
+                <a:lumMod val="105000"/>
+                <a:satMod val="103000"/>
+                <a:tint val="73000"/>
+              </a:schemeClr>
+            </a:gs>
+            <a:gs pos="100000">
+              <a:schemeClr val="phClr">
+                <a:lumMod val="105000"/>
+                <a:satMod val="109000"/>
+                <a:tint val="81000"/>
+              </a:schemeClr>
+            </a:gs>
+          </a:gsLst>
+          <a:lin ang="5400000" scaled="0"/>
+        </a:gradFill>
+        <a:gradFill rotWithShape="1">
+          <a:gsLst>
+            <a:gs pos="0">
+              <a:schemeClr val="phClr">
+                <a:satMod val="103000"/>
+                <a:lumMod val="102000"/>
+                <a:tint val="94000"/>
+              </a:schemeClr>
+            </a:gs>
+            <a:gs pos="50000">
+              <a:schemeClr val="phClr">
+                <a:satMod val="110000"/>
+                <a:lumMod val="100000"/>
+                <a:shade val="100000"/>
+              </a:schemeClr>
+            </a:gs>
+            <a:gs pos="100000">
+              <a:schemeClr val="phClr">
+                <a:lumMod val="99000"/>
+                <a:satMod val="120000"/>
+                <a:shade val="78000"/>
+              </a:schemeClr>
+            </a:gs>
+          </a:gsLst>
+          <a:lin ang="5400000" scaled="0"/>
+        </a:gradFill>
+      </a:fillStyleLst>
+      <a:lnStyleLst>
+        <a:ln w="6350" cap="flat" cmpd="sng" algn="ctr">
+          <a:solidFill>
+            <a:schemeClr val="phClr"/>
+          </a:solidFill>
+          <a:prstDash val="solid"/>
+          <a:miter lim="800000"/>
+        </a:ln>
+        <a:ln w="12700" cap="flat" cmpd="sng" algn="ctr">
+          <a:solidFill>
+            <a:schemeClr val="phClr"/>
+          </a:solidFill>
+          <a:prstDash val="solid"/>
+          <a:miter lim="800000"/>
+        </a:ln>
+        <a:ln w="19050" cap="flat" cmpd="sng" algn="ctr">
+          <a:solidFill>
+            <a:schemeClr val="phClr"/>
+          </a:solidFill>
+          <a:prstDash val="solid"/>
+          <a:miter lim="800000"/>
+        </a:ln>
+      </a:lnStyleLst>
+      <a:effectStyleLst>
+        <a:effectStyle>
+          <a:effectLst/>
+        </a:effectStyle>
+        <a:effectStyle>
+          <a:effectLst/>
+        </a:effectStyle>
+        <a:effectStyle>
+          <a:effectLst>
+            <a:outerShdw blurRad="57150" dist="19050" dir="5400000" algn="ctr" rotWithShape="0">
+              <a:srgbClr val="000000">
+                <a:alpha val="63000"/>
+              </a:srgbClr>
+            </a:outerShdw>
+          </a:effectLst>
+        </a:effectStyle>
+      </a:effectStyleLst>
+      <a:bgFillStyleLst>
+        <a:solidFill>
+          <a:schemeClr val="phClr"/>
+        </a:solidFill>
+        <a:solidFill>
+          <a:schemeClr val="phClr">
+            <a:tint val="95000"/>
+            <a:satMod val="170000"/>
+          </a:schemeClr>
+        </a:solidFill>
+        <a:gradFill rotWithShape="1">
+          <a:gsLst>
+            <a:gs pos="0">
+              <a:schemeClr val="phClr">
+                <a:tint val="93000"/>
+                <a:satMod val="150000"/>
+                <a:shade val="98000"/>
+                <a:lumMod val="102000"/>
+              </a:schemeClr>
+            </a:gs>
+            <a:gs pos="50000">
+              <a:schemeClr val="phClr">
+                <a:tint val="98000"/>
+                <a:satMod val="130000"/>
+                <a:shade val="90000"/>
+                <a:lumMod val="103000"/>
+              </a:schemeClr>
+            </a:gs>
+            <a:gs pos="100000">
+              <a:schemeClr val="phClr">
+                <a:shade val="63000"/>
+                <a:satMod val="120000"/>
+              </a:schemeClr>
+            </a:gs>
+          </a:gsLst>
+          <a:lin ang="5400000" scaled="0"/>
+        </a:gradFill>
+      </a:bgFillStyleLst>
+    </a:fmtScheme>
+  </a:themeElements>
+  <a:objectDefaults/>
+  <a:extraClrSchemeLst/>
+  <a:extLst>
+    <a:ext uri="{05A4C25C-085E-4340-85A3-A5531E510DB2}">
+      <thm15:themeFamily xmlns:thm15="http://schemas.microsoft.com/office/thememl/2012/main" name="Office Theme" id="{62F939B6-93AF-4DB8-9C6B-D6C7DFDC589F}" vid="{4A3C46E8-61CC-4603-A589-7422A47A8E4A}"/>
+    </a:ext>
+  </a:extLst>
+</a:theme>
 </file>
</xml_diff>